<commit_message>
Standardised all the hash verions
</commit_message>
<xml_diff>
--- a/Report/FYP_Presentation.pptx
+++ b/Report/FYP_Presentation.pptx
@@ -296,7 +296,7 @@
             <a:fld id="{1D8BD707-D9CF-40AE-B4C6-C98DA3205C09}" type="datetimeFigureOut">
               <a:rPr lang="en-US" smtClean="0"/>
               <a:pPr/>
-              <a:t>3/22/2014</a:t>
+              <a:t>3/23/2014</a:t>
             </a:fld>
             <a:endParaRPr lang="en-US"/>
           </a:p>
@@ -463,7 +463,7 @@
             <a:fld id="{1D8BD707-D9CF-40AE-B4C6-C98DA3205C09}" type="datetimeFigureOut">
               <a:rPr lang="en-US" smtClean="0"/>
               <a:pPr/>
-              <a:t>3/22/2014</a:t>
+              <a:t>3/23/2014</a:t>
             </a:fld>
             <a:endParaRPr lang="en-US"/>
           </a:p>
@@ -640,7 +640,7 @@
             <a:fld id="{1D8BD707-D9CF-40AE-B4C6-C98DA3205C09}" type="datetimeFigureOut">
               <a:rPr lang="en-US" smtClean="0"/>
               <a:pPr/>
-              <a:t>3/22/2014</a:t>
+              <a:t>3/23/2014</a:t>
             </a:fld>
             <a:endParaRPr lang="en-US"/>
           </a:p>
@@ -807,7 +807,7 @@
             <a:fld id="{1D8BD707-D9CF-40AE-B4C6-C98DA3205C09}" type="datetimeFigureOut">
               <a:rPr lang="en-US" smtClean="0"/>
               <a:pPr/>
-              <a:t>3/22/2014</a:t>
+              <a:t>3/23/2014</a:t>
             </a:fld>
             <a:endParaRPr lang="en-US"/>
           </a:p>
@@ -1050,7 +1050,7 @@
             <a:fld id="{1D8BD707-D9CF-40AE-B4C6-C98DA3205C09}" type="datetimeFigureOut">
               <a:rPr lang="en-US" smtClean="0"/>
               <a:pPr/>
-              <a:t>3/22/2014</a:t>
+              <a:t>3/23/2014</a:t>
             </a:fld>
             <a:endParaRPr lang="en-US"/>
           </a:p>
@@ -1335,7 +1335,7 @@
             <a:fld id="{1D8BD707-D9CF-40AE-B4C6-C98DA3205C09}" type="datetimeFigureOut">
               <a:rPr lang="en-US" smtClean="0"/>
               <a:pPr/>
-              <a:t>3/22/2014</a:t>
+              <a:t>3/23/2014</a:t>
             </a:fld>
             <a:endParaRPr lang="en-US"/>
           </a:p>
@@ -1754,7 +1754,7 @@
             <a:fld id="{1D8BD707-D9CF-40AE-B4C6-C98DA3205C09}" type="datetimeFigureOut">
               <a:rPr lang="en-US" smtClean="0"/>
               <a:pPr/>
-              <a:t>3/22/2014</a:t>
+              <a:t>3/23/2014</a:t>
             </a:fld>
             <a:endParaRPr lang="en-US"/>
           </a:p>
@@ -1869,7 +1869,7 @@
             <a:fld id="{1D8BD707-D9CF-40AE-B4C6-C98DA3205C09}" type="datetimeFigureOut">
               <a:rPr lang="en-US" smtClean="0"/>
               <a:pPr/>
-              <a:t>3/22/2014</a:t>
+              <a:t>3/23/2014</a:t>
             </a:fld>
             <a:endParaRPr lang="en-US"/>
           </a:p>
@@ -1961,7 +1961,7 @@
             <a:fld id="{1D8BD707-D9CF-40AE-B4C6-C98DA3205C09}" type="datetimeFigureOut">
               <a:rPr lang="en-US" smtClean="0"/>
               <a:pPr/>
-              <a:t>3/22/2014</a:t>
+              <a:t>3/23/2014</a:t>
             </a:fld>
             <a:endParaRPr lang="en-US"/>
           </a:p>
@@ -2235,7 +2235,7 @@
             <a:fld id="{1D8BD707-D9CF-40AE-B4C6-C98DA3205C09}" type="datetimeFigureOut">
               <a:rPr lang="en-US" smtClean="0"/>
               <a:pPr/>
-              <a:t>3/22/2014</a:t>
+              <a:t>3/23/2014</a:t>
             </a:fld>
             <a:endParaRPr lang="en-US"/>
           </a:p>
@@ -2485,7 +2485,7 @@
             <a:fld id="{1D8BD707-D9CF-40AE-B4C6-C98DA3205C09}" type="datetimeFigureOut">
               <a:rPr lang="en-US" smtClean="0"/>
               <a:pPr/>
-              <a:t>3/22/2014</a:t>
+              <a:t>3/23/2014</a:t>
             </a:fld>
             <a:endParaRPr lang="en-US"/>
           </a:p>
@@ -2695,7 +2695,7 @@
             <a:fld id="{1D8BD707-D9CF-40AE-B4C6-C98DA3205C09}" type="datetimeFigureOut">
               <a:rPr lang="en-US" smtClean="0"/>
               <a:pPr/>
-              <a:t>3/22/2014</a:t>
+              <a:t>3/23/2014</a:t>
             </a:fld>
             <a:endParaRPr lang="en-US"/>
           </a:p>
@@ -3179,7 +3179,21 @@
           <a:bodyPr/>
           <a:lstStyle/>
           <a:p>
-            <a:endParaRPr lang="en-IE"/>
+            <a:r>
+              <a:rPr lang="en-IE" dirty="0" smtClean="0"/>
+              <a:t>Not much data comparing the different types of concurrent data structure</a:t>
+            </a:r>
+          </a:p>
+          <a:p>
+            <a:r>
+              <a:rPr lang="en-IE" dirty="0" smtClean="0"/>
+              <a:t>Locked, Lock-free</a:t>
+            </a:r>
+            <a:r>
+              <a:rPr lang="en-IE" smtClean="0"/>
+              <a:t>, Wait-free</a:t>
+            </a:r>
+            <a:endParaRPr lang="en-IE" dirty="0" smtClean="0"/>
           </a:p>
         </p:txBody>
       </p:sp>

</xml_diff>

<commit_message>
Added a resize function to hash lockless and started work on the report again
</commit_message>
<xml_diff>
--- a/Report/FYP_Presentation.pptx
+++ b/Report/FYP_Presentation.pptx
@@ -296,7 +296,7 @@
             <a:fld id="{1D8BD707-D9CF-40AE-B4C6-C98DA3205C09}" type="datetimeFigureOut">
               <a:rPr lang="en-US" smtClean="0"/>
               <a:pPr/>
-              <a:t>3/23/2014</a:t>
+              <a:t>3/24/2014</a:t>
             </a:fld>
             <a:endParaRPr lang="en-US"/>
           </a:p>
@@ -463,7 +463,7 @@
             <a:fld id="{1D8BD707-D9CF-40AE-B4C6-C98DA3205C09}" type="datetimeFigureOut">
               <a:rPr lang="en-US" smtClean="0"/>
               <a:pPr/>
-              <a:t>3/23/2014</a:t>
+              <a:t>3/24/2014</a:t>
             </a:fld>
             <a:endParaRPr lang="en-US"/>
           </a:p>
@@ -640,7 +640,7 @@
             <a:fld id="{1D8BD707-D9CF-40AE-B4C6-C98DA3205C09}" type="datetimeFigureOut">
               <a:rPr lang="en-US" smtClean="0"/>
               <a:pPr/>
-              <a:t>3/23/2014</a:t>
+              <a:t>3/24/2014</a:t>
             </a:fld>
             <a:endParaRPr lang="en-US"/>
           </a:p>
@@ -807,7 +807,7 @@
             <a:fld id="{1D8BD707-D9CF-40AE-B4C6-C98DA3205C09}" type="datetimeFigureOut">
               <a:rPr lang="en-US" smtClean="0"/>
               <a:pPr/>
-              <a:t>3/23/2014</a:t>
+              <a:t>3/24/2014</a:t>
             </a:fld>
             <a:endParaRPr lang="en-US"/>
           </a:p>
@@ -1050,7 +1050,7 @@
             <a:fld id="{1D8BD707-D9CF-40AE-B4C6-C98DA3205C09}" type="datetimeFigureOut">
               <a:rPr lang="en-US" smtClean="0"/>
               <a:pPr/>
-              <a:t>3/23/2014</a:t>
+              <a:t>3/24/2014</a:t>
             </a:fld>
             <a:endParaRPr lang="en-US"/>
           </a:p>
@@ -1335,7 +1335,7 @@
             <a:fld id="{1D8BD707-D9CF-40AE-B4C6-C98DA3205C09}" type="datetimeFigureOut">
               <a:rPr lang="en-US" smtClean="0"/>
               <a:pPr/>
-              <a:t>3/23/2014</a:t>
+              <a:t>3/24/2014</a:t>
             </a:fld>
             <a:endParaRPr lang="en-US"/>
           </a:p>
@@ -1754,7 +1754,7 @@
             <a:fld id="{1D8BD707-D9CF-40AE-B4C6-C98DA3205C09}" type="datetimeFigureOut">
               <a:rPr lang="en-US" smtClean="0"/>
               <a:pPr/>
-              <a:t>3/23/2014</a:t>
+              <a:t>3/24/2014</a:t>
             </a:fld>
             <a:endParaRPr lang="en-US"/>
           </a:p>
@@ -1869,7 +1869,7 @@
             <a:fld id="{1D8BD707-D9CF-40AE-B4C6-C98DA3205C09}" type="datetimeFigureOut">
               <a:rPr lang="en-US" smtClean="0"/>
               <a:pPr/>
-              <a:t>3/23/2014</a:t>
+              <a:t>3/24/2014</a:t>
             </a:fld>
             <a:endParaRPr lang="en-US"/>
           </a:p>
@@ -1961,7 +1961,7 @@
             <a:fld id="{1D8BD707-D9CF-40AE-B4C6-C98DA3205C09}" type="datetimeFigureOut">
               <a:rPr lang="en-US" smtClean="0"/>
               <a:pPr/>
-              <a:t>3/23/2014</a:t>
+              <a:t>3/24/2014</a:t>
             </a:fld>
             <a:endParaRPr lang="en-US"/>
           </a:p>
@@ -2235,7 +2235,7 @@
             <a:fld id="{1D8BD707-D9CF-40AE-B4C6-C98DA3205C09}" type="datetimeFigureOut">
               <a:rPr lang="en-US" smtClean="0"/>
               <a:pPr/>
-              <a:t>3/23/2014</a:t>
+              <a:t>3/24/2014</a:t>
             </a:fld>
             <a:endParaRPr lang="en-US"/>
           </a:p>
@@ -2485,7 +2485,7 @@
             <a:fld id="{1D8BD707-D9CF-40AE-B4C6-C98DA3205C09}" type="datetimeFigureOut">
               <a:rPr lang="en-US" smtClean="0"/>
               <a:pPr/>
-              <a:t>3/23/2014</a:t>
+              <a:t>3/24/2014</a:t>
             </a:fld>
             <a:endParaRPr lang="en-US"/>
           </a:p>
@@ -2695,7 +2695,7 @@
             <a:fld id="{1D8BD707-D9CF-40AE-B4C6-C98DA3205C09}" type="datetimeFigureOut">
               <a:rPr lang="en-US" smtClean="0"/>
               <a:pPr/>
-              <a:t>3/23/2014</a:t>
+              <a:t>3/24/2014</a:t>
             </a:fld>
             <a:endParaRPr lang="en-US"/>
           </a:p>
@@ -3181,19 +3181,36 @@
           <a:p>
             <a:r>
               <a:rPr lang="en-IE" dirty="0" smtClean="0"/>
-              <a:t>Not much data comparing the different types of concurrent data structure</a:t>
+              <a:t>Plenty of work done on how to implement concurrent objects</a:t>
             </a:r>
           </a:p>
           <a:p>
             <a:r>
               <a:rPr lang="en-IE" dirty="0" smtClean="0"/>
-              <a:t>Locked, Lock-free</a:t>
+              <a:t>Not </a:t>
+            </a:r>
+            <a:r>
+              <a:rPr lang="en-IE" dirty="0" smtClean="0"/>
+              <a:t>much </a:t>
             </a:r>
             <a:r>
               <a:rPr lang="en-IE" smtClean="0"/>
-              <a:t>, Wait-free</a:t>
-            </a:r>
-            <a:endParaRPr lang="en-IE" dirty="0" smtClean="0"/>
+              <a:t>data </a:t>
+            </a:r>
+            <a:r>
+              <a:rPr lang="en-IE" smtClean="0"/>
+              <a:t>on comparing </a:t>
+            </a:r>
+            <a:r>
+              <a:rPr lang="en-IE" dirty="0" smtClean="0"/>
+              <a:t>the different types of concurrent data structure</a:t>
+            </a:r>
+          </a:p>
+          <a:p>
+            <a:r>
+              <a:rPr lang="en-IE" dirty="0" smtClean="0"/>
+              <a:t>Locked, Lock-free, Wait-free</a:t>
+            </a:r>
           </a:p>
         </p:txBody>
       </p:sp>
@@ -3265,7 +3282,17 @@
           <a:bodyPr/>
           <a:lstStyle/>
           <a:p>
-            <a:endParaRPr lang="en-IE"/>
+            <a:r>
+              <a:rPr lang="en-IE" dirty="0" smtClean="0"/>
+              <a:t>Potential for high scalability</a:t>
+            </a:r>
+          </a:p>
+          <a:p>
+            <a:r>
+              <a:rPr lang="en-IE" dirty="0" smtClean="0"/>
+              <a:t>Increased Speeds</a:t>
+            </a:r>
+            <a:endParaRPr lang="en-IE" dirty="0"/>
           </a:p>
         </p:txBody>
       </p:sp>
@@ -3337,7 +3364,23 @@
           <a:bodyPr/>
           <a:lstStyle/>
           <a:p>
-            <a:endParaRPr lang="en-IE"/>
+            <a:r>
+              <a:rPr lang="en-IE" dirty="0" smtClean="0"/>
+              <a:t>“The Art of Multiprocessor Programming”</a:t>
+            </a:r>
+          </a:p>
+          <a:p>
+            <a:r>
+              <a:rPr lang="en-IE" dirty="0" smtClean="0"/>
+              <a:t>“Designing Concurrent Data Structures”</a:t>
+            </a:r>
+          </a:p>
+          <a:p>
+            <a:r>
+              <a:rPr lang="en-IE" dirty="0" smtClean="0"/>
+              <a:t>“Implementing Concurrent Data Objects”</a:t>
+            </a:r>
+            <a:endParaRPr lang="en-IE" dirty="0"/>
           </a:p>
         </p:txBody>
       </p:sp>
@@ -3409,7 +3452,23 @@
           <a:bodyPr/>
           <a:lstStyle/>
           <a:p>
-            <a:endParaRPr lang="en-IE"/>
+            <a:r>
+              <a:rPr lang="en-IE" dirty="0" smtClean="0"/>
+              <a:t>Implemented 3 concurrent data structures</a:t>
+            </a:r>
+          </a:p>
+          <a:p>
+            <a:r>
+              <a:rPr lang="en-IE" dirty="0" smtClean="0"/>
+              <a:t>Implemented both locked and lock-free variations</a:t>
+            </a:r>
+          </a:p>
+          <a:p>
+            <a:r>
+              <a:rPr lang="en-IE" dirty="0" smtClean="0"/>
+              <a:t>Tested &amp; compared them on 3 different systems</a:t>
+            </a:r>
+            <a:endParaRPr lang="en-IE" dirty="0"/>
           </a:p>
         </p:txBody>
       </p:sp>
@@ -3481,7 +3540,23 @@
           <a:bodyPr/>
           <a:lstStyle/>
           <a:p>
-            <a:endParaRPr lang="en-IE"/>
+            <a:r>
+              <a:rPr lang="en-IE" dirty="0" smtClean="0"/>
+              <a:t>Ran each mode for one second</a:t>
+            </a:r>
+          </a:p>
+          <a:p>
+            <a:r>
+              <a:rPr lang="en-IE" dirty="0" smtClean="0"/>
+              <a:t>Thread count went from 1-128</a:t>
+            </a:r>
+          </a:p>
+          <a:p>
+            <a:r>
+              <a:rPr lang="en-IE" dirty="0" smtClean="0"/>
+              <a:t>Recorded iterations per second  </a:t>
+            </a:r>
+            <a:endParaRPr lang="en-IE" dirty="0"/>
           </a:p>
         </p:txBody>
       </p:sp>

</xml_diff>

<commit_message>
Added to the report saved the presentation as .pdf
</commit_message>
<xml_diff>
--- a/Report/FYP_Presentation.pptx
+++ b/Report/FYP_Presentation.pptx
@@ -910,11 +910,11 @@
         </c:dLbls>
         <c:marker val="1"/>
         <c:smooth val="0"/>
-        <c:axId val="72009984"/>
-        <c:axId val="77755904"/>
+        <c:axId val="89086592"/>
+        <c:axId val="89113344"/>
       </c:lineChart>
       <c:catAx>
-        <c:axId val="72009984"/>
+        <c:axId val="89086592"/>
         <c:scaling>
           <c:orientation val="minMax"/>
         </c:scaling>
@@ -943,7 +943,7 @@
         <c:majorTickMark val="out"/>
         <c:minorTickMark val="none"/>
         <c:tickLblPos val="nextTo"/>
-        <c:crossAx val="77755904"/>
+        <c:crossAx val="89113344"/>
         <c:crosses val="autoZero"/>
         <c:auto val="1"/>
         <c:lblAlgn val="ctr"/>
@@ -951,7 +951,7 @@
         <c:noMultiLvlLbl val="0"/>
       </c:catAx>
       <c:valAx>
-        <c:axId val="77755904"/>
+        <c:axId val="89113344"/>
         <c:scaling>
           <c:orientation val="minMax"/>
         </c:scaling>
@@ -981,7 +981,7 @@
         <c:majorTickMark val="out"/>
         <c:minorTickMark val="none"/>
         <c:tickLblPos val="nextTo"/>
-        <c:crossAx val="72009984"/>
+        <c:crossAx val="89086592"/>
         <c:crosses val="autoZero"/>
         <c:crossBetween val="between"/>
       </c:valAx>
@@ -1792,11 +1792,11 @@
         </c:dLbls>
         <c:marker val="1"/>
         <c:smooth val="0"/>
-        <c:axId val="83765888"/>
-        <c:axId val="84281600"/>
+        <c:axId val="88952192"/>
+        <c:axId val="88974848"/>
       </c:lineChart>
       <c:catAx>
-        <c:axId val="83765888"/>
+        <c:axId val="88952192"/>
         <c:scaling>
           <c:orientation val="minMax"/>
         </c:scaling>
@@ -1825,7 +1825,7 @@
         <c:majorTickMark val="out"/>
         <c:minorTickMark val="none"/>
         <c:tickLblPos val="nextTo"/>
-        <c:crossAx val="84281600"/>
+        <c:crossAx val="88974848"/>
         <c:crosses val="autoZero"/>
         <c:auto val="1"/>
         <c:lblAlgn val="ctr"/>
@@ -1833,7 +1833,7 @@
         <c:noMultiLvlLbl val="0"/>
       </c:catAx>
       <c:valAx>
-        <c:axId val="84281600"/>
+        <c:axId val="88974848"/>
         <c:scaling>
           <c:orientation val="minMax"/>
         </c:scaling>
@@ -1863,7 +1863,7 @@
         <c:majorTickMark val="out"/>
         <c:minorTickMark val="none"/>
         <c:tickLblPos val="nextTo"/>
-        <c:crossAx val="83765888"/>
+        <c:crossAx val="88952192"/>
         <c:crosses val="autoZero"/>
         <c:crossBetween val="between"/>
       </c:valAx>
@@ -2235,11 +2235,11 @@
         </c:dLbls>
         <c:marker val="1"/>
         <c:smooth val="0"/>
-        <c:axId val="71946624"/>
-        <c:axId val="71949696"/>
+        <c:axId val="89013248"/>
+        <c:axId val="89019520"/>
       </c:lineChart>
       <c:catAx>
-        <c:axId val="71946624"/>
+        <c:axId val="89013248"/>
         <c:scaling>
           <c:orientation val="minMax"/>
         </c:scaling>
@@ -2268,7 +2268,7 @@
         <c:majorTickMark val="out"/>
         <c:minorTickMark val="none"/>
         <c:tickLblPos val="nextTo"/>
-        <c:crossAx val="71949696"/>
+        <c:crossAx val="89019520"/>
         <c:crosses val="autoZero"/>
         <c:auto val="1"/>
         <c:lblAlgn val="ctr"/>
@@ -2276,7 +2276,7 @@
         <c:noMultiLvlLbl val="0"/>
       </c:catAx>
       <c:valAx>
-        <c:axId val="71949696"/>
+        <c:axId val="89019520"/>
         <c:scaling>
           <c:orientation val="minMax"/>
         </c:scaling>
@@ -2306,7 +2306,7 @@
         <c:majorTickMark val="out"/>
         <c:minorTickMark val="none"/>
         <c:tickLblPos val="nextTo"/>
-        <c:crossAx val="71946624"/>
+        <c:crossAx val="89013248"/>
         <c:crosses val="autoZero"/>
         <c:crossBetween val="between"/>
       </c:valAx>
@@ -2526,11 +2526,11 @@
         </c:dLbls>
         <c:marker val="1"/>
         <c:smooth val="0"/>
-        <c:axId val="81826944"/>
-        <c:axId val="81828864"/>
+        <c:axId val="89062400"/>
+        <c:axId val="89457792"/>
       </c:lineChart>
       <c:catAx>
-        <c:axId val="81826944"/>
+        <c:axId val="89062400"/>
         <c:scaling>
           <c:orientation val="minMax"/>
         </c:scaling>
@@ -2559,7 +2559,7 @@
         <c:majorTickMark val="out"/>
         <c:minorTickMark val="none"/>
         <c:tickLblPos val="nextTo"/>
-        <c:crossAx val="81828864"/>
+        <c:crossAx val="89457792"/>
         <c:crosses val="autoZero"/>
         <c:auto val="1"/>
         <c:lblAlgn val="ctr"/>
@@ -2567,7 +2567,7 @@
         <c:noMultiLvlLbl val="0"/>
       </c:catAx>
       <c:valAx>
-        <c:axId val="81828864"/>
+        <c:axId val="89457792"/>
         <c:scaling>
           <c:orientation val="minMax"/>
         </c:scaling>
@@ -2597,7 +2597,7 @@
         <c:majorTickMark val="out"/>
         <c:minorTickMark val="none"/>
         <c:tickLblPos val="nextTo"/>
-        <c:crossAx val="81826944"/>
+        <c:crossAx val="89062400"/>
         <c:crosses val="autoZero"/>
         <c:crossBetween val="between"/>
       </c:valAx>
@@ -6323,11 +6323,7 @@
           <a:p>
             <a:r>
               <a:rPr lang="en-IE" dirty="0" smtClean="0"/>
-              <a:t>Increased </a:t>
-            </a:r>
-            <a:r>
-              <a:rPr lang="en-IE" dirty="0" smtClean="0"/>
-              <a:t>Speeds</a:t>
+              <a:t>Increased Speeds</a:t>
             </a:r>
           </a:p>
           <a:p>
@@ -6409,11 +6405,7 @@
           <a:p>
             <a:r>
               <a:rPr lang="en-IE" dirty="0" smtClean="0"/>
-              <a:t>“The Art of Multiprocessor Programming</a:t>
-            </a:r>
-            <a:r>
-              <a:rPr lang="en-IE" dirty="0" smtClean="0"/>
-              <a:t>”- Herlihy &amp; </a:t>
+              <a:t>“The Art of Multiprocessor Programming”- Herlihy &amp; </a:t>
             </a:r>
             <a:r>
               <a:rPr lang="en-IE" dirty="0" err="1" smtClean="0"/>
@@ -6423,16 +6415,11 @@
               <a:rPr lang="en-IE" dirty="0" smtClean="0"/>
               <a:t> - 2008</a:t>
             </a:r>
-            <a:endParaRPr lang="en-IE" dirty="0" smtClean="0"/>
           </a:p>
           <a:p>
             <a:r>
               <a:rPr lang="en-IE" dirty="0" smtClean="0"/>
-              <a:t>“Designing Concurrent Data Structures</a:t>
-            </a:r>
-            <a:r>
-              <a:rPr lang="en-IE" dirty="0" smtClean="0"/>
-              <a:t>” – </a:t>
+              <a:t>“Designing Concurrent Data Structures” – </a:t>
             </a:r>
             <a:r>
               <a:rPr lang="en-IE" dirty="0" err="1" smtClean="0"/>
@@ -6450,16 +6437,11 @@
               <a:rPr lang="en-IE" dirty="0" smtClean="0"/>
               <a:t> - 2001</a:t>
             </a:r>
-            <a:endParaRPr lang="en-IE" dirty="0" smtClean="0"/>
           </a:p>
           <a:p>
             <a:r>
               <a:rPr lang="en-IE" dirty="0" smtClean="0"/>
-              <a:t>“Implementing Concurrent Data Objects</a:t>
-            </a:r>
-            <a:r>
-              <a:rPr lang="en-IE" dirty="0" smtClean="0"/>
-              <a:t>” – Herlihy - 1993</a:t>
+              <a:t>“Implementing Concurrent Data Objects” – Herlihy - 1993</a:t>
             </a:r>
             <a:endParaRPr lang="en-IE" dirty="0"/>
           </a:p>
@@ -6777,7 +6759,6 @@
               <a:rPr lang="en-IE" dirty="0" smtClean="0"/>
               <a:t>Ran each variation on each machine for multiple thread counts</a:t>
             </a:r>
-            <a:endParaRPr lang="en-IE" dirty="0" smtClean="0"/>
           </a:p>
           <a:p>
             <a:r>
@@ -6788,11 +6769,7 @@
           <a:p>
             <a:r>
               <a:rPr lang="en-IE" dirty="0" smtClean="0"/>
-              <a:t>Recorded iterations per </a:t>
-            </a:r>
-            <a:r>
-              <a:rPr lang="en-IE" dirty="0" smtClean="0"/>
-              <a:t>second against number of threads  </a:t>
+              <a:t>Recorded iterations per second against number of threads  </a:t>
             </a:r>
           </a:p>
           <a:p>

</xml_diff>

<commit_message>
Updated the fyp presentation
</commit_message>
<xml_diff>
--- a/Report/FYP_Presentation.pptx
+++ b/Report/FYP_Presentation.pptx
@@ -5,19 +5,24 @@
     <p:sldMasterId id="2147483648" r:id="rId1"/>
   </p:sldMasterIdLst>
   <p:notesMasterIdLst>
-    <p:notesMasterId r:id="rId12"/>
+    <p:notesMasterId r:id="rId17"/>
   </p:notesMasterIdLst>
   <p:sldIdLst>
     <p:sldId id="256" r:id="rId2"/>
     <p:sldId id="257" r:id="rId3"/>
-    <p:sldId id="258" r:id="rId4"/>
-    <p:sldId id="259" r:id="rId5"/>
-    <p:sldId id="260" r:id="rId6"/>
-    <p:sldId id="265" r:id="rId7"/>
-    <p:sldId id="261" r:id="rId8"/>
-    <p:sldId id="262" r:id="rId9"/>
-    <p:sldId id="264" r:id="rId10"/>
-    <p:sldId id="263" r:id="rId11"/>
+    <p:sldId id="266" r:id="rId4"/>
+    <p:sldId id="258" r:id="rId5"/>
+    <p:sldId id="259" r:id="rId6"/>
+    <p:sldId id="260" r:id="rId7"/>
+    <p:sldId id="267" r:id="rId8"/>
+    <p:sldId id="268" r:id="rId9"/>
+    <p:sldId id="269" r:id="rId10"/>
+    <p:sldId id="270" r:id="rId11"/>
+    <p:sldId id="265" r:id="rId12"/>
+    <p:sldId id="261" r:id="rId13"/>
+    <p:sldId id="262" r:id="rId14"/>
+    <p:sldId id="264" r:id="rId15"/>
+    <p:sldId id="263" r:id="rId16"/>
   </p:sldIdLst>
   <p:sldSz cx="9144000" cy="6858000" type="screen4x3"/>
   <p:notesSz cx="6858000" cy="9144000"/>
@@ -910,11 +915,11 @@
         </c:dLbls>
         <c:marker val="1"/>
         <c:smooth val="0"/>
-        <c:axId val="89086592"/>
-        <c:axId val="89113344"/>
+        <c:axId val="80246656"/>
+        <c:axId val="80265216"/>
       </c:lineChart>
       <c:catAx>
-        <c:axId val="89086592"/>
+        <c:axId val="80246656"/>
         <c:scaling>
           <c:orientation val="minMax"/>
         </c:scaling>
@@ -943,7 +948,7 @@
         <c:majorTickMark val="out"/>
         <c:minorTickMark val="none"/>
         <c:tickLblPos val="nextTo"/>
-        <c:crossAx val="89113344"/>
+        <c:crossAx val="80265216"/>
         <c:crosses val="autoZero"/>
         <c:auto val="1"/>
         <c:lblAlgn val="ctr"/>
@@ -951,7 +956,7 @@
         <c:noMultiLvlLbl val="0"/>
       </c:catAx>
       <c:valAx>
-        <c:axId val="89113344"/>
+        <c:axId val="80265216"/>
         <c:scaling>
           <c:orientation val="minMax"/>
         </c:scaling>
@@ -981,7 +986,7 @@
         <c:majorTickMark val="out"/>
         <c:minorTickMark val="none"/>
         <c:tickLblPos val="nextTo"/>
-        <c:crossAx val="89086592"/>
+        <c:crossAx val="80246656"/>
         <c:crosses val="autoZero"/>
         <c:crossBetween val="between"/>
       </c:valAx>
@@ -1792,11 +1797,11 @@
         </c:dLbls>
         <c:marker val="1"/>
         <c:smooth val="0"/>
-        <c:axId val="88952192"/>
-        <c:axId val="88974848"/>
+        <c:axId val="79063680"/>
+        <c:axId val="79078144"/>
       </c:lineChart>
       <c:catAx>
-        <c:axId val="88952192"/>
+        <c:axId val="79063680"/>
         <c:scaling>
           <c:orientation val="minMax"/>
         </c:scaling>
@@ -1825,7 +1830,7 @@
         <c:majorTickMark val="out"/>
         <c:minorTickMark val="none"/>
         <c:tickLblPos val="nextTo"/>
-        <c:crossAx val="88974848"/>
+        <c:crossAx val="79078144"/>
         <c:crosses val="autoZero"/>
         <c:auto val="1"/>
         <c:lblAlgn val="ctr"/>
@@ -1833,7 +1838,7 @@
         <c:noMultiLvlLbl val="0"/>
       </c:catAx>
       <c:valAx>
-        <c:axId val="88974848"/>
+        <c:axId val="79078144"/>
         <c:scaling>
           <c:orientation val="minMax"/>
         </c:scaling>
@@ -1863,7 +1868,7 @@
         <c:majorTickMark val="out"/>
         <c:minorTickMark val="none"/>
         <c:tickLblPos val="nextTo"/>
-        <c:crossAx val="88952192"/>
+        <c:crossAx val="79063680"/>
         <c:crosses val="autoZero"/>
         <c:crossBetween val="between"/>
       </c:valAx>
@@ -2235,11 +2240,11 @@
         </c:dLbls>
         <c:marker val="1"/>
         <c:smooth val="0"/>
-        <c:axId val="89013248"/>
-        <c:axId val="89019520"/>
+        <c:axId val="79113216"/>
+        <c:axId val="79119488"/>
       </c:lineChart>
       <c:catAx>
-        <c:axId val="89013248"/>
+        <c:axId val="79113216"/>
         <c:scaling>
           <c:orientation val="minMax"/>
         </c:scaling>
@@ -2268,7 +2273,7 @@
         <c:majorTickMark val="out"/>
         <c:minorTickMark val="none"/>
         <c:tickLblPos val="nextTo"/>
-        <c:crossAx val="89019520"/>
+        <c:crossAx val="79119488"/>
         <c:crosses val="autoZero"/>
         <c:auto val="1"/>
         <c:lblAlgn val="ctr"/>
@@ -2276,7 +2281,7 @@
         <c:noMultiLvlLbl val="0"/>
       </c:catAx>
       <c:valAx>
-        <c:axId val="89019520"/>
+        <c:axId val="79119488"/>
         <c:scaling>
           <c:orientation val="minMax"/>
         </c:scaling>
@@ -2306,7 +2311,7 @@
         <c:majorTickMark val="out"/>
         <c:minorTickMark val="none"/>
         <c:tickLblPos val="nextTo"/>
-        <c:crossAx val="89013248"/>
+        <c:crossAx val="79113216"/>
         <c:crosses val="autoZero"/>
         <c:crossBetween val="between"/>
       </c:valAx>
@@ -2526,11 +2531,11 @@
         </c:dLbls>
         <c:marker val="1"/>
         <c:smooth val="0"/>
-        <c:axId val="89062400"/>
-        <c:axId val="89457792"/>
+        <c:axId val="79158272"/>
+        <c:axId val="79164544"/>
       </c:lineChart>
       <c:catAx>
-        <c:axId val="89062400"/>
+        <c:axId val="79158272"/>
         <c:scaling>
           <c:orientation val="minMax"/>
         </c:scaling>
@@ -2559,7 +2564,7 @@
         <c:majorTickMark val="out"/>
         <c:minorTickMark val="none"/>
         <c:tickLblPos val="nextTo"/>
-        <c:crossAx val="89457792"/>
+        <c:crossAx val="79164544"/>
         <c:crosses val="autoZero"/>
         <c:auto val="1"/>
         <c:lblAlgn val="ctr"/>
@@ -2567,7 +2572,7 @@
         <c:noMultiLvlLbl val="0"/>
       </c:catAx>
       <c:valAx>
-        <c:axId val="89457792"/>
+        <c:axId val="79164544"/>
         <c:scaling>
           <c:orientation val="minMax"/>
         </c:scaling>
@@ -2597,7 +2602,7 @@
         <c:majorTickMark val="out"/>
         <c:minorTickMark val="none"/>
         <c:tickLblPos val="nextTo"/>
-        <c:crossAx val="89062400"/>
+        <c:crossAx val="79158272"/>
         <c:crosses val="autoZero"/>
         <c:crossBetween val="between"/>
       </c:valAx>
@@ -2699,7 +2704,7 @@
           <a:p>
             <a:fld id="{BC8F7A16-14FD-4EB5-B1E6-1AFC570F7645}" type="datetimeFigureOut">
               <a:rPr lang="en-IE" smtClean="0"/>
-              <a:t>27/03/2014</a:t>
+              <a:t>29/03/2014</a:t>
             </a:fld>
             <a:endParaRPr lang="en-IE"/>
           </a:p>
@@ -3032,7 +3037,7 @@
           <a:p>
             <a:fld id="{D42002D5-AFB6-45A7-9C98-D628785C3F80}" type="slidenum">
               <a:rPr lang="en-IE" smtClean="0"/>
-              <a:t>8</a:t>
+              <a:t>13</a:t>
             </a:fld>
             <a:endParaRPr lang="en-IE"/>
           </a:p>
@@ -3233,7 +3238,7 @@
             <a:fld id="{1D8BD707-D9CF-40AE-B4C6-C98DA3205C09}" type="datetimeFigureOut">
               <a:rPr lang="en-US" smtClean="0"/>
               <a:pPr/>
-              <a:t>3/27/2014</a:t>
+              <a:t>3/29/2014</a:t>
             </a:fld>
             <a:endParaRPr lang="en-US"/>
           </a:p>
@@ -3400,7 +3405,7 @@
             <a:fld id="{1D8BD707-D9CF-40AE-B4C6-C98DA3205C09}" type="datetimeFigureOut">
               <a:rPr lang="en-US" smtClean="0"/>
               <a:pPr/>
-              <a:t>3/27/2014</a:t>
+              <a:t>3/29/2014</a:t>
             </a:fld>
             <a:endParaRPr lang="en-US"/>
           </a:p>
@@ -3577,7 +3582,7 @@
             <a:fld id="{1D8BD707-D9CF-40AE-B4C6-C98DA3205C09}" type="datetimeFigureOut">
               <a:rPr lang="en-US" smtClean="0"/>
               <a:pPr/>
-              <a:t>3/27/2014</a:t>
+              <a:t>3/29/2014</a:t>
             </a:fld>
             <a:endParaRPr lang="en-US"/>
           </a:p>
@@ -3744,7 +3749,7 @@
             <a:fld id="{1D8BD707-D9CF-40AE-B4C6-C98DA3205C09}" type="datetimeFigureOut">
               <a:rPr lang="en-US" smtClean="0"/>
               <a:pPr/>
-              <a:t>3/27/2014</a:t>
+              <a:t>3/29/2014</a:t>
             </a:fld>
             <a:endParaRPr lang="en-US"/>
           </a:p>
@@ -3987,7 +3992,7 @@
             <a:fld id="{1D8BD707-D9CF-40AE-B4C6-C98DA3205C09}" type="datetimeFigureOut">
               <a:rPr lang="en-US" smtClean="0"/>
               <a:pPr/>
-              <a:t>3/27/2014</a:t>
+              <a:t>3/29/2014</a:t>
             </a:fld>
             <a:endParaRPr lang="en-US"/>
           </a:p>
@@ -4272,7 +4277,7 @@
             <a:fld id="{1D8BD707-D9CF-40AE-B4C6-C98DA3205C09}" type="datetimeFigureOut">
               <a:rPr lang="en-US" smtClean="0"/>
               <a:pPr/>
-              <a:t>3/27/2014</a:t>
+              <a:t>3/29/2014</a:t>
             </a:fld>
             <a:endParaRPr lang="en-US"/>
           </a:p>
@@ -4691,7 +4696,7 @@
             <a:fld id="{1D8BD707-D9CF-40AE-B4C6-C98DA3205C09}" type="datetimeFigureOut">
               <a:rPr lang="en-US" smtClean="0"/>
               <a:pPr/>
-              <a:t>3/27/2014</a:t>
+              <a:t>3/29/2014</a:t>
             </a:fld>
             <a:endParaRPr lang="en-US"/>
           </a:p>
@@ -4806,7 +4811,7 @@
             <a:fld id="{1D8BD707-D9CF-40AE-B4C6-C98DA3205C09}" type="datetimeFigureOut">
               <a:rPr lang="en-US" smtClean="0"/>
               <a:pPr/>
-              <a:t>3/27/2014</a:t>
+              <a:t>3/29/2014</a:t>
             </a:fld>
             <a:endParaRPr lang="en-US"/>
           </a:p>
@@ -4898,7 +4903,7 @@
             <a:fld id="{1D8BD707-D9CF-40AE-B4C6-C98DA3205C09}" type="datetimeFigureOut">
               <a:rPr lang="en-US" smtClean="0"/>
               <a:pPr/>
-              <a:t>3/27/2014</a:t>
+              <a:t>3/29/2014</a:t>
             </a:fld>
             <a:endParaRPr lang="en-US"/>
           </a:p>
@@ -5172,7 +5177,7 @@
             <a:fld id="{1D8BD707-D9CF-40AE-B4C6-C98DA3205C09}" type="datetimeFigureOut">
               <a:rPr lang="en-US" smtClean="0"/>
               <a:pPr/>
-              <a:t>3/27/2014</a:t>
+              <a:t>3/29/2014</a:t>
             </a:fld>
             <a:endParaRPr lang="en-US"/>
           </a:p>
@@ -5422,7 +5427,7 @@
             <a:fld id="{1D8BD707-D9CF-40AE-B4C6-C98DA3205C09}" type="datetimeFigureOut">
               <a:rPr lang="en-US" smtClean="0"/>
               <a:pPr/>
-              <a:t>3/27/2014</a:t>
+              <a:t>3/29/2014</a:t>
             </a:fld>
             <a:endParaRPr lang="en-US"/>
           </a:p>
@@ -5632,7 +5637,7 @@
             <a:fld id="{1D8BD707-D9CF-40AE-B4C6-C98DA3205C09}" type="datetimeFigureOut">
               <a:rPr lang="en-US" smtClean="0"/>
               <a:pPr/>
-              <a:t>3/27/2014</a:t>
+              <a:t>3/29/2014</a:t>
             </a:fld>
             <a:endParaRPr lang="en-US"/>
           </a:p>
@@ -6095,6 +6100,587 @@
           <a:p>
             <a:r>
               <a:rPr lang="en-IE" dirty="0" smtClean="0"/>
+              <a:t>Hash Table</a:t>
+            </a:r>
+            <a:endParaRPr lang="en-IE" dirty="0"/>
+          </a:p>
+        </p:txBody>
+      </p:sp>
+      <p:sp>
+        <p:nvSpPr>
+          <p:cNvPr id="3" name="Content Placeholder 2"/>
+          <p:cNvSpPr>
+            <a:spLocks noGrp="1"/>
+          </p:cNvSpPr>
+          <p:nvPr>
+            <p:ph idx="1"/>
+          </p:nvPr>
+        </p:nvSpPr>
+        <p:spPr/>
+        <p:txBody>
+          <a:bodyPr/>
+          <a:lstStyle/>
+          <a:p>
+            <a:r>
+              <a:rPr lang="en-IE" dirty="0" smtClean="0"/>
+              <a:t>Closed Addressing – Collisions are added onto a linked list</a:t>
+            </a:r>
+          </a:p>
+          <a:p>
+            <a:r>
+              <a:rPr lang="en-IE" smtClean="0"/>
+              <a:t>Contains/Add/Remove/Resize</a:t>
+            </a:r>
+            <a:endParaRPr lang="en-IE" dirty="0" smtClean="0"/>
+          </a:p>
+          <a:p>
+            <a:r>
+              <a:rPr lang="en-IE" dirty="0" smtClean="0"/>
+              <a:t>Globally Locked Hash Table </a:t>
+            </a:r>
+          </a:p>
+          <a:p>
+            <a:r>
+              <a:rPr lang="en-IE" dirty="0" smtClean="0"/>
+              <a:t>Lock Per List </a:t>
+            </a:r>
+          </a:p>
+          <a:p>
+            <a:r>
+              <a:rPr lang="en-IE" dirty="0" smtClean="0"/>
+              <a:t>Lockless</a:t>
+            </a:r>
+            <a:endParaRPr lang="en-IE" dirty="0"/>
+          </a:p>
+        </p:txBody>
+      </p:sp>
+    </p:spTree>
+    <p:extLst>
+      <p:ext uri="{BB962C8B-B14F-4D97-AF65-F5344CB8AC3E}">
+        <p14:creationId xmlns:p14="http://schemas.microsoft.com/office/powerpoint/2010/main" val="227156003"/>
+      </p:ext>
+    </p:extLst>
+  </p:cSld>
+  <p:clrMapOvr>
+    <a:masterClrMapping/>
+  </p:clrMapOvr>
+</p:sld>
+</file>
+
+<file path=ppt/slides/slide11.xml><?xml version="1.0" encoding="utf-8"?>
+<p:sld xmlns:a="http://schemas.openxmlformats.org/drawingml/2006/main" xmlns:r="http://schemas.openxmlformats.org/officeDocument/2006/relationships" xmlns:p="http://schemas.openxmlformats.org/presentationml/2006/main">
+  <p:cSld>
+    <p:spTree>
+      <p:nvGrpSpPr>
+        <p:cNvPr id="1" name=""/>
+        <p:cNvGrpSpPr/>
+        <p:nvPr/>
+      </p:nvGrpSpPr>
+      <p:grpSpPr>
+        <a:xfrm>
+          <a:off x="0" y="0"/>
+          <a:ext cx="0" cy="0"/>
+          <a:chOff x="0" y="0"/>
+          <a:chExt cx="0" cy="0"/>
+        </a:xfrm>
+      </p:grpSpPr>
+      <p:sp>
+        <p:nvSpPr>
+          <p:cNvPr id="2" name="Title 1"/>
+          <p:cNvSpPr>
+            <a:spLocks noGrp="1"/>
+          </p:cNvSpPr>
+          <p:nvPr>
+            <p:ph type="title"/>
+          </p:nvPr>
+        </p:nvSpPr>
+        <p:spPr/>
+        <p:txBody>
+          <a:bodyPr/>
+          <a:lstStyle/>
+          <a:p>
+            <a:r>
+              <a:rPr lang="en-IE" dirty="0" smtClean="0"/>
+              <a:t>Data Structure Variations</a:t>
+            </a:r>
+            <a:endParaRPr lang="en-IE" dirty="0"/>
+          </a:p>
+        </p:txBody>
+      </p:sp>
+      <p:sp>
+        <p:nvSpPr>
+          <p:cNvPr id="3" name="Content Placeholder 2"/>
+          <p:cNvSpPr>
+            <a:spLocks noGrp="1"/>
+          </p:cNvSpPr>
+          <p:nvPr>
+            <p:ph idx="1"/>
+          </p:nvPr>
+        </p:nvSpPr>
+        <p:spPr/>
+        <p:txBody>
+          <a:bodyPr>
+            <a:normAutofit fontScale="77500" lnSpcReduction="20000"/>
+          </a:bodyPr>
+          <a:lstStyle/>
+          <a:p>
+            <a:endParaRPr lang="en-IE" dirty="0" smtClean="0"/>
+          </a:p>
+          <a:p>
+            <a:r>
+              <a:rPr lang="en-IE" dirty="0" smtClean="0"/>
+              <a:t>MPMC Hash Table Closed Addressing</a:t>
+            </a:r>
+          </a:p>
+          <a:p>
+            <a:pPr lvl="1"/>
+            <a:r>
+              <a:rPr lang="en-IE" dirty="0" smtClean="0"/>
+              <a:t>Locked Table</a:t>
+            </a:r>
+          </a:p>
+          <a:p>
+            <a:pPr lvl="1"/>
+            <a:r>
+              <a:rPr lang="en-IE" dirty="0" smtClean="0"/>
+              <a:t>Lock per Bucket</a:t>
+            </a:r>
+          </a:p>
+          <a:p>
+            <a:pPr lvl="1"/>
+            <a:r>
+              <a:rPr lang="en-IE" dirty="0" smtClean="0"/>
+              <a:t>Lockless</a:t>
+            </a:r>
+          </a:p>
+          <a:p>
+            <a:r>
+              <a:rPr lang="en-IE" dirty="0" smtClean="0"/>
+              <a:t>MPMC Linked List</a:t>
+            </a:r>
+          </a:p>
+          <a:p>
+            <a:pPr lvl="1"/>
+            <a:r>
+              <a:rPr lang="en-IE" dirty="0" smtClean="0"/>
+              <a:t>Single Link Regular Locked/Lockless</a:t>
+            </a:r>
+          </a:p>
+          <a:p>
+            <a:pPr lvl="1"/>
+            <a:r>
+              <a:rPr lang="en-IE" dirty="0" smtClean="0"/>
+              <a:t>Double Link Buffer Locked/Lockless</a:t>
+            </a:r>
+          </a:p>
+          <a:p>
+            <a:pPr lvl="1"/>
+            <a:r>
+              <a:rPr lang="en-IE" dirty="0" smtClean="0"/>
+              <a:t>Single Link Buffer Locked/Lockless</a:t>
+            </a:r>
+          </a:p>
+          <a:p>
+            <a:r>
+              <a:rPr lang="en-IE" dirty="0" smtClean="0"/>
+              <a:t>Ring Buffer</a:t>
+            </a:r>
+          </a:p>
+          <a:p>
+            <a:pPr lvl="1"/>
+            <a:r>
+              <a:rPr lang="en-IE" dirty="0" smtClean="0"/>
+              <a:t>MPMC Locked</a:t>
+            </a:r>
+          </a:p>
+          <a:p>
+            <a:pPr lvl="1"/>
+            <a:r>
+              <a:rPr lang="en-IE" dirty="0" smtClean="0"/>
+              <a:t>SPSC Lockless</a:t>
+            </a:r>
+          </a:p>
+          <a:p>
+            <a:pPr lvl="1"/>
+            <a:endParaRPr lang="en-IE" dirty="0"/>
+          </a:p>
+        </p:txBody>
+      </p:sp>
+    </p:spTree>
+    <p:extLst>
+      <p:ext uri="{BB962C8B-B14F-4D97-AF65-F5344CB8AC3E}">
+        <p14:creationId xmlns:p14="http://schemas.microsoft.com/office/powerpoint/2010/main" val="546634564"/>
+      </p:ext>
+    </p:extLst>
+  </p:cSld>
+  <p:clrMapOvr>
+    <a:masterClrMapping/>
+  </p:clrMapOvr>
+</p:sld>
+</file>
+
+<file path=ppt/slides/slide12.xml><?xml version="1.0" encoding="utf-8"?>
+<p:sld xmlns:a="http://schemas.openxmlformats.org/drawingml/2006/main" xmlns:r="http://schemas.openxmlformats.org/officeDocument/2006/relationships" xmlns:p="http://schemas.openxmlformats.org/presentationml/2006/main">
+  <p:cSld>
+    <p:spTree>
+      <p:nvGrpSpPr>
+        <p:cNvPr id="1" name=""/>
+        <p:cNvGrpSpPr/>
+        <p:nvPr/>
+      </p:nvGrpSpPr>
+      <p:grpSpPr>
+        <a:xfrm>
+          <a:off x="0" y="0"/>
+          <a:ext cx="0" cy="0"/>
+          <a:chOff x="0" y="0"/>
+          <a:chExt cx="0" cy="0"/>
+        </a:xfrm>
+      </p:grpSpPr>
+      <p:sp>
+        <p:nvSpPr>
+          <p:cNvPr id="2" name="Title 1"/>
+          <p:cNvSpPr>
+            <a:spLocks noGrp="1"/>
+          </p:cNvSpPr>
+          <p:nvPr>
+            <p:ph type="title"/>
+          </p:nvPr>
+        </p:nvSpPr>
+        <p:spPr/>
+        <p:txBody>
+          <a:bodyPr/>
+          <a:lstStyle/>
+          <a:p>
+            <a:r>
+              <a:rPr lang="en-IE" dirty="0" smtClean="0"/>
+              <a:t>Evaluation</a:t>
+            </a:r>
+            <a:endParaRPr lang="en-IE" dirty="0"/>
+          </a:p>
+        </p:txBody>
+      </p:sp>
+      <p:sp>
+        <p:nvSpPr>
+          <p:cNvPr id="3" name="Content Placeholder 2"/>
+          <p:cNvSpPr>
+            <a:spLocks noGrp="1"/>
+          </p:cNvSpPr>
+          <p:nvPr>
+            <p:ph idx="1"/>
+          </p:nvPr>
+        </p:nvSpPr>
+        <p:spPr/>
+        <p:txBody>
+          <a:bodyPr/>
+          <a:lstStyle/>
+          <a:p>
+            <a:r>
+              <a:rPr lang="en-IE" dirty="0" smtClean="0"/>
+              <a:t>Ran each variation on each machine for multiple thread counts</a:t>
+            </a:r>
+          </a:p>
+          <a:p>
+            <a:r>
+              <a:rPr lang="en-IE" dirty="0" smtClean="0"/>
+              <a:t>Thread count went from 1-128</a:t>
+            </a:r>
+          </a:p>
+          <a:p>
+            <a:r>
+              <a:rPr lang="en-IE" dirty="0" smtClean="0"/>
+              <a:t>Recorded iterations per second against number of threads  </a:t>
+            </a:r>
+          </a:p>
+          <a:p>
+            <a:r>
+              <a:rPr lang="en-IE" dirty="0" smtClean="0"/>
+              <a:t>Used </a:t>
+            </a:r>
+            <a:r>
+              <a:rPr lang="en-IE" dirty="0" err="1" smtClean="0"/>
+              <a:t>Perf</a:t>
+            </a:r>
+            <a:r>
+              <a:rPr lang="en-IE" dirty="0" smtClean="0"/>
+              <a:t> to record cache misses, </a:t>
+            </a:r>
+            <a:r>
+              <a:rPr lang="en-IE" dirty="0" err="1" smtClean="0"/>
+              <a:t>cpu</a:t>
+            </a:r>
+            <a:r>
+              <a:rPr lang="en-IE" dirty="0" smtClean="0"/>
+              <a:t> cycles etc…</a:t>
+            </a:r>
+            <a:endParaRPr lang="en-IE" dirty="0"/>
+          </a:p>
+        </p:txBody>
+      </p:sp>
+    </p:spTree>
+    <p:extLst>
+      <p:ext uri="{BB962C8B-B14F-4D97-AF65-F5344CB8AC3E}">
+        <p14:creationId xmlns:p14="http://schemas.microsoft.com/office/powerpoint/2010/main" val="792295864"/>
+      </p:ext>
+    </p:extLst>
+  </p:cSld>
+  <p:clrMapOvr>
+    <a:masterClrMapping/>
+  </p:clrMapOvr>
+  <p:timing>
+    <p:tnLst>
+      <p:par>
+        <p:cTn id="1" dur="indefinite" restart="never" nodeType="tmRoot"/>
+      </p:par>
+    </p:tnLst>
+  </p:timing>
+</p:sld>
+</file>
+
+<file path=ppt/slides/slide13.xml><?xml version="1.0" encoding="utf-8"?>
+<p:sld xmlns:a="http://schemas.openxmlformats.org/drawingml/2006/main" xmlns:r="http://schemas.openxmlformats.org/officeDocument/2006/relationships" xmlns:p="http://schemas.openxmlformats.org/presentationml/2006/main">
+  <p:cSld>
+    <p:spTree>
+      <p:nvGrpSpPr>
+        <p:cNvPr id="1" name=""/>
+        <p:cNvGrpSpPr/>
+        <p:nvPr/>
+      </p:nvGrpSpPr>
+      <p:grpSpPr>
+        <a:xfrm>
+          <a:off x="0" y="0"/>
+          <a:ext cx="0" cy="0"/>
+          <a:chOff x="0" y="0"/>
+          <a:chExt cx="0" cy="0"/>
+        </a:xfrm>
+      </p:grpSpPr>
+      <p:sp>
+        <p:nvSpPr>
+          <p:cNvPr id="2" name="Title 1"/>
+          <p:cNvSpPr>
+            <a:spLocks noGrp="1"/>
+          </p:cNvSpPr>
+          <p:nvPr>
+            <p:ph type="title"/>
+          </p:nvPr>
+        </p:nvSpPr>
+        <p:spPr/>
+        <p:txBody>
+          <a:bodyPr/>
+          <a:lstStyle/>
+          <a:p>
+            <a:r>
+              <a:rPr lang="en-IE" dirty="0" smtClean="0"/>
+              <a:t>Results &amp; Analysis</a:t>
+            </a:r>
+            <a:endParaRPr lang="en-IE" dirty="0"/>
+          </a:p>
+        </p:txBody>
+      </p:sp>
+      <p:graphicFrame>
+        <p:nvGraphicFramePr>
+          <p:cNvPr id="6" name="Chart 5"/>
+          <p:cNvGraphicFramePr>
+            <a:graphicFrameLocks/>
+          </p:cNvGraphicFramePr>
+          <p:nvPr>
+            <p:extLst>
+              <p:ext uri="{D42A27DB-BD31-4B8C-83A1-F6EECF244321}">
+                <p14:modId xmlns:p14="http://schemas.microsoft.com/office/powerpoint/2010/main" val="2500187400"/>
+              </p:ext>
+            </p:extLst>
+          </p:nvPr>
+        </p:nvGraphicFramePr>
+        <p:xfrm>
+          <a:off x="4495800" y="1600200"/>
+          <a:ext cx="4191000" cy="4572000"/>
+        </p:xfrm>
+        <a:graphic>
+          <a:graphicData uri="http://schemas.openxmlformats.org/drawingml/2006/chart">
+            <c:chart xmlns:c="http://schemas.openxmlformats.org/drawingml/2006/chart" xmlns:r="http://schemas.openxmlformats.org/officeDocument/2006/relationships" r:id="rId3"/>
+          </a:graphicData>
+        </a:graphic>
+      </p:graphicFrame>
+      <p:graphicFrame>
+        <p:nvGraphicFramePr>
+          <p:cNvPr id="7" name="Content Placeholder 6"/>
+          <p:cNvGraphicFramePr>
+            <a:graphicFrameLocks noGrp="1"/>
+          </p:cNvGraphicFramePr>
+          <p:nvPr>
+            <p:ph idx="1"/>
+            <p:extLst>
+              <p:ext uri="{D42A27DB-BD31-4B8C-83A1-F6EECF244321}">
+                <p14:modId xmlns:p14="http://schemas.microsoft.com/office/powerpoint/2010/main" val="4119368994"/>
+              </p:ext>
+            </p:extLst>
+          </p:nvPr>
+        </p:nvGraphicFramePr>
+        <p:xfrm>
+          <a:off x="457200" y="1600200"/>
+          <a:ext cx="4343400" cy="4525963"/>
+        </p:xfrm>
+        <a:graphic>
+          <a:graphicData uri="http://schemas.openxmlformats.org/drawingml/2006/chart">
+            <c:chart xmlns:c="http://schemas.openxmlformats.org/drawingml/2006/chart" xmlns:r="http://schemas.openxmlformats.org/officeDocument/2006/relationships" r:id="rId4"/>
+          </a:graphicData>
+        </a:graphic>
+      </p:graphicFrame>
+    </p:spTree>
+    <p:extLst>
+      <p:ext uri="{BB962C8B-B14F-4D97-AF65-F5344CB8AC3E}">
+        <p14:creationId xmlns:p14="http://schemas.microsoft.com/office/powerpoint/2010/main" val="1432556800"/>
+      </p:ext>
+    </p:extLst>
+  </p:cSld>
+  <p:clrMapOvr>
+    <a:masterClrMapping/>
+  </p:clrMapOvr>
+  <p:timing>
+    <p:tnLst>
+      <p:par>
+        <p:cTn id="1" dur="indefinite" restart="never" nodeType="tmRoot"/>
+      </p:par>
+    </p:tnLst>
+  </p:timing>
+</p:sld>
+</file>
+
+<file path=ppt/slides/slide14.xml><?xml version="1.0" encoding="utf-8"?>
+<p:sld xmlns:a="http://schemas.openxmlformats.org/drawingml/2006/main" xmlns:r="http://schemas.openxmlformats.org/officeDocument/2006/relationships" xmlns:p="http://schemas.openxmlformats.org/presentationml/2006/main">
+  <p:cSld>
+    <p:spTree>
+      <p:nvGrpSpPr>
+        <p:cNvPr id="1" name=""/>
+        <p:cNvGrpSpPr/>
+        <p:nvPr/>
+      </p:nvGrpSpPr>
+      <p:grpSpPr>
+        <a:xfrm>
+          <a:off x="0" y="0"/>
+          <a:ext cx="0" cy="0"/>
+          <a:chOff x="0" y="0"/>
+          <a:chExt cx="0" cy="0"/>
+        </a:xfrm>
+      </p:grpSpPr>
+      <p:sp>
+        <p:nvSpPr>
+          <p:cNvPr id="2" name="Title 1"/>
+          <p:cNvSpPr>
+            <a:spLocks noGrp="1"/>
+          </p:cNvSpPr>
+          <p:nvPr>
+            <p:ph type="title"/>
+          </p:nvPr>
+        </p:nvSpPr>
+        <p:spPr/>
+        <p:txBody>
+          <a:bodyPr/>
+          <a:lstStyle/>
+          <a:p>
+            <a:r>
+              <a:rPr lang="en-IE" dirty="0" smtClean="0"/>
+              <a:t>Results &amp; Analysis</a:t>
+            </a:r>
+            <a:endParaRPr lang="en-IE" dirty="0"/>
+          </a:p>
+        </p:txBody>
+      </p:sp>
+      <p:graphicFrame>
+        <p:nvGraphicFramePr>
+          <p:cNvPr id="9" name="Content Placeholder 8"/>
+          <p:cNvGraphicFramePr>
+            <a:graphicFrameLocks noGrp="1"/>
+          </p:cNvGraphicFramePr>
+          <p:nvPr>
+            <p:ph idx="1"/>
+            <p:extLst>
+              <p:ext uri="{D42A27DB-BD31-4B8C-83A1-F6EECF244321}">
+                <p14:modId xmlns:p14="http://schemas.microsoft.com/office/powerpoint/2010/main" val="2781748911"/>
+              </p:ext>
+            </p:extLst>
+          </p:nvPr>
+        </p:nvGraphicFramePr>
+        <p:xfrm>
+          <a:off x="457200" y="1600200"/>
+          <a:ext cx="3505200" cy="4525963"/>
+        </p:xfrm>
+        <a:graphic>
+          <a:graphicData uri="http://schemas.openxmlformats.org/drawingml/2006/chart">
+            <c:chart xmlns:c="http://schemas.openxmlformats.org/drawingml/2006/chart" xmlns:r="http://schemas.openxmlformats.org/officeDocument/2006/relationships" r:id="rId2"/>
+          </a:graphicData>
+        </a:graphic>
+      </p:graphicFrame>
+      <p:graphicFrame>
+        <p:nvGraphicFramePr>
+          <p:cNvPr id="10" name="Chart 9"/>
+          <p:cNvGraphicFramePr>
+            <a:graphicFrameLocks/>
+          </p:cNvGraphicFramePr>
+          <p:nvPr>
+            <p:extLst>
+              <p:ext uri="{D42A27DB-BD31-4B8C-83A1-F6EECF244321}">
+                <p14:modId xmlns:p14="http://schemas.microsoft.com/office/powerpoint/2010/main" val="2761141773"/>
+              </p:ext>
+            </p:extLst>
+          </p:nvPr>
+        </p:nvGraphicFramePr>
+        <p:xfrm>
+          <a:off x="4191000" y="1676400"/>
+          <a:ext cx="4953000" cy="5029200"/>
+        </p:xfrm>
+        <a:graphic>
+          <a:graphicData uri="http://schemas.openxmlformats.org/drawingml/2006/chart">
+            <c:chart xmlns:c="http://schemas.openxmlformats.org/drawingml/2006/chart" xmlns:r="http://schemas.openxmlformats.org/officeDocument/2006/relationships" r:id="rId3"/>
+          </a:graphicData>
+        </a:graphic>
+      </p:graphicFrame>
+    </p:spTree>
+    <p:extLst>
+      <p:ext uri="{BB962C8B-B14F-4D97-AF65-F5344CB8AC3E}">
+        <p14:creationId xmlns:p14="http://schemas.microsoft.com/office/powerpoint/2010/main" val="469012117"/>
+      </p:ext>
+    </p:extLst>
+  </p:cSld>
+  <p:clrMapOvr>
+    <a:masterClrMapping/>
+  </p:clrMapOvr>
+</p:sld>
+</file>
+
+<file path=ppt/slides/slide15.xml><?xml version="1.0" encoding="utf-8"?>
+<p:sld xmlns:a="http://schemas.openxmlformats.org/drawingml/2006/main" xmlns:r="http://schemas.openxmlformats.org/officeDocument/2006/relationships" xmlns:p="http://schemas.openxmlformats.org/presentationml/2006/main">
+  <p:cSld>
+    <p:spTree>
+      <p:nvGrpSpPr>
+        <p:cNvPr id="1" name=""/>
+        <p:cNvGrpSpPr/>
+        <p:nvPr/>
+      </p:nvGrpSpPr>
+      <p:grpSpPr>
+        <a:xfrm>
+          <a:off x="0" y="0"/>
+          <a:ext cx="0" cy="0"/>
+          <a:chOff x="0" y="0"/>
+          <a:chExt cx="0" cy="0"/>
+        </a:xfrm>
+      </p:grpSpPr>
+      <p:sp>
+        <p:nvSpPr>
+          <p:cNvPr id="2" name="Title 1"/>
+          <p:cNvSpPr>
+            <a:spLocks noGrp="1"/>
+          </p:cNvSpPr>
+          <p:nvPr>
+            <p:ph type="title"/>
+          </p:nvPr>
+        </p:nvSpPr>
+        <p:spPr/>
+        <p:txBody>
+          <a:bodyPr/>
+          <a:lstStyle/>
+          <a:p>
+            <a:r>
+              <a:rPr lang="en-IE" dirty="0" smtClean="0"/>
               <a:t>What have </a:t>
             </a:r>
             <a:r>
@@ -6222,28 +6808,34 @@
           <a:p>
             <a:r>
               <a:rPr lang="en-IE" dirty="0" smtClean="0"/>
-              <a:t>Plenty of work done on how to implement concurrent objects</a:t>
+              <a:t>Concurrent Data Structure – Designed for access by multiple threads</a:t>
             </a:r>
           </a:p>
           <a:p>
             <a:r>
               <a:rPr lang="en-IE" dirty="0" smtClean="0"/>
-              <a:t>Not much </a:t>
-            </a:r>
-            <a:r>
-              <a:rPr lang="en-IE" smtClean="0"/>
-              <a:t>data on comparing </a:t>
+              <a:t>Plenty </a:t>
             </a:r>
             <a:r>
               <a:rPr lang="en-IE" dirty="0" smtClean="0"/>
-              <a:t>the different types of concurrent data structure</a:t>
-            </a:r>
-          </a:p>
-          <a:p>
+              <a:t>of work done on how to implement concurrent </a:t>
+            </a:r>
             <a:r>
               <a:rPr lang="en-IE" dirty="0" smtClean="0"/>
-              <a:t>Locked, Lock-free, Wait-free</a:t>
-            </a:r>
+              <a:t>data structures</a:t>
+            </a:r>
+            <a:endParaRPr lang="en-IE" dirty="0" smtClean="0"/>
+          </a:p>
+          <a:p>
+            <a:r>
+              <a:rPr lang="en-IE" dirty="0" smtClean="0"/>
+              <a:t>Not much data on comparing the different types of concurrent data </a:t>
+            </a:r>
+            <a:r>
+              <a:rPr lang="en-IE" dirty="0" smtClean="0"/>
+              <a:t>structure</a:t>
+            </a:r>
+            <a:endParaRPr lang="en-IE" dirty="0" smtClean="0"/>
           </a:p>
         </p:txBody>
       </p:sp>
@@ -6294,7 +6886,7 @@
           <a:p>
             <a:r>
               <a:rPr lang="en-IE" dirty="0" smtClean="0"/>
-              <a:t>Why is it Important?</a:t>
+              <a:t>Locking Algorithms</a:t>
             </a:r>
             <a:endParaRPr lang="en-IE" dirty="0"/>
           </a:p>
@@ -6317,19 +6909,19 @@
           <a:p>
             <a:r>
               <a:rPr lang="en-IE" dirty="0" smtClean="0"/>
-              <a:t>Potential for high scalability</a:t>
+              <a:t>Locked – Uses mutexes, semaphores to acquire a lock, blocks threads that do not have the lock</a:t>
             </a:r>
           </a:p>
           <a:p>
             <a:r>
               <a:rPr lang="en-IE" dirty="0" smtClean="0"/>
-              <a:t>Increased Speeds</a:t>
+              <a:t>Lock Free – Uses atomic instructions such as compare-and-swap. Guarantees system-wide throughput with the chance of starvation</a:t>
             </a:r>
           </a:p>
           <a:p>
             <a:r>
               <a:rPr lang="en-IE" dirty="0" smtClean="0"/>
-              <a:t>Know when to apply different locking techniques</a:t>
+              <a:t>Wait Free – Similar to lock free but is also starvation free</a:t>
             </a:r>
             <a:endParaRPr lang="en-IE" dirty="0"/>
           </a:p>
@@ -6338,7 +6930,7 @@
     </p:spTree>
     <p:extLst>
       <p:ext uri="{BB962C8B-B14F-4D97-AF65-F5344CB8AC3E}">
-        <p14:creationId xmlns:p14="http://schemas.microsoft.com/office/powerpoint/2010/main" val="3358584582"/>
+        <p14:creationId xmlns:p14="http://schemas.microsoft.com/office/powerpoint/2010/main" val="1363304196"/>
       </p:ext>
     </p:extLst>
   </p:cSld>
@@ -6377,72 +6969,65 @@
         </p:nvSpPr>
         <p:spPr/>
         <p:txBody>
+          <a:bodyPr>
+            <a:normAutofit fontScale="90000"/>
+          </a:bodyPr>
+          <a:lstStyle/>
+          <a:p>
+            <a:r>
+              <a:rPr lang="en-IE" dirty="0" smtClean="0"/>
+              <a:t>Why </a:t>
+            </a:r>
+            <a:r>
+              <a:rPr lang="en-IE" dirty="0" smtClean="0"/>
+              <a:t>are Concurrent Data </a:t>
+            </a:r>
+            <a:br>
+              <a:rPr lang="en-IE" dirty="0" smtClean="0"/>
+            </a:br>
+            <a:r>
+              <a:rPr lang="en-IE" dirty="0" smtClean="0"/>
+              <a:t>Structures Important</a:t>
+            </a:r>
+            <a:r>
+              <a:rPr lang="en-IE" dirty="0" smtClean="0"/>
+              <a:t>?</a:t>
+            </a:r>
+            <a:endParaRPr lang="en-IE" dirty="0"/>
+          </a:p>
+        </p:txBody>
+      </p:sp>
+      <p:sp>
+        <p:nvSpPr>
+          <p:cNvPr id="3" name="Content Placeholder 2"/>
+          <p:cNvSpPr>
+            <a:spLocks noGrp="1"/>
+          </p:cNvSpPr>
+          <p:nvPr>
+            <p:ph idx="1"/>
+          </p:nvPr>
+        </p:nvSpPr>
+        <p:spPr/>
+        <p:txBody>
           <a:bodyPr/>
           <a:lstStyle/>
           <a:p>
             <a:r>
               <a:rPr lang="en-IE" dirty="0" smtClean="0"/>
-              <a:t>Others’ Work</a:t>
-            </a:r>
-            <a:endParaRPr lang="en-IE" dirty="0"/>
-          </a:p>
-        </p:txBody>
-      </p:sp>
-      <p:sp>
-        <p:nvSpPr>
-          <p:cNvPr id="3" name="Content Placeholder 2"/>
-          <p:cNvSpPr>
-            <a:spLocks noGrp="1"/>
-          </p:cNvSpPr>
-          <p:nvPr>
-            <p:ph idx="1"/>
-          </p:nvPr>
-        </p:nvSpPr>
-        <p:spPr/>
-        <p:txBody>
-          <a:bodyPr/>
-          <a:lstStyle/>
+              <a:t>Potential for high scalability</a:t>
+            </a:r>
+          </a:p>
           <a:p>
             <a:r>
               <a:rPr lang="en-IE" dirty="0" smtClean="0"/>
-              <a:t>“The Art of Multiprocessor Programming”- Herlihy &amp; </a:t>
-            </a:r>
-            <a:r>
-              <a:rPr lang="en-IE" dirty="0" err="1" smtClean="0"/>
-              <a:t>Shavit</a:t>
-            </a:r>
-            <a:r>
-              <a:rPr lang="en-IE" dirty="0" smtClean="0"/>
-              <a:t> - 2008</a:t>
-            </a:r>
-          </a:p>
-          <a:p>
-            <a:r>
-              <a:rPr lang="en-IE" dirty="0" smtClean="0"/>
-              <a:t>“Designing Concurrent Data Structures” – </a:t>
-            </a:r>
-            <a:r>
-              <a:rPr lang="en-IE" dirty="0" err="1" smtClean="0"/>
-              <a:t>Moir</a:t>
-            </a:r>
-            <a:r>
-              <a:rPr lang="en-IE" dirty="0" smtClean="0"/>
-              <a:t> &amp; </a:t>
-            </a:r>
-            <a:r>
-              <a:rPr lang="en-IE" dirty="0" err="1" smtClean="0"/>
-              <a:t>Shavit</a:t>
-            </a:r>
-            <a:r>
-              <a:rPr lang="en-IE" dirty="0" smtClean="0"/>
-              <a:t> - 2001</a:t>
-            </a:r>
-          </a:p>
-          <a:p>
-            <a:r>
-              <a:rPr lang="en-IE" dirty="0" smtClean="0"/>
-              <a:t>“Implementing Concurrent Data Objects” – Herlihy - 1993</a:t>
-            </a:r>
+              <a:t>Better performance than serial implementations of the same data structure</a:t>
+            </a:r>
+            <a:endParaRPr lang="en-IE" dirty="0" smtClean="0"/>
+          </a:p>
+          <a:p>
+            <a:pPr marL="0" indent="0">
+              <a:buNone/>
+            </a:pPr>
             <a:endParaRPr lang="en-IE" dirty="0"/>
           </a:p>
         </p:txBody>
@@ -6450,7 +7035,7 @@
     </p:spTree>
     <p:extLst>
       <p:ext uri="{BB962C8B-B14F-4D97-AF65-F5344CB8AC3E}">
-        <p14:creationId xmlns:p14="http://schemas.microsoft.com/office/powerpoint/2010/main" val="330873260"/>
+        <p14:creationId xmlns:p14="http://schemas.microsoft.com/office/powerpoint/2010/main" val="3358584582"/>
       </p:ext>
     </p:extLst>
   </p:cSld>
@@ -6494,7 +7079,7 @@
           <a:p>
             <a:r>
               <a:rPr lang="en-IE" dirty="0" smtClean="0"/>
-              <a:t>What I have Done</a:t>
+              <a:t>Background Work</a:t>
             </a:r>
             <a:endParaRPr lang="en-IE" dirty="0"/>
           </a:p>
@@ -6517,19 +7102,57 @@
           <a:p>
             <a:r>
               <a:rPr lang="en-IE" dirty="0" smtClean="0"/>
-              <a:t>Implemented 3 concurrent data structures</a:t>
-            </a:r>
-          </a:p>
-          <a:p>
+              <a:t>Some of my r</a:t>
+            </a:r>
             <a:r>
               <a:rPr lang="en-IE" dirty="0" smtClean="0"/>
-              <a:t>Implemented both locked and lock-free variations</a:t>
+              <a:t>eferences:</a:t>
             </a:r>
           </a:p>
           <a:p>
             <a:r>
               <a:rPr lang="en-IE" dirty="0" smtClean="0"/>
-              <a:t>Tested &amp; compared them on 3 different systems</a:t>
+              <a:t>“</a:t>
+            </a:r>
+            <a:r>
+              <a:rPr lang="en-IE" dirty="0" smtClean="0"/>
+              <a:t>The Art of Multiprocessor Programming”- Herlihy &amp; </a:t>
+            </a:r>
+            <a:r>
+              <a:rPr lang="en-IE" dirty="0" err="1" smtClean="0"/>
+              <a:t>Shavit</a:t>
+            </a:r>
+            <a:r>
+              <a:rPr lang="en-IE" dirty="0" smtClean="0"/>
+              <a:t> - 2008</a:t>
+            </a:r>
+          </a:p>
+          <a:p>
+            <a:r>
+              <a:rPr lang="en-IE" dirty="0" smtClean="0"/>
+              <a:t>“Designing Concurrent Data Structures” – </a:t>
+            </a:r>
+            <a:r>
+              <a:rPr lang="en-IE" dirty="0" err="1" smtClean="0"/>
+              <a:t>Moir</a:t>
+            </a:r>
+            <a:r>
+              <a:rPr lang="en-IE" dirty="0" smtClean="0"/>
+              <a:t> &amp; </a:t>
+            </a:r>
+            <a:r>
+              <a:rPr lang="en-IE" dirty="0" err="1" smtClean="0"/>
+              <a:t>Shavit</a:t>
+            </a:r>
+            <a:r>
+              <a:rPr lang="en-IE" dirty="0" smtClean="0"/>
+              <a:t> - 2001</a:t>
+            </a:r>
+          </a:p>
+          <a:p>
+            <a:r>
+              <a:rPr lang="en-IE" dirty="0" smtClean="0"/>
+              <a:t>“Implementing Concurrent Data Objects” – Herlihy - 1993</a:t>
             </a:r>
             <a:endParaRPr lang="en-IE" dirty="0"/>
           </a:p>
@@ -6538,7 +7161,7 @@
     </p:spTree>
     <p:extLst>
       <p:ext uri="{BB962C8B-B14F-4D97-AF65-F5344CB8AC3E}">
-        <p14:creationId xmlns:p14="http://schemas.microsoft.com/office/powerpoint/2010/main" val="351189580"/>
+        <p14:creationId xmlns:p14="http://schemas.microsoft.com/office/powerpoint/2010/main" val="330873260"/>
       </p:ext>
     </p:extLst>
   </p:cSld>
@@ -6582,7 +7205,7 @@
           <a:p>
             <a:r>
               <a:rPr lang="en-IE" dirty="0" smtClean="0"/>
-              <a:t>Data Structure Variations</a:t>
+              <a:t>What I have Done</a:t>
             </a:r>
             <a:endParaRPr lang="en-IE" dirty="0"/>
           </a:p>
@@ -6601,67 +7224,21 @@
         <p:spPr/>
         <p:txBody>
           <a:bodyPr>
-            <a:normAutofit fontScale="77500" lnSpcReduction="20000"/>
+            <a:normAutofit fontScale="92500"/>
           </a:bodyPr>
           <a:lstStyle/>
           <a:p>
-            <a:endParaRPr lang="en-IE" dirty="0" smtClean="0"/>
-          </a:p>
-          <a:p>
             <a:r>
               <a:rPr lang="en-IE" dirty="0" smtClean="0"/>
-              <a:t>MPMC Hash Table Closed Addressing</a:t>
+              <a:t>Implemented 3 concurrent data </a:t>
+            </a:r>
+            <a:r>
+              <a:rPr lang="en-IE" dirty="0" smtClean="0"/>
+              <a:t>structures</a:t>
             </a:r>
           </a:p>
           <a:p>
             <a:pPr lvl="1"/>
-            <a:r>
-              <a:rPr lang="en-IE" dirty="0" smtClean="0"/>
-              <a:t>Locked Table</a:t>
-            </a:r>
-          </a:p>
-          <a:p>
-            <a:pPr lvl="1"/>
-            <a:r>
-              <a:rPr lang="en-IE" dirty="0" smtClean="0"/>
-              <a:t>Lock per Bucket</a:t>
-            </a:r>
-          </a:p>
-          <a:p>
-            <a:pPr lvl="1"/>
-            <a:r>
-              <a:rPr lang="en-IE" dirty="0" smtClean="0"/>
-              <a:t>Lockless</a:t>
-            </a:r>
-          </a:p>
-          <a:p>
-            <a:r>
-              <a:rPr lang="en-IE" dirty="0" smtClean="0"/>
-              <a:t>MPMC Linked List</a:t>
-            </a:r>
-          </a:p>
-          <a:p>
-            <a:pPr lvl="1"/>
-            <a:r>
-              <a:rPr lang="en-IE" dirty="0" smtClean="0"/>
-              <a:t>Single Link Regular Locked/Lockless</a:t>
-            </a:r>
-          </a:p>
-          <a:p>
-            <a:pPr lvl="1"/>
-            <a:r>
-              <a:rPr lang="en-IE" dirty="0" smtClean="0"/>
-              <a:t>Double Link Buffer Locked/Lockless</a:t>
-            </a:r>
-          </a:p>
-          <a:p>
-            <a:pPr lvl="1"/>
-            <a:r>
-              <a:rPr lang="en-IE" dirty="0" smtClean="0"/>
-              <a:t>Single Link Buffer Locked/Lockless</a:t>
-            </a:r>
-          </a:p>
-          <a:p>
             <a:r>
               <a:rPr lang="en-IE" dirty="0" smtClean="0"/>
               <a:t>Ring Buffer</a:t>
@@ -6671,18 +7248,58 @@
             <a:pPr lvl="1"/>
             <a:r>
               <a:rPr lang="en-IE" dirty="0" smtClean="0"/>
-              <a:t>MPMC Locked</a:t>
+              <a:t>Linked List</a:t>
             </a:r>
           </a:p>
           <a:p>
             <a:pPr lvl="1"/>
             <a:r>
               <a:rPr lang="en-IE" dirty="0" smtClean="0"/>
-              <a:t>SPSC Lockless</a:t>
+              <a:t>Hash Table</a:t>
+            </a:r>
+            <a:endParaRPr lang="en-IE" dirty="0" smtClean="0"/>
+          </a:p>
+          <a:p>
+            <a:r>
+              <a:rPr lang="en-IE" dirty="0" smtClean="0"/>
+              <a:t>Implemented both locked and </a:t>
+            </a:r>
+            <a:r>
+              <a:rPr lang="en-IE" dirty="0" smtClean="0"/>
+              <a:t>lockless variations</a:t>
+            </a:r>
+            <a:endParaRPr lang="en-IE" dirty="0" smtClean="0"/>
+          </a:p>
+          <a:p>
+            <a:r>
+              <a:rPr lang="en-IE" dirty="0" smtClean="0"/>
+              <a:t>Tested &amp; compared them on 3 different </a:t>
+            </a:r>
+            <a:r>
+              <a:rPr lang="en-IE" dirty="0" smtClean="0"/>
+              <a:t>systems</a:t>
             </a:r>
           </a:p>
           <a:p>
             <a:pPr lvl="1"/>
+            <a:r>
+              <a:rPr lang="en-IE" dirty="0" smtClean="0"/>
+              <a:t>My Local Machine (Intel i5)</a:t>
+            </a:r>
+          </a:p>
+          <a:p>
+            <a:pPr lvl="1"/>
+            <a:r>
+              <a:rPr lang="en-IE" dirty="0" smtClean="0"/>
+              <a:t>Stoker</a:t>
+            </a:r>
+          </a:p>
+          <a:p>
+            <a:pPr lvl="1"/>
+            <a:r>
+              <a:rPr lang="en-IE" dirty="0" smtClean="0"/>
+              <a:t>Cube</a:t>
+            </a:r>
             <a:endParaRPr lang="en-IE" dirty="0"/>
           </a:p>
         </p:txBody>
@@ -6690,7 +7307,7 @@
     </p:spTree>
     <p:extLst>
       <p:ext uri="{BB962C8B-B14F-4D97-AF65-F5344CB8AC3E}">
-        <p14:creationId xmlns:p14="http://schemas.microsoft.com/office/powerpoint/2010/main" val="546634564"/>
+        <p14:creationId xmlns:p14="http://schemas.microsoft.com/office/powerpoint/2010/main" val="351189580"/>
       </p:ext>
     </p:extLst>
   </p:cSld>
@@ -6734,7 +7351,7 @@
           <a:p>
             <a:r>
               <a:rPr lang="en-IE" dirty="0" smtClean="0"/>
-              <a:t>Evaluation</a:t>
+              <a:t>Data Structure Implementation</a:t>
             </a:r>
             <a:endParaRPr lang="en-IE" dirty="0"/>
           </a:p>
@@ -6757,41 +7374,19 @@
           <a:p>
             <a:r>
               <a:rPr lang="en-IE" dirty="0" smtClean="0"/>
-              <a:t>Ran each variation on each machine for multiple thread counts</a:t>
+              <a:t>Locked Variations – mutex, test-and-set, compare-and-swap</a:t>
             </a:r>
           </a:p>
           <a:p>
             <a:r>
               <a:rPr lang="en-IE" dirty="0" smtClean="0"/>
-              <a:t>Thread count went from 1-128</a:t>
+              <a:t>Lockless Variations – C++11 atomic library operations</a:t>
             </a:r>
           </a:p>
           <a:p>
             <a:r>
               <a:rPr lang="en-IE" dirty="0" smtClean="0"/>
-              <a:t>Recorded iterations per second against number of threads  </a:t>
-            </a:r>
-          </a:p>
-          <a:p>
-            <a:r>
-              <a:rPr lang="en-IE" dirty="0" smtClean="0"/>
-              <a:t>Used </a:t>
-            </a:r>
-            <a:r>
-              <a:rPr lang="en-IE" dirty="0" err="1" smtClean="0"/>
-              <a:t>Perf</a:t>
-            </a:r>
-            <a:r>
-              <a:rPr lang="en-IE" dirty="0" smtClean="0"/>
-              <a:t> to record cache misses, </a:t>
-            </a:r>
-            <a:r>
-              <a:rPr lang="en-IE" dirty="0" err="1" smtClean="0"/>
-              <a:t>cpu</a:t>
-            </a:r>
-            <a:r>
-              <a:rPr lang="en-IE" dirty="0" smtClean="0"/>
-              <a:t> cycles etc…</a:t>
+              <a:t>Mostly Multi Producer Multi Consumer (MPMC) with one Single Producer – Single Consumer (SPSC)</a:t>
             </a:r>
             <a:endParaRPr lang="en-IE" dirty="0"/>
           </a:p>
@@ -6800,20 +7395,13 @@
     </p:spTree>
     <p:extLst>
       <p:ext uri="{BB962C8B-B14F-4D97-AF65-F5344CB8AC3E}">
-        <p14:creationId xmlns:p14="http://schemas.microsoft.com/office/powerpoint/2010/main" val="792295864"/>
+        <p14:creationId xmlns:p14="http://schemas.microsoft.com/office/powerpoint/2010/main" val="3503624377"/>
       </p:ext>
     </p:extLst>
   </p:cSld>
   <p:clrMapOvr>
     <a:masterClrMapping/>
   </p:clrMapOvr>
-  <p:timing>
-    <p:tnLst>
-      <p:par>
-        <p:cTn id="1" dur="indefinite" restart="never" nodeType="tmRoot"/>
-      </p:par>
-    </p:tnLst>
-  </p:timing>
 </p:sld>
 </file>
 
@@ -6851,78 +7439,57 @@
           <a:p>
             <a:r>
               <a:rPr lang="en-IE" dirty="0" smtClean="0"/>
-              <a:t>Results &amp; Analysis</a:t>
+              <a:t>Ring Buffer</a:t>
             </a:r>
             <a:endParaRPr lang="en-IE" dirty="0"/>
           </a:p>
         </p:txBody>
       </p:sp>
-      <p:graphicFrame>
-        <p:nvGraphicFramePr>
-          <p:cNvPr id="6" name="Chart 5"/>
-          <p:cNvGraphicFramePr>
-            <a:graphicFrameLocks/>
-          </p:cNvGraphicFramePr>
-          <p:nvPr>
-            <p:extLst>
-              <p:ext uri="{D42A27DB-BD31-4B8C-83A1-F6EECF244321}">
-                <p14:modId xmlns:p14="http://schemas.microsoft.com/office/powerpoint/2010/main" val="2500187400"/>
-              </p:ext>
-            </p:extLst>
-          </p:nvPr>
-        </p:nvGraphicFramePr>
-        <p:xfrm>
-          <a:off x="4495800" y="1600200"/>
-          <a:ext cx="4191000" cy="4572000"/>
-        </p:xfrm>
-        <a:graphic>
-          <a:graphicData uri="http://schemas.openxmlformats.org/drawingml/2006/chart">
-            <c:chart xmlns:c="http://schemas.openxmlformats.org/drawingml/2006/chart" xmlns:r="http://schemas.openxmlformats.org/officeDocument/2006/relationships" r:id="rId3"/>
-          </a:graphicData>
-        </a:graphic>
-      </p:graphicFrame>
-      <p:graphicFrame>
-        <p:nvGraphicFramePr>
-          <p:cNvPr id="7" name="Content Placeholder 6"/>
-          <p:cNvGraphicFramePr>
-            <a:graphicFrameLocks noGrp="1"/>
-          </p:cNvGraphicFramePr>
+      <p:sp>
+        <p:nvSpPr>
+          <p:cNvPr id="3" name="Content Placeholder 2"/>
+          <p:cNvSpPr>
+            <a:spLocks noGrp="1"/>
+          </p:cNvSpPr>
           <p:nvPr>
             <p:ph idx="1"/>
-            <p:extLst>
-              <p:ext uri="{D42A27DB-BD31-4B8C-83A1-F6EECF244321}">
-                <p14:modId xmlns:p14="http://schemas.microsoft.com/office/powerpoint/2010/main" val="4119368994"/>
-              </p:ext>
-            </p:extLst>
-          </p:nvPr>
-        </p:nvGraphicFramePr>
-        <p:xfrm>
-          <a:off x="457200" y="1600200"/>
-          <a:ext cx="4343400" cy="4525963"/>
-        </p:xfrm>
-        <a:graphic>
-          <a:graphicData uri="http://schemas.openxmlformats.org/drawingml/2006/chart">
-            <c:chart xmlns:c="http://schemas.openxmlformats.org/drawingml/2006/chart" xmlns:r="http://schemas.openxmlformats.org/officeDocument/2006/relationships" r:id="rId4"/>
-          </a:graphicData>
-        </a:graphic>
-      </p:graphicFrame>
+          </p:nvPr>
+        </p:nvSpPr>
+        <p:spPr/>
+        <p:txBody>
+          <a:bodyPr/>
+          <a:lstStyle/>
+          <a:p>
+            <a:r>
+              <a:rPr lang="en-IE" dirty="0" smtClean="0"/>
+              <a:t>Used to get to grips with the C++11 library</a:t>
+            </a:r>
+          </a:p>
+          <a:p>
+            <a:r>
+              <a:rPr lang="en-IE" dirty="0" smtClean="0"/>
+              <a:t>MPMC Locked Variation</a:t>
+            </a:r>
+          </a:p>
+          <a:p>
+            <a:r>
+              <a:rPr lang="en-IE" dirty="0" smtClean="0"/>
+              <a:t>SPSC Lockless Variation</a:t>
+            </a:r>
+            <a:endParaRPr lang="en-IE" dirty="0"/>
+          </a:p>
+        </p:txBody>
+      </p:sp>
     </p:spTree>
     <p:extLst>
       <p:ext uri="{BB962C8B-B14F-4D97-AF65-F5344CB8AC3E}">
-        <p14:creationId xmlns:p14="http://schemas.microsoft.com/office/powerpoint/2010/main" val="1432556800"/>
+        <p14:creationId xmlns:p14="http://schemas.microsoft.com/office/powerpoint/2010/main" val="3247535296"/>
       </p:ext>
     </p:extLst>
   </p:cSld>
   <p:clrMapOvr>
     <a:masterClrMapping/>
   </p:clrMapOvr>
-  <p:timing>
-    <p:tnLst>
-      <p:par>
-        <p:cTn id="1" dur="indefinite" restart="never" nodeType="tmRoot"/>
-      </p:par>
-    </p:tnLst>
-  </p:timing>
 </p:sld>
 </file>
 
@@ -6960,65 +7527,1712 @@
           <a:p>
             <a:r>
               <a:rPr lang="en-IE" dirty="0" smtClean="0"/>
-              <a:t>Results &amp; Analysis</a:t>
+              <a:t>Linked List</a:t>
             </a:r>
             <a:endParaRPr lang="en-IE" dirty="0"/>
           </a:p>
         </p:txBody>
       </p:sp>
-      <p:graphicFrame>
-        <p:nvGraphicFramePr>
-          <p:cNvPr id="9" name="Content Placeholder 8"/>
-          <p:cNvGraphicFramePr>
-            <a:graphicFrameLocks noGrp="1"/>
-          </p:cNvGraphicFramePr>
+      <p:sp>
+        <p:nvSpPr>
+          <p:cNvPr id="3" name="Content Placeholder 2"/>
+          <p:cNvSpPr>
+            <a:spLocks noGrp="1"/>
+          </p:cNvSpPr>
           <p:nvPr>
             <p:ph idx="1"/>
-            <p:extLst>
-              <p:ext uri="{D42A27DB-BD31-4B8C-83A1-F6EECF244321}">
-                <p14:modId xmlns:p14="http://schemas.microsoft.com/office/powerpoint/2010/main" val="2781748911"/>
-              </p:ext>
-            </p:extLst>
-          </p:nvPr>
-        </p:nvGraphicFramePr>
-        <p:xfrm>
-          <a:off x="457200" y="1600200"/>
-          <a:ext cx="3505200" cy="4525963"/>
-        </p:xfrm>
-        <a:graphic>
-          <a:graphicData uri="http://schemas.openxmlformats.org/drawingml/2006/chart">
-            <c:chart xmlns:c="http://schemas.openxmlformats.org/drawingml/2006/chart" xmlns:r="http://schemas.openxmlformats.org/officeDocument/2006/relationships" r:id="rId2"/>
-          </a:graphicData>
-        </a:graphic>
-      </p:graphicFrame>
-      <p:graphicFrame>
-        <p:nvGraphicFramePr>
-          <p:cNvPr id="10" name="Chart 9"/>
-          <p:cNvGraphicFramePr>
-            <a:graphicFrameLocks/>
-          </p:cNvGraphicFramePr>
-          <p:nvPr>
-            <p:extLst>
-              <p:ext uri="{D42A27DB-BD31-4B8C-83A1-F6EECF244321}">
-                <p14:modId xmlns:p14="http://schemas.microsoft.com/office/powerpoint/2010/main" val="2761141773"/>
-              </p:ext>
-            </p:extLst>
-          </p:nvPr>
-        </p:nvGraphicFramePr>
-        <p:xfrm>
-          <a:off x="4191000" y="1676400"/>
-          <a:ext cx="4953000" cy="5029200"/>
-        </p:xfrm>
-        <a:graphic>
-          <a:graphicData uri="http://schemas.openxmlformats.org/drawingml/2006/chart">
-            <c:chart xmlns:c="http://schemas.openxmlformats.org/drawingml/2006/chart" xmlns:r="http://schemas.openxmlformats.org/officeDocument/2006/relationships" r:id="rId3"/>
-          </a:graphicData>
-        </a:graphic>
-      </p:graphicFrame>
+          </p:nvPr>
+        </p:nvSpPr>
+        <p:spPr/>
+        <p:txBody>
+          <a:bodyPr/>
+          <a:lstStyle/>
+          <a:p>
+            <a:r>
+              <a:rPr lang="en-IE" dirty="0" smtClean="0"/>
+              <a:t>MPMC Singly </a:t>
+            </a:r>
+            <a:r>
+              <a:rPr lang="en-IE" dirty="0"/>
+              <a:t>L</a:t>
+            </a:r>
+            <a:r>
+              <a:rPr lang="en-IE" dirty="0" smtClean="0"/>
+              <a:t>inked List – Locked/Lockless</a:t>
+            </a:r>
+          </a:p>
+          <a:p>
+            <a:pPr marL="0" indent="0">
+              <a:buNone/>
+            </a:pPr>
+            <a:endParaRPr lang="en-IE" dirty="0" smtClean="0"/>
+          </a:p>
+          <a:p>
+            <a:endParaRPr lang="en-IE" dirty="0" smtClean="0"/>
+          </a:p>
+          <a:p>
+            <a:r>
+              <a:rPr lang="en-IE" dirty="0" smtClean="0"/>
+              <a:t>MPMC Doubly Linked Buffer – Locked/Lockless</a:t>
+            </a:r>
+          </a:p>
+          <a:p>
+            <a:pPr marL="0" indent="0">
+              <a:buNone/>
+            </a:pPr>
+            <a:endParaRPr lang="en-IE" dirty="0" smtClean="0"/>
+          </a:p>
+          <a:p>
+            <a:endParaRPr lang="en-IE" dirty="0" smtClean="0"/>
+          </a:p>
+          <a:p>
+            <a:r>
+              <a:rPr lang="en-IE" dirty="0" smtClean="0"/>
+              <a:t>MPMC Singly Linked Buffer – Locked/Lockless</a:t>
+            </a:r>
+          </a:p>
+          <a:p>
+            <a:pPr marL="0" indent="0">
+              <a:buNone/>
+            </a:pPr>
+            <a:endParaRPr lang="en-IE" dirty="0"/>
+          </a:p>
+        </p:txBody>
+      </p:sp>
+      <p:sp>
+        <p:nvSpPr>
+          <p:cNvPr id="4" name="Rectangle 3"/>
+          <p:cNvSpPr/>
+          <p:nvPr/>
+        </p:nvSpPr>
+        <p:spPr>
+          <a:xfrm>
+            <a:off x="914400" y="2362200"/>
+            <a:ext cx="533400" cy="381000"/>
+          </a:xfrm>
+          <a:prstGeom prst="rect">
+            <a:avLst/>
+          </a:prstGeom>
+          <a:solidFill>
+            <a:schemeClr val="bg1"/>
+          </a:solidFill>
+        </p:spPr>
+        <p:style>
+          <a:lnRef idx="2">
+            <a:schemeClr val="accent1">
+              <a:shade val="50000"/>
+            </a:schemeClr>
+          </a:lnRef>
+          <a:fillRef idx="1">
+            <a:schemeClr val="accent1"/>
+          </a:fillRef>
+          <a:effectRef idx="0">
+            <a:schemeClr val="accent1"/>
+          </a:effectRef>
+          <a:fontRef idx="minor">
+            <a:schemeClr val="lt1"/>
+          </a:fontRef>
+        </p:style>
+        <p:txBody>
+          <a:bodyPr rtlCol="0" anchor="ctr"/>
+          <a:lstStyle/>
+          <a:p>
+            <a:pPr algn="ctr"/>
+            <a:r>
+              <a:rPr lang="en-IE" dirty="0">
+                <a:solidFill>
+                  <a:sysClr val="windowText" lastClr="000000"/>
+                </a:solidFill>
+              </a:rPr>
+              <a:t>2</a:t>
+            </a:r>
+          </a:p>
+        </p:txBody>
+      </p:sp>
+      <p:sp>
+        <p:nvSpPr>
+          <p:cNvPr id="5" name="Rectangle 4"/>
+          <p:cNvSpPr/>
+          <p:nvPr/>
+        </p:nvSpPr>
+        <p:spPr>
+          <a:xfrm>
+            <a:off x="1906030" y="2362200"/>
+            <a:ext cx="533400" cy="381000"/>
+          </a:xfrm>
+          <a:prstGeom prst="rect">
+            <a:avLst/>
+          </a:prstGeom>
+          <a:solidFill>
+            <a:schemeClr val="bg1"/>
+          </a:solidFill>
+        </p:spPr>
+        <p:style>
+          <a:lnRef idx="2">
+            <a:schemeClr val="accent1">
+              <a:shade val="50000"/>
+            </a:schemeClr>
+          </a:lnRef>
+          <a:fillRef idx="1">
+            <a:schemeClr val="accent1"/>
+          </a:fillRef>
+          <a:effectRef idx="0">
+            <a:schemeClr val="accent1"/>
+          </a:effectRef>
+          <a:fontRef idx="minor">
+            <a:schemeClr val="lt1"/>
+          </a:fontRef>
+        </p:style>
+        <p:txBody>
+          <a:bodyPr rtlCol="0" anchor="ctr"/>
+          <a:lstStyle/>
+          <a:p>
+            <a:pPr algn="ctr"/>
+            <a:r>
+              <a:rPr lang="en-IE" dirty="0" smtClean="0">
+                <a:solidFill>
+                  <a:sysClr val="windowText" lastClr="000000"/>
+                </a:solidFill>
+              </a:rPr>
+              <a:t>4</a:t>
+            </a:r>
+            <a:endParaRPr lang="en-IE" dirty="0">
+              <a:solidFill>
+                <a:sysClr val="windowText" lastClr="000000"/>
+              </a:solidFill>
+            </a:endParaRPr>
+          </a:p>
+        </p:txBody>
+      </p:sp>
+      <p:sp>
+        <p:nvSpPr>
+          <p:cNvPr id="6" name="Rectangle 5"/>
+          <p:cNvSpPr/>
+          <p:nvPr/>
+        </p:nvSpPr>
+        <p:spPr>
+          <a:xfrm>
+            <a:off x="3048000" y="2362200"/>
+            <a:ext cx="533400" cy="381000"/>
+          </a:xfrm>
+          <a:prstGeom prst="rect">
+            <a:avLst/>
+          </a:prstGeom>
+          <a:solidFill>
+            <a:schemeClr val="bg1"/>
+          </a:solidFill>
+        </p:spPr>
+        <p:style>
+          <a:lnRef idx="2">
+            <a:schemeClr val="accent1">
+              <a:shade val="50000"/>
+            </a:schemeClr>
+          </a:lnRef>
+          <a:fillRef idx="1">
+            <a:schemeClr val="accent1"/>
+          </a:fillRef>
+          <a:effectRef idx="0">
+            <a:schemeClr val="accent1"/>
+          </a:effectRef>
+          <a:fontRef idx="minor">
+            <a:schemeClr val="lt1"/>
+          </a:fontRef>
+        </p:style>
+        <p:txBody>
+          <a:bodyPr rtlCol="0" anchor="ctr"/>
+          <a:lstStyle/>
+          <a:p>
+            <a:pPr algn="ctr"/>
+            <a:r>
+              <a:rPr lang="en-IE" dirty="0" smtClean="0">
+                <a:solidFill>
+                  <a:sysClr val="windowText" lastClr="000000"/>
+                </a:solidFill>
+              </a:rPr>
+              <a:t>5</a:t>
+            </a:r>
+            <a:endParaRPr lang="en-IE" dirty="0">
+              <a:solidFill>
+                <a:sysClr val="windowText" lastClr="000000"/>
+              </a:solidFill>
+            </a:endParaRPr>
+          </a:p>
+        </p:txBody>
+      </p:sp>
+      <p:sp>
+        <p:nvSpPr>
+          <p:cNvPr id="7" name="Rectangle 6"/>
+          <p:cNvSpPr/>
+          <p:nvPr/>
+        </p:nvSpPr>
+        <p:spPr>
+          <a:xfrm>
+            <a:off x="4114800" y="2375586"/>
+            <a:ext cx="533400" cy="381000"/>
+          </a:xfrm>
+          <a:prstGeom prst="rect">
+            <a:avLst/>
+          </a:prstGeom>
+          <a:solidFill>
+            <a:schemeClr val="bg1"/>
+          </a:solidFill>
+        </p:spPr>
+        <p:style>
+          <a:lnRef idx="2">
+            <a:schemeClr val="accent1">
+              <a:shade val="50000"/>
+            </a:schemeClr>
+          </a:lnRef>
+          <a:fillRef idx="1">
+            <a:schemeClr val="accent1"/>
+          </a:fillRef>
+          <a:effectRef idx="0">
+            <a:schemeClr val="accent1"/>
+          </a:effectRef>
+          <a:fontRef idx="minor">
+            <a:schemeClr val="lt1"/>
+          </a:fontRef>
+        </p:style>
+        <p:txBody>
+          <a:bodyPr rtlCol="0" anchor="ctr"/>
+          <a:lstStyle/>
+          <a:p>
+            <a:pPr algn="ctr"/>
+            <a:r>
+              <a:rPr lang="en-IE" dirty="0" smtClean="0">
+                <a:solidFill>
+                  <a:sysClr val="windowText" lastClr="000000"/>
+                </a:solidFill>
+              </a:rPr>
+              <a:t>7</a:t>
+            </a:r>
+            <a:endParaRPr lang="en-IE" dirty="0">
+              <a:solidFill>
+                <a:sysClr val="windowText" lastClr="000000"/>
+              </a:solidFill>
+            </a:endParaRPr>
+          </a:p>
+        </p:txBody>
+      </p:sp>
+      <p:cxnSp>
+        <p:nvCxnSpPr>
+          <p:cNvPr id="9" name="Straight Arrow Connector 8"/>
+          <p:cNvCxnSpPr>
+            <a:stCxn id="4" idx="3"/>
+            <a:endCxn id="5" idx="1"/>
+          </p:cNvCxnSpPr>
+          <p:nvPr/>
+        </p:nvCxnSpPr>
+        <p:spPr>
+          <a:xfrm>
+            <a:off x="1447800" y="2552700"/>
+            <a:ext cx="458230" cy="0"/>
+          </a:xfrm>
+          <a:prstGeom prst="straightConnector1">
+            <a:avLst/>
+          </a:prstGeom>
+          <a:ln>
+            <a:tailEnd type="arrow"/>
+          </a:ln>
+        </p:spPr>
+        <p:style>
+          <a:lnRef idx="1">
+            <a:schemeClr val="accent1"/>
+          </a:lnRef>
+          <a:fillRef idx="0">
+            <a:schemeClr val="accent1"/>
+          </a:fillRef>
+          <a:effectRef idx="0">
+            <a:schemeClr val="accent1"/>
+          </a:effectRef>
+          <a:fontRef idx="minor">
+            <a:schemeClr val="tx1"/>
+          </a:fontRef>
+        </p:style>
+      </p:cxnSp>
+      <p:cxnSp>
+        <p:nvCxnSpPr>
+          <p:cNvPr id="11" name="Straight Arrow Connector 10"/>
+          <p:cNvCxnSpPr>
+            <a:stCxn id="5" idx="3"/>
+            <a:endCxn id="6" idx="1"/>
+          </p:cNvCxnSpPr>
+          <p:nvPr/>
+        </p:nvCxnSpPr>
+        <p:spPr>
+          <a:xfrm>
+            <a:off x="2439430" y="2552700"/>
+            <a:ext cx="608570" cy="0"/>
+          </a:xfrm>
+          <a:prstGeom prst="straightConnector1">
+            <a:avLst/>
+          </a:prstGeom>
+          <a:ln>
+            <a:tailEnd type="arrow"/>
+          </a:ln>
+        </p:spPr>
+        <p:style>
+          <a:lnRef idx="1">
+            <a:schemeClr val="accent1"/>
+          </a:lnRef>
+          <a:fillRef idx="0">
+            <a:schemeClr val="accent1"/>
+          </a:fillRef>
+          <a:effectRef idx="0">
+            <a:schemeClr val="accent1"/>
+          </a:effectRef>
+          <a:fontRef idx="minor">
+            <a:schemeClr val="tx1"/>
+          </a:fontRef>
+        </p:style>
+      </p:cxnSp>
+      <p:cxnSp>
+        <p:nvCxnSpPr>
+          <p:cNvPr id="13" name="Straight Arrow Connector 12"/>
+          <p:cNvCxnSpPr>
+            <a:stCxn id="6" idx="3"/>
+          </p:cNvCxnSpPr>
+          <p:nvPr/>
+        </p:nvCxnSpPr>
+        <p:spPr>
+          <a:xfrm>
+            <a:off x="3581400" y="2552700"/>
+            <a:ext cx="533400" cy="0"/>
+          </a:xfrm>
+          <a:prstGeom prst="straightConnector1">
+            <a:avLst/>
+          </a:prstGeom>
+          <a:ln>
+            <a:tailEnd type="arrow"/>
+          </a:ln>
+        </p:spPr>
+        <p:style>
+          <a:lnRef idx="1">
+            <a:schemeClr val="accent1"/>
+          </a:lnRef>
+          <a:fillRef idx="0">
+            <a:schemeClr val="accent1"/>
+          </a:fillRef>
+          <a:effectRef idx="0">
+            <a:schemeClr val="accent1"/>
+          </a:effectRef>
+          <a:fontRef idx="minor">
+            <a:schemeClr val="tx1"/>
+          </a:fontRef>
+        </p:style>
+      </p:cxnSp>
+      <p:cxnSp>
+        <p:nvCxnSpPr>
+          <p:cNvPr id="16" name="Straight Arrow Connector 15"/>
+          <p:cNvCxnSpPr/>
+          <p:nvPr/>
+        </p:nvCxnSpPr>
+        <p:spPr>
+          <a:xfrm>
+            <a:off x="4648200" y="2552700"/>
+            <a:ext cx="381000" cy="0"/>
+          </a:xfrm>
+          <a:prstGeom prst="straightConnector1">
+            <a:avLst/>
+          </a:prstGeom>
+          <a:ln>
+            <a:tailEnd type="arrow"/>
+          </a:ln>
+        </p:spPr>
+        <p:style>
+          <a:lnRef idx="1">
+            <a:schemeClr val="accent1"/>
+          </a:lnRef>
+          <a:fillRef idx="0">
+            <a:schemeClr val="accent1"/>
+          </a:fillRef>
+          <a:effectRef idx="0">
+            <a:schemeClr val="accent1"/>
+          </a:effectRef>
+          <a:fontRef idx="minor">
+            <a:schemeClr val="tx1"/>
+          </a:fontRef>
+        </p:style>
+      </p:cxnSp>
+      <p:sp>
+        <p:nvSpPr>
+          <p:cNvPr id="18" name="Rectangle 17"/>
+          <p:cNvSpPr/>
+          <p:nvPr/>
+        </p:nvSpPr>
+        <p:spPr>
+          <a:xfrm>
+            <a:off x="533400" y="3048000"/>
+            <a:ext cx="762000" cy="381000"/>
+          </a:xfrm>
+          <a:prstGeom prst="rect">
+            <a:avLst/>
+          </a:prstGeom>
+          <a:solidFill>
+            <a:schemeClr val="bg1"/>
+          </a:solidFill>
+        </p:spPr>
+        <p:style>
+          <a:lnRef idx="2">
+            <a:schemeClr val="accent1">
+              <a:shade val="50000"/>
+            </a:schemeClr>
+          </a:lnRef>
+          <a:fillRef idx="1">
+            <a:schemeClr val="accent1"/>
+          </a:fillRef>
+          <a:effectRef idx="0">
+            <a:schemeClr val="accent1"/>
+          </a:effectRef>
+          <a:fontRef idx="minor">
+            <a:schemeClr val="lt1"/>
+          </a:fontRef>
+        </p:style>
+        <p:txBody>
+          <a:bodyPr rtlCol="0" anchor="ctr"/>
+          <a:lstStyle/>
+          <a:p>
+            <a:pPr algn="ctr"/>
+            <a:r>
+              <a:rPr lang="en-IE" dirty="0" smtClean="0">
+                <a:solidFill>
+                  <a:sysClr val="windowText" lastClr="000000"/>
+                </a:solidFill>
+              </a:rPr>
+              <a:t>Head</a:t>
+            </a:r>
+            <a:endParaRPr lang="en-IE" dirty="0">
+              <a:solidFill>
+                <a:sysClr val="windowText" lastClr="000000"/>
+              </a:solidFill>
+            </a:endParaRPr>
+          </a:p>
+        </p:txBody>
+      </p:sp>
+      <p:cxnSp>
+        <p:nvCxnSpPr>
+          <p:cNvPr id="20" name="Straight Arrow Connector 19"/>
+          <p:cNvCxnSpPr>
+            <a:stCxn id="18" idx="0"/>
+            <a:endCxn id="4" idx="2"/>
+          </p:cNvCxnSpPr>
+          <p:nvPr/>
+        </p:nvCxnSpPr>
+        <p:spPr>
+          <a:xfrm flipV="1">
+            <a:off x="914400" y="2743200"/>
+            <a:ext cx="266700" cy="304800"/>
+          </a:xfrm>
+          <a:prstGeom prst="straightConnector1">
+            <a:avLst/>
+          </a:prstGeom>
+          <a:ln>
+            <a:tailEnd type="arrow"/>
+          </a:ln>
+        </p:spPr>
+        <p:style>
+          <a:lnRef idx="1">
+            <a:schemeClr val="accent1"/>
+          </a:lnRef>
+          <a:fillRef idx="0">
+            <a:schemeClr val="accent1"/>
+          </a:fillRef>
+          <a:effectRef idx="0">
+            <a:schemeClr val="accent1"/>
+          </a:effectRef>
+          <a:fontRef idx="minor">
+            <a:schemeClr val="tx1"/>
+          </a:fontRef>
+        </p:style>
+      </p:cxnSp>
+      <p:sp>
+        <p:nvSpPr>
+          <p:cNvPr id="21" name="Rectangle 20"/>
+          <p:cNvSpPr/>
+          <p:nvPr/>
+        </p:nvSpPr>
+        <p:spPr>
+          <a:xfrm>
+            <a:off x="4648200" y="4713072"/>
+            <a:ext cx="533400" cy="381000"/>
+          </a:xfrm>
+          <a:prstGeom prst="rect">
+            <a:avLst/>
+          </a:prstGeom>
+          <a:solidFill>
+            <a:schemeClr val="bg1"/>
+          </a:solidFill>
+        </p:spPr>
+        <p:style>
+          <a:lnRef idx="2">
+            <a:schemeClr val="accent1">
+              <a:shade val="50000"/>
+            </a:schemeClr>
+          </a:lnRef>
+          <a:fillRef idx="1">
+            <a:schemeClr val="accent1"/>
+          </a:fillRef>
+          <a:effectRef idx="0">
+            <a:schemeClr val="accent1"/>
+          </a:effectRef>
+          <a:fontRef idx="minor">
+            <a:schemeClr val="lt1"/>
+          </a:fontRef>
+        </p:style>
+        <p:txBody>
+          <a:bodyPr rtlCol="0" anchor="ctr"/>
+          <a:lstStyle/>
+          <a:p>
+            <a:pPr algn="ctr"/>
+            <a:r>
+              <a:rPr lang="en-IE" dirty="0" smtClean="0">
+                <a:solidFill>
+                  <a:sysClr val="windowText" lastClr="000000"/>
+                </a:solidFill>
+              </a:rPr>
+              <a:t>Tail</a:t>
+            </a:r>
+            <a:endParaRPr lang="en-IE" dirty="0">
+              <a:solidFill>
+                <a:sysClr val="windowText" lastClr="000000"/>
+              </a:solidFill>
+            </a:endParaRPr>
+          </a:p>
+        </p:txBody>
+      </p:sp>
+      <p:sp>
+        <p:nvSpPr>
+          <p:cNvPr id="22" name="Rectangle 21"/>
+          <p:cNvSpPr/>
+          <p:nvPr/>
+        </p:nvSpPr>
+        <p:spPr>
+          <a:xfrm>
+            <a:off x="571500" y="4724400"/>
+            <a:ext cx="723900" cy="381000"/>
+          </a:xfrm>
+          <a:prstGeom prst="rect">
+            <a:avLst/>
+          </a:prstGeom>
+          <a:solidFill>
+            <a:schemeClr val="bg1"/>
+          </a:solidFill>
+        </p:spPr>
+        <p:style>
+          <a:lnRef idx="2">
+            <a:schemeClr val="accent1">
+              <a:shade val="50000"/>
+            </a:schemeClr>
+          </a:lnRef>
+          <a:fillRef idx="1">
+            <a:schemeClr val="accent1"/>
+          </a:fillRef>
+          <a:effectRef idx="0">
+            <a:schemeClr val="accent1"/>
+          </a:effectRef>
+          <a:fontRef idx="minor">
+            <a:schemeClr val="lt1"/>
+          </a:fontRef>
+        </p:style>
+        <p:txBody>
+          <a:bodyPr rtlCol="0" anchor="ctr"/>
+          <a:lstStyle/>
+          <a:p>
+            <a:pPr algn="ctr"/>
+            <a:r>
+              <a:rPr lang="en-IE" dirty="0" smtClean="0">
+                <a:solidFill>
+                  <a:sysClr val="windowText" lastClr="000000"/>
+                </a:solidFill>
+              </a:rPr>
+              <a:t>Head</a:t>
+            </a:r>
+            <a:endParaRPr lang="en-IE" dirty="0">
+              <a:solidFill>
+                <a:sysClr val="windowText" lastClr="000000"/>
+              </a:solidFill>
+            </a:endParaRPr>
+          </a:p>
+        </p:txBody>
+      </p:sp>
+      <p:sp>
+        <p:nvSpPr>
+          <p:cNvPr id="23" name="Rectangle 22"/>
+          <p:cNvSpPr/>
+          <p:nvPr/>
+        </p:nvSpPr>
+        <p:spPr>
+          <a:xfrm>
+            <a:off x="4063314" y="4114800"/>
+            <a:ext cx="533400" cy="381000"/>
+          </a:xfrm>
+          <a:prstGeom prst="rect">
+            <a:avLst/>
+          </a:prstGeom>
+          <a:solidFill>
+            <a:schemeClr val="bg1"/>
+          </a:solidFill>
+        </p:spPr>
+        <p:style>
+          <a:lnRef idx="2">
+            <a:schemeClr val="accent1">
+              <a:shade val="50000"/>
+            </a:schemeClr>
+          </a:lnRef>
+          <a:fillRef idx="1">
+            <a:schemeClr val="accent1"/>
+          </a:fillRef>
+          <a:effectRef idx="0">
+            <a:schemeClr val="accent1"/>
+          </a:effectRef>
+          <a:fontRef idx="minor">
+            <a:schemeClr val="lt1"/>
+          </a:fontRef>
+        </p:style>
+        <p:txBody>
+          <a:bodyPr rtlCol="0" anchor="ctr"/>
+          <a:lstStyle/>
+          <a:p>
+            <a:pPr algn="ctr"/>
+            <a:r>
+              <a:rPr lang="en-IE" dirty="0" smtClean="0">
+                <a:solidFill>
+                  <a:sysClr val="windowText" lastClr="000000"/>
+                </a:solidFill>
+              </a:rPr>
+              <a:t>3</a:t>
+            </a:r>
+            <a:endParaRPr lang="en-IE" dirty="0">
+              <a:solidFill>
+                <a:sysClr val="windowText" lastClr="000000"/>
+              </a:solidFill>
+            </a:endParaRPr>
+          </a:p>
+        </p:txBody>
+      </p:sp>
+      <p:sp>
+        <p:nvSpPr>
+          <p:cNvPr id="24" name="Rectangle 23"/>
+          <p:cNvSpPr/>
+          <p:nvPr/>
+        </p:nvSpPr>
+        <p:spPr>
+          <a:xfrm>
+            <a:off x="2971800" y="4114800"/>
+            <a:ext cx="533400" cy="381000"/>
+          </a:xfrm>
+          <a:prstGeom prst="rect">
+            <a:avLst/>
+          </a:prstGeom>
+          <a:solidFill>
+            <a:schemeClr val="bg1"/>
+          </a:solidFill>
+        </p:spPr>
+        <p:style>
+          <a:lnRef idx="2">
+            <a:schemeClr val="accent1">
+              <a:shade val="50000"/>
+            </a:schemeClr>
+          </a:lnRef>
+          <a:fillRef idx="1">
+            <a:schemeClr val="accent1"/>
+          </a:fillRef>
+          <a:effectRef idx="0">
+            <a:schemeClr val="accent1"/>
+          </a:effectRef>
+          <a:fontRef idx="minor">
+            <a:schemeClr val="lt1"/>
+          </a:fontRef>
+        </p:style>
+        <p:txBody>
+          <a:bodyPr rtlCol="0" anchor="ctr"/>
+          <a:lstStyle/>
+          <a:p>
+            <a:pPr algn="ctr"/>
+            <a:r>
+              <a:rPr lang="en-IE" dirty="0" smtClean="0">
+                <a:solidFill>
+                  <a:sysClr val="windowText" lastClr="000000"/>
+                </a:solidFill>
+              </a:rPr>
+              <a:t>4</a:t>
+            </a:r>
+            <a:endParaRPr lang="en-IE" dirty="0">
+              <a:solidFill>
+                <a:sysClr val="windowText" lastClr="000000"/>
+              </a:solidFill>
+            </a:endParaRPr>
+          </a:p>
+        </p:txBody>
+      </p:sp>
+      <p:sp>
+        <p:nvSpPr>
+          <p:cNvPr id="25" name="Rectangle 24"/>
+          <p:cNvSpPr/>
+          <p:nvPr/>
+        </p:nvSpPr>
+        <p:spPr>
+          <a:xfrm>
+            <a:off x="1905000" y="4114800"/>
+            <a:ext cx="533400" cy="381000"/>
+          </a:xfrm>
+          <a:prstGeom prst="rect">
+            <a:avLst/>
+          </a:prstGeom>
+          <a:solidFill>
+            <a:schemeClr val="bg1"/>
+          </a:solidFill>
+        </p:spPr>
+        <p:style>
+          <a:lnRef idx="2">
+            <a:schemeClr val="accent1">
+              <a:shade val="50000"/>
+            </a:schemeClr>
+          </a:lnRef>
+          <a:fillRef idx="1">
+            <a:schemeClr val="accent1"/>
+          </a:fillRef>
+          <a:effectRef idx="0">
+            <a:schemeClr val="accent1"/>
+          </a:effectRef>
+          <a:fontRef idx="minor">
+            <a:schemeClr val="lt1"/>
+          </a:fontRef>
+        </p:style>
+        <p:txBody>
+          <a:bodyPr rtlCol="0" anchor="ctr"/>
+          <a:lstStyle/>
+          <a:p>
+            <a:pPr algn="ctr"/>
+            <a:r>
+              <a:rPr lang="en-IE" dirty="0" smtClean="0">
+                <a:solidFill>
+                  <a:sysClr val="windowText" lastClr="000000"/>
+                </a:solidFill>
+              </a:rPr>
+              <a:t>2</a:t>
+            </a:r>
+            <a:endParaRPr lang="en-IE" dirty="0">
+              <a:solidFill>
+                <a:sysClr val="windowText" lastClr="000000"/>
+              </a:solidFill>
+            </a:endParaRPr>
+          </a:p>
+        </p:txBody>
+      </p:sp>
+      <p:sp>
+        <p:nvSpPr>
+          <p:cNvPr id="26" name="Rectangle 25"/>
+          <p:cNvSpPr/>
+          <p:nvPr/>
+        </p:nvSpPr>
+        <p:spPr>
+          <a:xfrm>
+            <a:off x="838200" y="4114800"/>
+            <a:ext cx="533400" cy="381000"/>
+          </a:xfrm>
+          <a:prstGeom prst="rect">
+            <a:avLst/>
+          </a:prstGeom>
+          <a:solidFill>
+            <a:schemeClr val="bg1"/>
+          </a:solidFill>
+        </p:spPr>
+        <p:style>
+          <a:lnRef idx="2">
+            <a:schemeClr val="accent1">
+              <a:shade val="50000"/>
+            </a:schemeClr>
+          </a:lnRef>
+          <a:fillRef idx="1">
+            <a:schemeClr val="accent1"/>
+          </a:fillRef>
+          <a:effectRef idx="0">
+            <a:schemeClr val="accent1"/>
+          </a:effectRef>
+          <a:fontRef idx="minor">
+            <a:schemeClr val="lt1"/>
+          </a:fontRef>
+        </p:style>
+        <p:txBody>
+          <a:bodyPr rtlCol="0" anchor="ctr"/>
+          <a:lstStyle/>
+          <a:p>
+            <a:pPr algn="ctr"/>
+            <a:r>
+              <a:rPr lang="en-IE" dirty="0" smtClean="0">
+                <a:solidFill>
+                  <a:sysClr val="windowText" lastClr="000000"/>
+                </a:solidFill>
+              </a:rPr>
+              <a:t>2</a:t>
+            </a:r>
+            <a:endParaRPr lang="en-IE" dirty="0">
+              <a:solidFill>
+                <a:sysClr val="windowText" lastClr="000000"/>
+              </a:solidFill>
+            </a:endParaRPr>
+          </a:p>
+        </p:txBody>
+      </p:sp>
+      <p:cxnSp>
+        <p:nvCxnSpPr>
+          <p:cNvPr id="29" name="Straight Arrow Connector 28"/>
+          <p:cNvCxnSpPr>
+            <a:stCxn id="22" idx="0"/>
+            <a:endCxn id="26" idx="2"/>
+          </p:cNvCxnSpPr>
+          <p:nvPr/>
+        </p:nvCxnSpPr>
+        <p:spPr>
+          <a:xfrm flipV="1">
+            <a:off x="933450" y="4495800"/>
+            <a:ext cx="171450" cy="228600"/>
+          </a:xfrm>
+          <a:prstGeom prst="straightConnector1">
+            <a:avLst/>
+          </a:prstGeom>
+          <a:ln>
+            <a:tailEnd type="arrow"/>
+          </a:ln>
+        </p:spPr>
+        <p:style>
+          <a:lnRef idx="1">
+            <a:schemeClr val="accent1"/>
+          </a:lnRef>
+          <a:fillRef idx="0">
+            <a:schemeClr val="accent1"/>
+          </a:fillRef>
+          <a:effectRef idx="0">
+            <a:schemeClr val="accent1"/>
+          </a:effectRef>
+          <a:fontRef idx="minor">
+            <a:schemeClr val="tx1"/>
+          </a:fontRef>
+        </p:style>
+      </p:cxnSp>
+      <p:cxnSp>
+        <p:nvCxnSpPr>
+          <p:cNvPr id="31" name="Straight Arrow Connector 30"/>
+          <p:cNvCxnSpPr>
+            <a:stCxn id="26" idx="3"/>
+            <a:endCxn id="25" idx="1"/>
+          </p:cNvCxnSpPr>
+          <p:nvPr/>
+        </p:nvCxnSpPr>
+        <p:spPr>
+          <a:xfrm>
+            <a:off x="1371600" y="4305300"/>
+            <a:ext cx="533400" cy="0"/>
+          </a:xfrm>
+          <a:prstGeom prst="straightConnector1">
+            <a:avLst/>
+          </a:prstGeom>
+          <a:ln>
+            <a:tailEnd type="arrow"/>
+          </a:ln>
+        </p:spPr>
+        <p:style>
+          <a:lnRef idx="1">
+            <a:schemeClr val="accent1"/>
+          </a:lnRef>
+          <a:fillRef idx="0">
+            <a:schemeClr val="accent1"/>
+          </a:fillRef>
+          <a:effectRef idx="0">
+            <a:schemeClr val="accent1"/>
+          </a:effectRef>
+          <a:fontRef idx="minor">
+            <a:schemeClr val="tx1"/>
+          </a:fontRef>
+        </p:style>
+      </p:cxnSp>
+      <p:cxnSp>
+        <p:nvCxnSpPr>
+          <p:cNvPr id="33" name="Straight Arrow Connector 32"/>
+          <p:cNvCxnSpPr>
+            <a:endCxn id="24" idx="1"/>
+          </p:cNvCxnSpPr>
+          <p:nvPr/>
+        </p:nvCxnSpPr>
+        <p:spPr>
+          <a:xfrm>
+            <a:off x="2439430" y="4305300"/>
+            <a:ext cx="532370" cy="0"/>
+          </a:xfrm>
+          <a:prstGeom prst="straightConnector1">
+            <a:avLst/>
+          </a:prstGeom>
+          <a:ln>
+            <a:tailEnd type="arrow"/>
+          </a:ln>
+        </p:spPr>
+        <p:style>
+          <a:lnRef idx="1">
+            <a:schemeClr val="accent1"/>
+          </a:lnRef>
+          <a:fillRef idx="0">
+            <a:schemeClr val="accent1"/>
+          </a:fillRef>
+          <a:effectRef idx="0">
+            <a:schemeClr val="accent1"/>
+          </a:effectRef>
+          <a:fontRef idx="minor">
+            <a:schemeClr val="tx1"/>
+          </a:fontRef>
+        </p:style>
+      </p:cxnSp>
+      <p:cxnSp>
+        <p:nvCxnSpPr>
+          <p:cNvPr id="35" name="Straight Arrow Connector 34"/>
+          <p:cNvCxnSpPr>
+            <a:stCxn id="24" idx="3"/>
+            <a:endCxn id="23" idx="1"/>
+          </p:cNvCxnSpPr>
+          <p:nvPr/>
+        </p:nvCxnSpPr>
+        <p:spPr>
+          <a:xfrm>
+            <a:off x="3505200" y="4305300"/>
+            <a:ext cx="558114" cy="0"/>
+          </a:xfrm>
+          <a:prstGeom prst="straightConnector1">
+            <a:avLst/>
+          </a:prstGeom>
+          <a:ln>
+            <a:tailEnd type="arrow"/>
+          </a:ln>
+        </p:spPr>
+        <p:style>
+          <a:lnRef idx="1">
+            <a:schemeClr val="accent1"/>
+          </a:lnRef>
+          <a:fillRef idx="0">
+            <a:schemeClr val="accent1"/>
+          </a:fillRef>
+          <a:effectRef idx="0">
+            <a:schemeClr val="accent1"/>
+          </a:effectRef>
+          <a:fontRef idx="minor">
+            <a:schemeClr val="tx1"/>
+          </a:fontRef>
+        </p:style>
+      </p:cxnSp>
+      <p:cxnSp>
+        <p:nvCxnSpPr>
+          <p:cNvPr id="37" name="Straight Arrow Connector 36"/>
+          <p:cNvCxnSpPr>
+            <a:stCxn id="21" idx="0"/>
+          </p:cNvCxnSpPr>
+          <p:nvPr/>
+        </p:nvCxnSpPr>
+        <p:spPr>
+          <a:xfrm flipH="1" flipV="1">
+            <a:off x="4381500" y="4495800"/>
+            <a:ext cx="533400" cy="217272"/>
+          </a:xfrm>
+          <a:prstGeom prst="straightConnector1">
+            <a:avLst/>
+          </a:prstGeom>
+          <a:ln>
+            <a:tailEnd type="arrow"/>
+          </a:ln>
+        </p:spPr>
+        <p:style>
+          <a:lnRef idx="1">
+            <a:schemeClr val="accent1"/>
+          </a:lnRef>
+          <a:fillRef idx="0">
+            <a:schemeClr val="accent1"/>
+          </a:fillRef>
+          <a:effectRef idx="0">
+            <a:schemeClr val="accent1"/>
+          </a:effectRef>
+          <a:fontRef idx="minor">
+            <a:schemeClr val="tx1"/>
+          </a:fontRef>
+        </p:style>
+      </p:cxnSp>
+      <p:cxnSp>
+        <p:nvCxnSpPr>
+          <p:cNvPr id="39" name="Straight Arrow Connector 38"/>
+          <p:cNvCxnSpPr>
+            <a:stCxn id="23" idx="3"/>
+          </p:cNvCxnSpPr>
+          <p:nvPr/>
+        </p:nvCxnSpPr>
+        <p:spPr>
+          <a:xfrm>
+            <a:off x="4596714" y="4305300"/>
+            <a:ext cx="432486" cy="0"/>
+          </a:xfrm>
+          <a:prstGeom prst="straightConnector1">
+            <a:avLst/>
+          </a:prstGeom>
+          <a:ln>
+            <a:tailEnd type="arrow"/>
+          </a:ln>
+        </p:spPr>
+        <p:style>
+          <a:lnRef idx="1">
+            <a:schemeClr val="accent1"/>
+          </a:lnRef>
+          <a:fillRef idx="0">
+            <a:schemeClr val="accent1"/>
+          </a:fillRef>
+          <a:effectRef idx="0">
+            <a:schemeClr val="accent1"/>
+          </a:effectRef>
+          <a:fontRef idx="minor">
+            <a:schemeClr val="tx1"/>
+          </a:fontRef>
+        </p:style>
+      </p:cxnSp>
+      <p:cxnSp>
+        <p:nvCxnSpPr>
+          <p:cNvPr id="41" name="Straight Arrow Connector 40"/>
+          <p:cNvCxnSpPr/>
+          <p:nvPr/>
+        </p:nvCxnSpPr>
+        <p:spPr>
+          <a:xfrm flipH="1">
+            <a:off x="3505200" y="4495800"/>
+            <a:ext cx="558114" cy="0"/>
+          </a:xfrm>
+          <a:prstGeom prst="straightConnector1">
+            <a:avLst/>
+          </a:prstGeom>
+          <a:ln>
+            <a:tailEnd type="arrow"/>
+          </a:ln>
+        </p:spPr>
+        <p:style>
+          <a:lnRef idx="1">
+            <a:schemeClr val="accent1"/>
+          </a:lnRef>
+          <a:fillRef idx="0">
+            <a:schemeClr val="accent1"/>
+          </a:fillRef>
+          <a:effectRef idx="0">
+            <a:schemeClr val="accent1"/>
+          </a:effectRef>
+          <a:fontRef idx="minor">
+            <a:schemeClr val="tx1"/>
+          </a:fontRef>
+        </p:style>
+      </p:cxnSp>
+      <p:cxnSp>
+        <p:nvCxnSpPr>
+          <p:cNvPr id="43" name="Straight Arrow Connector 42"/>
+          <p:cNvCxnSpPr/>
+          <p:nvPr/>
+        </p:nvCxnSpPr>
+        <p:spPr>
+          <a:xfrm flipH="1">
+            <a:off x="2438400" y="4495800"/>
+            <a:ext cx="533400" cy="0"/>
+          </a:xfrm>
+          <a:prstGeom prst="straightConnector1">
+            <a:avLst/>
+          </a:prstGeom>
+          <a:ln>
+            <a:tailEnd type="arrow"/>
+          </a:ln>
+        </p:spPr>
+        <p:style>
+          <a:lnRef idx="1">
+            <a:schemeClr val="accent1"/>
+          </a:lnRef>
+          <a:fillRef idx="0">
+            <a:schemeClr val="accent1"/>
+          </a:fillRef>
+          <a:effectRef idx="0">
+            <a:schemeClr val="accent1"/>
+          </a:effectRef>
+          <a:fontRef idx="minor">
+            <a:schemeClr val="tx1"/>
+          </a:fontRef>
+        </p:style>
+      </p:cxnSp>
+      <p:cxnSp>
+        <p:nvCxnSpPr>
+          <p:cNvPr id="45" name="Straight Arrow Connector 44"/>
+          <p:cNvCxnSpPr/>
+          <p:nvPr/>
+        </p:nvCxnSpPr>
+        <p:spPr>
+          <a:xfrm flipH="1">
+            <a:off x="1295400" y="4495800"/>
+            <a:ext cx="610630" cy="0"/>
+          </a:xfrm>
+          <a:prstGeom prst="straightConnector1">
+            <a:avLst/>
+          </a:prstGeom>
+          <a:ln>
+            <a:tailEnd type="arrow"/>
+          </a:ln>
+        </p:spPr>
+        <p:style>
+          <a:lnRef idx="1">
+            <a:schemeClr val="accent1"/>
+          </a:lnRef>
+          <a:fillRef idx="0">
+            <a:schemeClr val="accent1"/>
+          </a:fillRef>
+          <a:effectRef idx="0">
+            <a:schemeClr val="accent1"/>
+          </a:effectRef>
+          <a:fontRef idx="minor">
+            <a:schemeClr val="tx1"/>
+          </a:fontRef>
+        </p:style>
+      </p:cxnSp>
+      <p:sp>
+        <p:nvSpPr>
+          <p:cNvPr id="46" name="Rectangle 45"/>
+          <p:cNvSpPr/>
+          <p:nvPr/>
+        </p:nvSpPr>
+        <p:spPr>
+          <a:xfrm>
+            <a:off x="4914900" y="6377116"/>
+            <a:ext cx="723900" cy="381000"/>
+          </a:xfrm>
+          <a:prstGeom prst="rect">
+            <a:avLst/>
+          </a:prstGeom>
+          <a:solidFill>
+            <a:schemeClr val="bg1"/>
+          </a:solidFill>
+        </p:spPr>
+        <p:style>
+          <a:lnRef idx="2">
+            <a:schemeClr val="accent1">
+              <a:shade val="50000"/>
+            </a:schemeClr>
+          </a:lnRef>
+          <a:fillRef idx="1">
+            <a:schemeClr val="accent1"/>
+          </a:fillRef>
+          <a:effectRef idx="0">
+            <a:schemeClr val="accent1"/>
+          </a:effectRef>
+          <a:fontRef idx="minor">
+            <a:schemeClr val="lt1"/>
+          </a:fontRef>
+        </p:style>
+        <p:txBody>
+          <a:bodyPr rtlCol="0" anchor="ctr"/>
+          <a:lstStyle/>
+          <a:p>
+            <a:pPr algn="ctr"/>
+            <a:r>
+              <a:rPr lang="en-IE" dirty="0" smtClean="0">
+                <a:solidFill>
+                  <a:sysClr val="windowText" lastClr="000000"/>
+                </a:solidFill>
+              </a:rPr>
+              <a:t>Head</a:t>
+            </a:r>
+            <a:endParaRPr lang="en-IE" dirty="0">
+              <a:solidFill>
+                <a:sysClr val="windowText" lastClr="000000"/>
+              </a:solidFill>
+            </a:endParaRPr>
+          </a:p>
+        </p:txBody>
+      </p:sp>
+      <p:sp>
+        <p:nvSpPr>
+          <p:cNvPr id="47" name="Rectangle 46"/>
+          <p:cNvSpPr/>
+          <p:nvPr/>
+        </p:nvSpPr>
+        <p:spPr>
+          <a:xfrm>
+            <a:off x="266700" y="6400800"/>
+            <a:ext cx="533400" cy="381000"/>
+          </a:xfrm>
+          <a:prstGeom prst="rect">
+            <a:avLst/>
+          </a:prstGeom>
+          <a:solidFill>
+            <a:schemeClr val="bg1"/>
+          </a:solidFill>
+        </p:spPr>
+        <p:style>
+          <a:lnRef idx="2">
+            <a:schemeClr val="accent1">
+              <a:shade val="50000"/>
+            </a:schemeClr>
+          </a:lnRef>
+          <a:fillRef idx="1">
+            <a:schemeClr val="accent1"/>
+          </a:fillRef>
+          <a:effectRef idx="0">
+            <a:schemeClr val="accent1"/>
+          </a:effectRef>
+          <a:fontRef idx="minor">
+            <a:schemeClr val="lt1"/>
+          </a:fontRef>
+        </p:style>
+        <p:txBody>
+          <a:bodyPr rtlCol="0" anchor="ctr"/>
+          <a:lstStyle/>
+          <a:p>
+            <a:pPr algn="ctr"/>
+            <a:r>
+              <a:rPr lang="en-IE" dirty="0" smtClean="0">
+                <a:solidFill>
+                  <a:sysClr val="windowText" lastClr="000000"/>
+                </a:solidFill>
+              </a:rPr>
+              <a:t>Tail</a:t>
+            </a:r>
+            <a:endParaRPr lang="en-IE" dirty="0">
+              <a:solidFill>
+                <a:sysClr val="windowText" lastClr="000000"/>
+              </a:solidFill>
+            </a:endParaRPr>
+          </a:p>
+        </p:txBody>
+      </p:sp>
+      <p:sp>
+        <p:nvSpPr>
+          <p:cNvPr id="48" name="Rectangle 47"/>
+          <p:cNvSpPr/>
+          <p:nvPr/>
+        </p:nvSpPr>
+        <p:spPr>
+          <a:xfrm>
+            <a:off x="4114800" y="5791200"/>
+            <a:ext cx="533400" cy="381000"/>
+          </a:xfrm>
+          <a:prstGeom prst="rect">
+            <a:avLst/>
+          </a:prstGeom>
+          <a:solidFill>
+            <a:schemeClr val="bg1"/>
+          </a:solidFill>
+        </p:spPr>
+        <p:style>
+          <a:lnRef idx="2">
+            <a:schemeClr val="accent1">
+              <a:shade val="50000"/>
+            </a:schemeClr>
+          </a:lnRef>
+          <a:fillRef idx="1">
+            <a:schemeClr val="accent1"/>
+          </a:fillRef>
+          <a:effectRef idx="0">
+            <a:schemeClr val="accent1"/>
+          </a:effectRef>
+          <a:fontRef idx="minor">
+            <a:schemeClr val="lt1"/>
+          </a:fontRef>
+        </p:style>
+        <p:txBody>
+          <a:bodyPr rtlCol="0" anchor="ctr"/>
+          <a:lstStyle/>
+          <a:p>
+            <a:pPr algn="ctr"/>
+            <a:r>
+              <a:rPr lang="en-IE" dirty="0" smtClean="0">
+                <a:solidFill>
+                  <a:sysClr val="windowText" lastClr="000000"/>
+                </a:solidFill>
+              </a:rPr>
+              <a:t>5</a:t>
+            </a:r>
+            <a:endParaRPr lang="en-IE" dirty="0">
+              <a:solidFill>
+                <a:sysClr val="windowText" lastClr="000000"/>
+              </a:solidFill>
+            </a:endParaRPr>
+          </a:p>
+        </p:txBody>
+      </p:sp>
+      <p:sp>
+        <p:nvSpPr>
+          <p:cNvPr id="49" name="Rectangle 48"/>
+          <p:cNvSpPr/>
+          <p:nvPr/>
+        </p:nvSpPr>
+        <p:spPr>
+          <a:xfrm>
+            <a:off x="2971800" y="5792230"/>
+            <a:ext cx="533400" cy="381000"/>
+          </a:xfrm>
+          <a:prstGeom prst="rect">
+            <a:avLst/>
+          </a:prstGeom>
+          <a:solidFill>
+            <a:schemeClr val="bg1"/>
+          </a:solidFill>
+        </p:spPr>
+        <p:style>
+          <a:lnRef idx="2">
+            <a:schemeClr val="accent1">
+              <a:shade val="50000"/>
+            </a:schemeClr>
+          </a:lnRef>
+          <a:fillRef idx="1">
+            <a:schemeClr val="accent1"/>
+          </a:fillRef>
+          <a:effectRef idx="0">
+            <a:schemeClr val="accent1"/>
+          </a:effectRef>
+          <a:fontRef idx="minor">
+            <a:schemeClr val="lt1"/>
+          </a:fontRef>
+        </p:style>
+        <p:txBody>
+          <a:bodyPr rtlCol="0" anchor="ctr"/>
+          <a:lstStyle/>
+          <a:p>
+            <a:pPr algn="ctr"/>
+            <a:r>
+              <a:rPr lang="en-IE" dirty="0" smtClean="0">
+                <a:solidFill>
+                  <a:sysClr val="windowText" lastClr="000000"/>
+                </a:solidFill>
+              </a:rPr>
+              <a:t>4</a:t>
+            </a:r>
+            <a:endParaRPr lang="en-IE" dirty="0">
+              <a:solidFill>
+                <a:sysClr val="windowText" lastClr="000000"/>
+              </a:solidFill>
+            </a:endParaRPr>
+          </a:p>
+        </p:txBody>
+      </p:sp>
+      <p:sp>
+        <p:nvSpPr>
+          <p:cNvPr id="50" name="Rectangle 49"/>
+          <p:cNvSpPr/>
+          <p:nvPr/>
+        </p:nvSpPr>
+        <p:spPr>
+          <a:xfrm>
+            <a:off x="1905000" y="5791200"/>
+            <a:ext cx="533400" cy="381000"/>
+          </a:xfrm>
+          <a:prstGeom prst="rect">
+            <a:avLst/>
+          </a:prstGeom>
+          <a:solidFill>
+            <a:schemeClr val="bg1"/>
+          </a:solidFill>
+        </p:spPr>
+        <p:style>
+          <a:lnRef idx="2">
+            <a:schemeClr val="accent1">
+              <a:shade val="50000"/>
+            </a:schemeClr>
+          </a:lnRef>
+          <a:fillRef idx="1">
+            <a:schemeClr val="accent1"/>
+          </a:fillRef>
+          <a:effectRef idx="0">
+            <a:schemeClr val="accent1"/>
+          </a:effectRef>
+          <a:fontRef idx="minor">
+            <a:schemeClr val="lt1"/>
+          </a:fontRef>
+        </p:style>
+        <p:txBody>
+          <a:bodyPr rtlCol="0" anchor="ctr"/>
+          <a:lstStyle/>
+          <a:p>
+            <a:pPr algn="ctr"/>
+            <a:r>
+              <a:rPr lang="en-IE" dirty="0" smtClean="0">
+                <a:solidFill>
+                  <a:sysClr val="windowText" lastClr="000000"/>
+                </a:solidFill>
+              </a:rPr>
+              <a:t>2</a:t>
+            </a:r>
+            <a:endParaRPr lang="en-IE" dirty="0">
+              <a:solidFill>
+                <a:sysClr val="windowText" lastClr="000000"/>
+              </a:solidFill>
+            </a:endParaRPr>
+          </a:p>
+        </p:txBody>
+      </p:sp>
+      <p:sp>
+        <p:nvSpPr>
+          <p:cNvPr id="51" name="Rectangle 50"/>
+          <p:cNvSpPr/>
+          <p:nvPr/>
+        </p:nvSpPr>
+        <p:spPr>
+          <a:xfrm>
+            <a:off x="838200" y="5791200"/>
+            <a:ext cx="533400" cy="381000"/>
+          </a:xfrm>
+          <a:prstGeom prst="rect">
+            <a:avLst/>
+          </a:prstGeom>
+          <a:solidFill>
+            <a:schemeClr val="bg1"/>
+          </a:solidFill>
+        </p:spPr>
+        <p:style>
+          <a:lnRef idx="2">
+            <a:schemeClr val="accent1">
+              <a:shade val="50000"/>
+            </a:schemeClr>
+          </a:lnRef>
+          <a:fillRef idx="1">
+            <a:schemeClr val="accent1"/>
+          </a:fillRef>
+          <a:effectRef idx="0">
+            <a:schemeClr val="accent1"/>
+          </a:effectRef>
+          <a:fontRef idx="minor">
+            <a:schemeClr val="lt1"/>
+          </a:fontRef>
+        </p:style>
+        <p:txBody>
+          <a:bodyPr rtlCol="0" anchor="ctr"/>
+          <a:lstStyle/>
+          <a:p>
+            <a:pPr algn="ctr"/>
+            <a:r>
+              <a:rPr lang="en-IE" dirty="0" smtClean="0">
+                <a:solidFill>
+                  <a:sysClr val="windowText" lastClr="000000"/>
+                </a:solidFill>
+              </a:rPr>
+              <a:t>2</a:t>
+            </a:r>
+            <a:endParaRPr lang="en-IE" dirty="0">
+              <a:solidFill>
+                <a:sysClr val="windowText" lastClr="000000"/>
+              </a:solidFill>
+            </a:endParaRPr>
+          </a:p>
+        </p:txBody>
+      </p:sp>
+      <p:cxnSp>
+        <p:nvCxnSpPr>
+          <p:cNvPr id="53" name="Straight Arrow Connector 52"/>
+          <p:cNvCxnSpPr>
+            <a:stCxn id="51" idx="3"/>
+            <a:endCxn id="50" idx="1"/>
+          </p:cNvCxnSpPr>
+          <p:nvPr/>
+        </p:nvCxnSpPr>
+        <p:spPr>
+          <a:xfrm>
+            <a:off x="1371600" y="5981700"/>
+            <a:ext cx="533400" cy="0"/>
+          </a:xfrm>
+          <a:prstGeom prst="straightConnector1">
+            <a:avLst/>
+          </a:prstGeom>
+          <a:ln>
+            <a:tailEnd type="arrow"/>
+          </a:ln>
+        </p:spPr>
+        <p:style>
+          <a:lnRef idx="1">
+            <a:schemeClr val="accent1"/>
+          </a:lnRef>
+          <a:fillRef idx="0">
+            <a:schemeClr val="accent1"/>
+          </a:fillRef>
+          <a:effectRef idx="0">
+            <a:schemeClr val="accent1"/>
+          </a:effectRef>
+          <a:fontRef idx="minor">
+            <a:schemeClr val="tx1"/>
+          </a:fontRef>
+        </p:style>
+      </p:cxnSp>
+      <p:cxnSp>
+        <p:nvCxnSpPr>
+          <p:cNvPr id="55" name="Straight Arrow Connector 54"/>
+          <p:cNvCxnSpPr>
+            <a:stCxn id="50" idx="3"/>
+            <a:endCxn id="49" idx="1"/>
+          </p:cNvCxnSpPr>
+          <p:nvPr/>
+        </p:nvCxnSpPr>
+        <p:spPr>
+          <a:xfrm>
+            <a:off x="2438400" y="5981700"/>
+            <a:ext cx="533400" cy="1030"/>
+          </a:xfrm>
+          <a:prstGeom prst="straightConnector1">
+            <a:avLst/>
+          </a:prstGeom>
+          <a:ln>
+            <a:tailEnd type="arrow"/>
+          </a:ln>
+        </p:spPr>
+        <p:style>
+          <a:lnRef idx="1">
+            <a:schemeClr val="accent1"/>
+          </a:lnRef>
+          <a:fillRef idx="0">
+            <a:schemeClr val="accent1"/>
+          </a:fillRef>
+          <a:effectRef idx="0">
+            <a:schemeClr val="accent1"/>
+          </a:effectRef>
+          <a:fontRef idx="minor">
+            <a:schemeClr val="tx1"/>
+          </a:fontRef>
+        </p:style>
+      </p:cxnSp>
+      <p:cxnSp>
+        <p:nvCxnSpPr>
+          <p:cNvPr id="57" name="Straight Arrow Connector 56"/>
+          <p:cNvCxnSpPr>
+            <a:stCxn id="49" idx="3"/>
+            <a:endCxn id="48" idx="1"/>
+          </p:cNvCxnSpPr>
+          <p:nvPr/>
+        </p:nvCxnSpPr>
+        <p:spPr>
+          <a:xfrm flipV="1">
+            <a:off x="3505200" y="5981700"/>
+            <a:ext cx="609600" cy="1030"/>
+          </a:xfrm>
+          <a:prstGeom prst="straightConnector1">
+            <a:avLst/>
+          </a:prstGeom>
+          <a:ln>
+            <a:tailEnd type="arrow"/>
+          </a:ln>
+        </p:spPr>
+        <p:style>
+          <a:lnRef idx="1">
+            <a:schemeClr val="accent1"/>
+          </a:lnRef>
+          <a:fillRef idx="0">
+            <a:schemeClr val="accent1"/>
+          </a:fillRef>
+          <a:effectRef idx="0">
+            <a:schemeClr val="accent1"/>
+          </a:effectRef>
+          <a:fontRef idx="minor">
+            <a:schemeClr val="tx1"/>
+          </a:fontRef>
+        </p:style>
+      </p:cxnSp>
+      <p:cxnSp>
+        <p:nvCxnSpPr>
+          <p:cNvPr id="59" name="Straight Arrow Connector 58"/>
+          <p:cNvCxnSpPr/>
+          <p:nvPr/>
+        </p:nvCxnSpPr>
+        <p:spPr>
+          <a:xfrm>
+            <a:off x="4648200" y="5981700"/>
+            <a:ext cx="533400" cy="0"/>
+          </a:xfrm>
+          <a:prstGeom prst="straightConnector1">
+            <a:avLst/>
+          </a:prstGeom>
+          <a:ln>
+            <a:tailEnd type="arrow"/>
+          </a:ln>
+        </p:spPr>
+        <p:style>
+          <a:lnRef idx="1">
+            <a:schemeClr val="accent1"/>
+          </a:lnRef>
+          <a:fillRef idx="0">
+            <a:schemeClr val="accent1"/>
+          </a:fillRef>
+          <a:effectRef idx="0">
+            <a:schemeClr val="accent1"/>
+          </a:effectRef>
+          <a:fontRef idx="minor">
+            <a:schemeClr val="tx1"/>
+          </a:fontRef>
+        </p:style>
+      </p:cxnSp>
+      <p:cxnSp>
+        <p:nvCxnSpPr>
+          <p:cNvPr id="61" name="Straight Arrow Connector 60"/>
+          <p:cNvCxnSpPr>
+            <a:stCxn id="47" idx="0"/>
+          </p:cNvCxnSpPr>
+          <p:nvPr/>
+        </p:nvCxnSpPr>
+        <p:spPr>
+          <a:xfrm flipV="1">
+            <a:off x="533400" y="5982730"/>
+            <a:ext cx="266700" cy="418070"/>
+          </a:xfrm>
+          <a:prstGeom prst="straightConnector1">
+            <a:avLst/>
+          </a:prstGeom>
+          <a:ln>
+            <a:tailEnd type="arrow"/>
+          </a:ln>
+        </p:spPr>
+        <p:style>
+          <a:lnRef idx="1">
+            <a:schemeClr val="accent1"/>
+          </a:lnRef>
+          <a:fillRef idx="0">
+            <a:schemeClr val="accent1"/>
+          </a:fillRef>
+          <a:effectRef idx="0">
+            <a:schemeClr val="accent1"/>
+          </a:effectRef>
+          <a:fontRef idx="minor">
+            <a:schemeClr val="tx1"/>
+          </a:fontRef>
+        </p:style>
+      </p:cxnSp>
+      <p:cxnSp>
+        <p:nvCxnSpPr>
+          <p:cNvPr id="63" name="Straight Arrow Connector 62"/>
+          <p:cNvCxnSpPr>
+            <a:stCxn id="46" idx="1"/>
+            <a:endCxn id="48" idx="2"/>
+          </p:cNvCxnSpPr>
+          <p:nvPr/>
+        </p:nvCxnSpPr>
+        <p:spPr>
+          <a:xfrm flipH="1" flipV="1">
+            <a:off x="4381500" y="6172200"/>
+            <a:ext cx="533400" cy="395416"/>
+          </a:xfrm>
+          <a:prstGeom prst="straightConnector1">
+            <a:avLst/>
+          </a:prstGeom>
+          <a:ln>
+            <a:tailEnd type="arrow"/>
+          </a:ln>
+        </p:spPr>
+        <p:style>
+          <a:lnRef idx="1">
+            <a:schemeClr val="accent1"/>
+          </a:lnRef>
+          <a:fillRef idx="0">
+            <a:schemeClr val="accent1"/>
+          </a:fillRef>
+          <a:effectRef idx="0">
+            <a:schemeClr val="accent1"/>
+          </a:effectRef>
+          <a:fontRef idx="minor">
+            <a:schemeClr val="tx1"/>
+          </a:fontRef>
+        </p:style>
+      </p:cxnSp>
     </p:spTree>
     <p:extLst>
       <p:ext uri="{BB962C8B-B14F-4D97-AF65-F5344CB8AC3E}">
-        <p14:creationId xmlns:p14="http://schemas.microsoft.com/office/powerpoint/2010/main" val="469012117"/>
+        <p14:creationId xmlns:p14="http://schemas.microsoft.com/office/powerpoint/2010/main" val="2658147231"/>
       </p:ext>
     </p:extLst>
   </p:cSld>

</xml_diff>

<commit_message>
Collected some hash table data
</commit_message>
<xml_diff>
--- a/Report/FYP_Presentation.pptx
+++ b/Report/FYP_Presentation.pptx
@@ -439,11 +439,11 @@
         </c:dLbls>
         <c:marker val="1"/>
         <c:smooth val="0"/>
-        <c:axId val="34099584"/>
-        <c:axId val="34111488"/>
+        <c:axId val="74622848"/>
+        <c:axId val="74629120"/>
       </c:lineChart>
       <c:catAx>
-        <c:axId val="34099584"/>
+        <c:axId val="74622848"/>
         <c:scaling>
           <c:orientation val="minMax"/>
         </c:scaling>
@@ -472,7 +472,7 @@
         <c:majorTickMark val="out"/>
         <c:minorTickMark val="none"/>
         <c:tickLblPos val="nextTo"/>
-        <c:crossAx val="34111488"/>
+        <c:crossAx val="74629120"/>
         <c:crosses val="autoZero"/>
         <c:auto val="1"/>
         <c:lblAlgn val="ctr"/>
@@ -480,7 +480,7 @@
         <c:noMultiLvlLbl val="0"/>
       </c:catAx>
       <c:valAx>
-        <c:axId val="34111488"/>
+        <c:axId val="74629120"/>
         <c:scaling>
           <c:orientation val="minMax"/>
         </c:scaling>
@@ -510,7 +510,7 @@
         <c:majorTickMark val="out"/>
         <c:minorTickMark val="none"/>
         <c:tickLblPos val="nextTo"/>
-        <c:crossAx val="34099584"/>
+        <c:crossAx val="74622848"/>
         <c:crosses val="autoZero"/>
         <c:crossBetween val="between"/>
       </c:valAx>
@@ -830,11 +830,11 @@
         </c:dLbls>
         <c:marker val="1"/>
         <c:smooth val="0"/>
-        <c:axId val="43938176"/>
-        <c:axId val="43940480"/>
+        <c:axId val="74664960"/>
+        <c:axId val="74675328"/>
       </c:lineChart>
       <c:catAx>
-        <c:axId val="43938176"/>
+        <c:axId val="74664960"/>
         <c:scaling>
           <c:orientation val="minMax"/>
         </c:scaling>
@@ -863,7 +863,7 @@
         <c:majorTickMark val="out"/>
         <c:minorTickMark val="none"/>
         <c:tickLblPos val="nextTo"/>
-        <c:crossAx val="43940480"/>
+        <c:crossAx val="74675328"/>
         <c:crosses val="autoZero"/>
         <c:auto val="1"/>
         <c:lblAlgn val="ctr"/>
@@ -871,7 +871,7 @@
         <c:noMultiLvlLbl val="0"/>
       </c:catAx>
       <c:valAx>
-        <c:axId val="43940480"/>
+        <c:axId val="74675328"/>
         <c:scaling>
           <c:orientation val="minMax"/>
         </c:scaling>
@@ -901,7 +901,7 @@
         <c:majorTickMark val="out"/>
         <c:minorTickMark val="none"/>
         <c:tickLblPos val="nextTo"/>
-        <c:crossAx val="43938176"/>
+        <c:crossAx val="74664960"/>
         <c:crosses val="autoZero"/>
         <c:crossBetween val="between"/>
       </c:valAx>
@@ -1221,11 +1221,11 @@
         </c:dLbls>
         <c:marker val="1"/>
         <c:smooth val="0"/>
-        <c:axId val="78711424"/>
-        <c:axId val="78721792"/>
+        <c:axId val="75907456"/>
+        <c:axId val="75909376"/>
       </c:lineChart>
       <c:catAx>
-        <c:axId val="78711424"/>
+        <c:axId val="75907456"/>
         <c:scaling>
           <c:orientation val="minMax"/>
         </c:scaling>
@@ -1254,7 +1254,7 @@
         <c:majorTickMark val="out"/>
         <c:minorTickMark val="none"/>
         <c:tickLblPos val="nextTo"/>
-        <c:crossAx val="78721792"/>
+        <c:crossAx val="75909376"/>
         <c:crosses val="autoZero"/>
         <c:auto val="1"/>
         <c:lblAlgn val="ctr"/>
@@ -1262,7 +1262,7 @@
         <c:noMultiLvlLbl val="0"/>
       </c:catAx>
       <c:valAx>
-        <c:axId val="78721792"/>
+        <c:axId val="75909376"/>
         <c:scaling>
           <c:orientation val="minMax"/>
         </c:scaling>
@@ -1292,7 +1292,7 @@
         <c:majorTickMark val="out"/>
         <c:minorTickMark val="none"/>
         <c:tickLblPos val="nextTo"/>
-        <c:crossAx val="78711424"/>
+        <c:crossAx val="75907456"/>
         <c:crosses val="autoZero"/>
         <c:crossBetween val="between"/>
       </c:valAx>
@@ -1525,11 +1525,11 @@
         </c:dLbls>
         <c:marker val="1"/>
         <c:smooth val="0"/>
-        <c:axId val="42408960"/>
-        <c:axId val="42939904"/>
+        <c:axId val="76223232"/>
+        <c:axId val="76225152"/>
       </c:lineChart>
       <c:catAx>
-        <c:axId val="42408960"/>
+        <c:axId val="76223232"/>
         <c:scaling>
           <c:orientation val="minMax"/>
         </c:scaling>
@@ -1558,7 +1558,7 @@
         <c:majorTickMark val="out"/>
         <c:minorTickMark val="none"/>
         <c:tickLblPos val="nextTo"/>
-        <c:crossAx val="42939904"/>
+        <c:crossAx val="76225152"/>
         <c:crosses val="autoZero"/>
         <c:auto val="1"/>
         <c:lblAlgn val="ctr"/>
@@ -1566,7 +1566,7 @@
         <c:noMultiLvlLbl val="0"/>
       </c:catAx>
       <c:valAx>
-        <c:axId val="42939904"/>
+        <c:axId val="76225152"/>
         <c:scaling>
           <c:orientation val="minMax"/>
         </c:scaling>
@@ -1596,7 +1596,7 @@
         <c:majorTickMark val="out"/>
         <c:minorTickMark val="none"/>
         <c:tickLblPos val="nextTo"/>
-        <c:crossAx val="42408960"/>
+        <c:crossAx val="76223232"/>
         <c:crosses val="autoZero"/>
         <c:crossBetween val="between"/>
       </c:valAx>
@@ -1829,11 +1829,11 @@
         </c:dLbls>
         <c:marker val="1"/>
         <c:smooth val="0"/>
-        <c:axId val="78736768"/>
-        <c:axId val="81105664"/>
+        <c:axId val="76244096"/>
+        <c:axId val="76246016"/>
       </c:lineChart>
       <c:catAx>
-        <c:axId val="78736768"/>
+        <c:axId val="76244096"/>
         <c:scaling>
           <c:orientation val="minMax"/>
         </c:scaling>
@@ -1862,7 +1862,7 @@
         <c:majorTickMark val="out"/>
         <c:minorTickMark val="none"/>
         <c:tickLblPos val="nextTo"/>
-        <c:crossAx val="81105664"/>
+        <c:crossAx val="76246016"/>
         <c:crosses val="autoZero"/>
         <c:auto val="1"/>
         <c:lblAlgn val="ctr"/>
@@ -1870,7 +1870,7 @@
         <c:noMultiLvlLbl val="0"/>
       </c:catAx>
       <c:valAx>
-        <c:axId val="81105664"/>
+        <c:axId val="76246016"/>
         <c:scaling>
           <c:orientation val="minMax"/>
         </c:scaling>
@@ -1900,7 +1900,7 @@
         <c:majorTickMark val="out"/>
         <c:minorTickMark val="none"/>
         <c:tickLblPos val="nextTo"/>
-        <c:crossAx val="78736768"/>
+        <c:crossAx val="76244096"/>
         <c:crosses val="autoZero"/>
         <c:crossBetween val="between"/>
       </c:valAx>
@@ -2133,11 +2133,11 @@
         </c:dLbls>
         <c:marker val="1"/>
         <c:smooth val="0"/>
-        <c:axId val="83867904"/>
-        <c:axId val="86352256"/>
+        <c:axId val="73082368"/>
+        <c:axId val="73084288"/>
       </c:lineChart>
       <c:catAx>
-        <c:axId val="83867904"/>
+        <c:axId val="73082368"/>
         <c:scaling>
           <c:orientation val="minMax"/>
         </c:scaling>
@@ -2166,7 +2166,7 @@
         <c:majorTickMark val="out"/>
         <c:minorTickMark val="none"/>
         <c:tickLblPos val="nextTo"/>
-        <c:crossAx val="86352256"/>
+        <c:crossAx val="73084288"/>
         <c:crosses val="autoZero"/>
         <c:auto val="1"/>
         <c:lblAlgn val="ctr"/>
@@ -2174,7 +2174,7 @@
         <c:noMultiLvlLbl val="0"/>
       </c:catAx>
       <c:valAx>
-        <c:axId val="86352256"/>
+        <c:axId val="73084288"/>
         <c:scaling>
           <c:orientation val="minMax"/>
         </c:scaling>
@@ -2204,7 +2204,7 @@
         <c:majorTickMark val="out"/>
         <c:minorTickMark val="none"/>
         <c:tickLblPos val="nextTo"/>
-        <c:crossAx val="83867904"/>
+        <c:crossAx val="73082368"/>
         <c:crosses val="autoZero"/>
         <c:crossBetween val="between"/>
       </c:valAx>
@@ -2306,7 +2306,7 @@
           <a:p>
             <a:fld id="{BC8F7A16-14FD-4EB5-B1E6-1AFC570F7645}" type="datetimeFigureOut">
               <a:rPr lang="en-IE" smtClean="0"/>
-              <a:t>31/03/2014</a:t>
+              <a:t>02/04/2014</a:t>
             </a:fld>
             <a:endParaRPr lang="en-IE"/>
           </a:p>
@@ -2755,7 +2755,7 @@
           <a:p>
             <a:fld id="{88460CD9-5D16-4ACF-BEBF-7066784FD23F}" type="datetime1">
               <a:rPr lang="en-US" smtClean="0"/>
-              <a:t>3/31/2014</a:t>
+              <a:t>4/2/2014</a:t>
             </a:fld>
             <a:endParaRPr lang="en-US"/>
           </a:p>
@@ -2921,7 +2921,7 @@
           <a:p>
             <a:fld id="{2EB6E1CB-20B3-40D1-9280-71D244A83D8E}" type="datetime1">
               <a:rPr lang="en-US" smtClean="0"/>
-              <a:t>3/31/2014</a:t>
+              <a:t>4/2/2014</a:t>
             </a:fld>
             <a:endParaRPr lang="en-US"/>
           </a:p>
@@ -3097,7 +3097,7 @@
           <a:p>
             <a:fld id="{0494C836-D170-47AB-BC1C-A40B02EA525C}" type="datetime1">
               <a:rPr lang="en-US" smtClean="0"/>
-              <a:t>3/31/2014</a:t>
+              <a:t>4/2/2014</a:t>
             </a:fld>
             <a:endParaRPr lang="en-US"/>
           </a:p>
@@ -3263,7 +3263,7 @@
           <a:p>
             <a:fld id="{DFE89DDC-7AE9-4FE4-BA33-76B64857618B}" type="datetime1">
               <a:rPr lang="en-US" smtClean="0"/>
-              <a:t>3/31/2014</a:t>
+              <a:t>4/2/2014</a:t>
             </a:fld>
             <a:endParaRPr lang="en-US"/>
           </a:p>
@@ -3505,7 +3505,7 @@
           <a:p>
             <a:fld id="{C40309E5-2AB2-44B0-842B-FFC1C21D7168}" type="datetime1">
               <a:rPr lang="en-US" smtClean="0"/>
-              <a:t>3/31/2014</a:t>
+              <a:t>4/2/2014</a:t>
             </a:fld>
             <a:endParaRPr lang="en-US"/>
           </a:p>
@@ -3789,7 +3789,7 @@
           <a:p>
             <a:fld id="{EFE4F76C-5CC4-4148-84B3-29C608D1B1A3}" type="datetime1">
               <a:rPr lang="en-US" smtClean="0"/>
-              <a:t>3/31/2014</a:t>
+              <a:t>4/2/2014</a:t>
             </a:fld>
             <a:endParaRPr lang="en-US"/>
           </a:p>
@@ -4207,7 +4207,7 @@
           <a:p>
             <a:fld id="{F799A748-9D51-4EBA-A2BB-364788F562A6}" type="datetime1">
               <a:rPr lang="en-US" smtClean="0"/>
-              <a:t>3/31/2014</a:t>
+              <a:t>4/2/2014</a:t>
             </a:fld>
             <a:endParaRPr lang="en-US"/>
           </a:p>
@@ -4321,7 +4321,7 @@
           <a:p>
             <a:fld id="{FC418AC3-0503-4A47-B753-104DE3F81EB2}" type="datetime1">
               <a:rPr lang="en-US" smtClean="0"/>
-              <a:t>3/31/2014</a:t>
+              <a:t>4/2/2014</a:t>
             </a:fld>
             <a:endParaRPr lang="en-US"/>
           </a:p>
@@ -4412,7 +4412,7 @@
           <a:p>
             <a:fld id="{A92A8CA2-BD65-4679-B58B-40912BF64724}" type="datetime1">
               <a:rPr lang="en-US" smtClean="0"/>
-              <a:t>3/31/2014</a:t>
+              <a:t>4/2/2014</a:t>
             </a:fld>
             <a:endParaRPr lang="en-US"/>
           </a:p>
@@ -4685,7 +4685,7 @@
           <a:p>
             <a:fld id="{27371409-E6EB-4850-B52B-DEFD041F2A9E}" type="datetime1">
               <a:rPr lang="en-US" smtClean="0"/>
-              <a:t>3/31/2014</a:t>
+              <a:t>4/2/2014</a:t>
             </a:fld>
             <a:endParaRPr lang="en-US"/>
           </a:p>
@@ -4934,7 +4934,7 @@
           <a:p>
             <a:fld id="{0788A745-EB1A-421D-92BA-3BAC39737967}" type="datetime1">
               <a:rPr lang="en-US" smtClean="0"/>
-              <a:t>3/31/2014</a:t>
+              <a:t>4/2/2014</a:t>
             </a:fld>
             <a:endParaRPr lang="en-US"/>
           </a:p>
@@ -5143,7 +5143,7 @@
           <a:p>
             <a:fld id="{B8673A36-D0E0-4555-9432-9FA894708CFE}" type="datetime1">
               <a:rPr lang="en-US" smtClean="0"/>
-              <a:t>3/31/2014</a:t>
+              <a:t>4/2/2014</a:t>
             </a:fld>
             <a:endParaRPr lang="en-US"/>
           </a:p>
@@ -5656,11 +5656,7 @@
           <a:p>
             <a:r>
               <a:rPr lang="en-IE" dirty="0" smtClean="0"/>
-              <a:t>Locked </a:t>
-            </a:r>
-            <a:r>
-              <a:rPr lang="en-IE" dirty="0" smtClean="0"/>
-              <a:t>Variations</a:t>
+              <a:t>Locked Variations</a:t>
             </a:r>
           </a:p>
           <a:p>
@@ -5691,59 +5687,30 @@
               <a:rPr lang="en-IE" dirty="0" smtClean="0"/>
               <a:t>ompare-and-swap</a:t>
             </a:r>
-            <a:endParaRPr lang="en-IE" dirty="0" smtClean="0"/>
           </a:p>
           <a:p>
             <a:r>
               <a:rPr lang="en-IE" dirty="0" smtClean="0"/>
-              <a:t>Lockless </a:t>
-            </a:r>
+              <a:t>Lockless Variations</a:t>
+            </a:r>
+          </a:p>
+          <a:p>
+            <a:pPr lvl="1"/>
             <a:r>
               <a:rPr lang="en-IE" dirty="0" smtClean="0"/>
-              <a:t>Variations</a:t>
-            </a:r>
-          </a:p>
-          <a:p>
-            <a:pPr lvl="1"/>
+              <a:t>C++11 atomic library operations</a:t>
+            </a:r>
+          </a:p>
+          <a:p>
             <a:r>
               <a:rPr lang="en-IE" dirty="0" smtClean="0"/>
-              <a:t>C</a:t>
-            </a:r>
+              <a:t>Multi Producer Multi Consumer (MPMC) </a:t>
+            </a:r>
+          </a:p>
+          <a:p>
             <a:r>
               <a:rPr lang="en-IE" dirty="0" smtClean="0"/>
-              <a:t>++11 atomic library operations</a:t>
-            </a:r>
-          </a:p>
-          <a:p>
-            <a:r>
-              <a:rPr lang="en-IE" dirty="0" smtClean="0"/>
-              <a:t>Multi </a:t>
-            </a:r>
-            <a:r>
-              <a:rPr lang="en-IE" dirty="0" smtClean="0"/>
-              <a:t>Producer Multi Consumer (MPMC</a:t>
-            </a:r>
-            <a:r>
-              <a:rPr lang="en-IE" dirty="0" smtClean="0"/>
-              <a:t>) </a:t>
-            </a:r>
-          </a:p>
-          <a:p>
-            <a:r>
-              <a:rPr lang="en-IE" dirty="0" smtClean="0"/>
-              <a:t>Single </a:t>
-            </a:r>
-            <a:r>
-              <a:rPr lang="en-IE" dirty="0" smtClean="0"/>
-              <a:t>Producer </a:t>
-            </a:r>
-            <a:r>
-              <a:rPr lang="en-IE" dirty="0" smtClean="0"/>
-              <a:t>Single </a:t>
-            </a:r>
-            <a:r>
-              <a:rPr lang="en-IE" dirty="0" smtClean="0"/>
-              <a:t>Consumer (SPSC)</a:t>
+              <a:t>Single Producer Single Consumer (SPSC)</a:t>
             </a:r>
             <a:endParaRPr lang="en-IE" dirty="0"/>
           </a:p>
@@ -5858,17 +5825,12 @@
               <a:rPr lang="en-IE" dirty="0" smtClean="0"/>
               <a:t>MPMC Locked</a:t>
             </a:r>
-            <a:endParaRPr lang="en-IE" dirty="0" smtClean="0"/>
           </a:p>
           <a:p>
             <a:pPr lvl="1"/>
             <a:r>
               <a:rPr lang="en-IE" dirty="0" smtClean="0"/>
-              <a:t>SPSC </a:t>
-            </a:r>
-            <a:r>
-              <a:rPr lang="en-IE" dirty="0" smtClean="0"/>
-              <a:t>Lockless</a:t>
+              <a:t>SPSC Lockless</a:t>
             </a:r>
             <a:endParaRPr lang="en-IE" dirty="0"/>
           </a:p>
@@ -5976,13 +5938,8 @@
             </a:r>
             <a:r>
               <a:rPr lang="en-IE" dirty="0" smtClean="0"/>
-              <a:t>inked </a:t>
-            </a:r>
-            <a:r>
-              <a:rPr lang="en-IE" dirty="0" smtClean="0"/>
-              <a:t>List – Locked/Lockless</a:t>
-            </a:r>
-            <a:endParaRPr lang="en-IE" dirty="0" smtClean="0"/>
+              <a:t>inked List – Locked/Lockless</a:t>
+            </a:r>
           </a:p>
           <a:p>
             <a:pPr marL="0" indent="0">
@@ -7746,22 +7703,14 @@
           <a:p>
             <a:r>
               <a:rPr lang="en-IE" dirty="0" smtClean="0"/>
-              <a:t>Closed </a:t>
-            </a:r>
+              <a:t>Closed Addressing</a:t>
+            </a:r>
+          </a:p>
+          <a:p>
+            <a:pPr lvl="1"/>
             <a:r>
               <a:rPr lang="en-IE" dirty="0" smtClean="0"/>
-              <a:t>Addressing</a:t>
-            </a:r>
-          </a:p>
-          <a:p>
-            <a:pPr lvl="1"/>
-            <a:r>
-              <a:rPr lang="en-IE" dirty="0" smtClean="0"/>
-              <a:t>Collisions </a:t>
-            </a:r>
-            <a:r>
-              <a:rPr lang="en-IE" dirty="0" smtClean="0"/>
-              <a:t>are added onto a linked list</a:t>
+              <a:t>Collisions are added onto a linked list</a:t>
             </a:r>
           </a:p>
           <a:p>
@@ -7780,11 +7729,7 @@
             <a:pPr lvl="1"/>
             <a:r>
               <a:rPr lang="en-IE" dirty="0" smtClean="0"/>
-              <a:t>MPMC </a:t>
-            </a:r>
-            <a:r>
-              <a:rPr lang="en-IE" dirty="0" smtClean="0"/>
-              <a:t>Globally Locked Hash Table </a:t>
+              <a:t>MPMC Globally Locked Hash Table </a:t>
             </a:r>
           </a:p>
           <a:p>
@@ -7928,15 +7873,7 @@
             </a:r>
             <a:r>
               <a:rPr lang="en-IE" sz="3200" dirty="0" smtClean="0"/>
-              <a:t>(</a:t>
-            </a:r>
-            <a:r>
-              <a:rPr lang="en-IE" sz="3200" dirty="0" smtClean="0"/>
-              <a:t>Ivy Bridge EX 22nm</a:t>
-            </a:r>
-            <a:r>
-              <a:rPr lang="en-IE" sz="3200" dirty="0" smtClean="0"/>
-              <a:t>, </a:t>
+              <a:t>(Ivy Bridge EX 22nm, </a:t>
             </a:r>
             <a:r>
               <a:rPr lang="en-IE" sz="3200" dirty="0"/>
@@ -8096,20 +8033,11 @@
               <a:rPr lang="en-IE" dirty="0" smtClean="0"/>
               <a:t>Locked vs Lockless</a:t>
             </a:r>
-            <a:endParaRPr lang="en-IE" dirty="0" smtClean="0"/>
           </a:p>
           <a:p>
             <a:r>
               <a:rPr lang="en-IE" dirty="0" smtClean="0"/>
-              <a:t>Used </a:t>
-            </a:r>
-            <a:r>
-              <a:rPr lang="en-IE" dirty="0" smtClean="0"/>
-              <a:t>Hardware Performance </a:t>
-            </a:r>
-            <a:r>
-              <a:rPr lang="en-IE" dirty="0" smtClean="0"/>
-              <a:t>Counters</a:t>
+              <a:t>Used Hardware Performance Counters</a:t>
             </a:r>
           </a:p>
           <a:p>
@@ -8138,15 +8066,7 @@
             <a:pPr lvl="1"/>
             <a:r>
               <a:rPr lang="en-IE" dirty="0" smtClean="0"/>
-              <a:t>R</a:t>
-            </a:r>
-            <a:r>
-              <a:rPr lang="en-IE" dirty="0" smtClean="0"/>
-              <a:t>ecord </a:t>
-            </a:r>
-            <a:r>
-              <a:rPr lang="en-IE" dirty="0" smtClean="0"/>
-              <a:t>cache misses, </a:t>
+              <a:t>Record cache misses, </a:t>
             </a:r>
             <a:r>
               <a:rPr lang="en-IE" dirty="0" err="1" smtClean="0"/>
@@ -8653,22 +8573,14 @@
           <a:p>
             <a:r>
               <a:rPr lang="en-IE" dirty="0" smtClean="0"/>
-              <a:t>Concurrent Data </a:t>
-            </a:r>
+              <a:t>Concurrent Data Structure</a:t>
+            </a:r>
+          </a:p>
+          <a:p>
+            <a:pPr lvl="1"/>
             <a:r>
               <a:rPr lang="en-IE" dirty="0" smtClean="0"/>
-              <a:t>Structure</a:t>
-            </a:r>
-          </a:p>
-          <a:p>
-            <a:pPr lvl="1"/>
-            <a:r>
-              <a:rPr lang="en-IE" dirty="0" smtClean="0"/>
-              <a:t>Designed </a:t>
-            </a:r>
-            <a:r>
-              <a:rPr lang="en-IE" dirty="0" smtClean="0"/>
-              <a:t>for access by multiple threads</a:t>
+              <a:t>Designed for access by multiple threads</a:t>
             </a:r>
           </a:p>
           <a:p>
@@ -8971,13 +8883,8 @@
           <a:p>
             <a:r>
               <a:rPr lang="en-IE" dirty="0" smtClean="0"/>
-              <a:t>Sample of Hardware Performance Counter Data from previous </a:t>
-            </a:r>
-            <a:r>
-              <a:rPr lang="en-IE" dirty="0" smtClean="0"/>
-              <a:t>slide (Cube):</a:t>
-            </a:r>
-            <a:endParaRPr lang="en-IE" dirty="0" smtClean="0"/>
+              <a:t>Sample of Hardware Performance Counter Data from previous slide (Cube):</a:t>
+            </a:r>
           </a:p>
           <a:p>
             <a:pPr marL="0" indent="0">
@@ -9311,8 +9218,12 @@
           <a:p>
             <a:pPr lvl="1"/>
             <a:r>
+              <a:rPr lang="en-IE" smtClean="0"/>
+              <a:t>Generally provide </a:t>
+            </a:r>
+            <a:r>
               <a:rPr lang="en-IE" dirty="0" smtClean="0"/>
-              <a:t>Generally provides a performance boost when compared to locked algorithms</a:t>
+              <a:t>a performance boost when compared to locked algorithms</a:t>
             </a:r>
           </a:p>
           <a:p>
@@ -9321,7 +9232,6 @@
               <a:rPr lang="en-IE" dirty="0" smtClean="0"/>
               <a:t>There are always exceptions</a:t>
             </a:r>
-            <a:endParaRPr lang="en-IE" dirty="0" smtClean="0"/>
           </a:p>
           <a:p>
             <a:pPr marL="0" indent="0">
@@ -9491,7 +9401,6 @@
               <a:rPr lang="en-IE" dirty="0" smtClean="0"/>
               <a:t>Hash Table</a:t>
             </a:r>
-            <a:endParaRPr lang="en-IE" dirty="0" smtClean="0"/>
           </a:p>
           <a:p>
             <a:pPr marL="0" indent="0">
@@ -9661,7 +9570,6 @@
               <a:rPr lang="en-IE" dirty="0" smtClean="0"/>
               <a:t>	}</a:t>
             </a:r>
-            <a:endParaRPr lang="en-IE" dirty="0" smtClean="0"/>
           </a:p>
           <a:p>
             <a:endParaRPr lang="en-IE" dirty="0"/>
@@ -9762,13 +9670,8 @@
           <a:p>
             <a:r>
               <a:rPr lang="en-IE" dirty="0" smtClean="0"/>
-              <a:t>Can use compare-and-swap </a:t>
-            </a:r>
-            <a:r>
-              <a:rPr lang="en-IE" dirty="0" smtClean="0"/>
-              <a:t>to atomically add a node to the head of a linked list:</a:t>
-            </a:r>
-            <a:endParaRPr lang="en-IE" dirty="0" smtClean="0"/>
+              <a:t>Can use compare-and-swap to atomically add a node to the head of a linked list:</a:t>
+            </a:r>
           </a:p>
           <a:p>
             <a:pPr marL="0" indent="0">
@@ -11175,15 +11078,7 @@
             </a:r>
             <a:r>
               <a:rPr lang="en-IE" dirty="0" smtClean="0"/>
-              <a:t> </a:t>
-            </a:r>
-            <a:r>
-              <a:rPr lang="en-IE" dirty="0" smtClean="0"/>
-              <a:t>as </a:t>
-            </a:r>
-            <a:r>
-              <a:rPr lang="en-IE" dirty="0" smtClean="0"/>
-              <a:t>follows:</a:t>
+              <a:t> as follows:</a:t>
             </a:r>
           </a:p>
           <a:p>
@@ -11271,13 +11166,8 @@
           <a:p>
             <a:r>
               <a:rPr lang="en-IE" dirty="0" smtClean="0"/>
-              <a:t>Similarly we can use compare-and-swap to implement a lock which will allow us to do the same </a:t>
-            </a:r>
-            <a:r>
-              <a:rPr lang="en-IE" dirty="0" smtClean="0"/>
-              <a:t>thing:</a:t>
-            </a:r>
-            <a:endParaRPr lang="en-IE" dirty="0" smtClean="0"/>
+              <a:t>Similarly we can use compare-and-swap to implement a lock which will allow us to do the same thing:</a:t>
+            </a:r>
           </a:p>
           <a:p>
             <a:pPr marL="0" indent="0">
@@ -11510,15 +11400,7 @@
             <a:pPr lvl="1"/>
             <a:r>
               <a:rPr lang="en-IE" dirty="0" smtClean="0"/>
-              <a:t>Uses mutexes and </a:t>
-            </a:r>
-            <a:r>
-              <a:rPr lang="en-IE" dirty="0" smtClean="0"/>
-              <a:t>semaphores to acquire a </a:t>
-            </a:r>
-            <a:r>
-              <a:rPr lang="en-IE" dirty="0" smtClean="0"/>
-              <a:t>lock</a:t>
+              <a:t>Uses mutexes and semaphores to acquire a lock</a:t>
             </a:r>
           </a:p>
           <a:p>
@@ -11529,68 +11411,40 @@
             </a:r>
             <a:r>
               <a:rPr lang="en-IE" dirty="0" smtClean="0"/>
-              <a:t>locks </a:t>
-            </a:r>
+              <a:t>locks threads that do not have the lock</a:t>
+            </a:r>
+          </a:p>
+          <a:p>
             <a:r>
               <a:rPr lang="en-IE" dirty="0" smtClean="0"/>
-              <a:t>threads that do not have the lock</a:t>
-            </a:r>
-          </a:p>
-          <a:p>
+              <a:t>Lock Free</a:t>
+            </a:r>
+          </a:p>
+          <a:p>
+            <a:pPr lvl="1"/>
             <a:r>
               <a:rPr lang="en-IE" dirty="0" smtClean="0"/>
-              <a:t>Lock </a:t>
-            </a:r>
+              <a:t>Uses atomic instructions such as compare-and-swap</a:t>
+            </a:r>
+          </a:p>
+          <a:p>
+            <a:pPr lvl="1"/>
             <a:r>
               <a:rPr lang="en-IE" dirty="0" smtClean="0"/>
-              <a:t>Free</a:t>
+              <a:t>Guarantees system-wide throughput with the chance of starvation</a:t>
+            </a:r>
+          </a:p>
+          <a:p>
+            <a:r>
+              <a:rPr lang="en-IE" dirty="0" smtClean="0"/>
+              <a:t>Wait Free</a:t>
             </a:r>
           </a:p>
           <a:p>
             <a:pPr lvl="1"/>
             <a:r>
               <a:rPr lang="en-IE" dirty="0" smtClean="0"/>
-              <a:t>Uses </a:t>
-            </a:r>
-            <a:r>
-              <a:rPr lang="en-IE" dirty="0" smtClean="0"/>
-              <a:t>atomic instructions such as </a:t>
-            </a:r>
-            <a:r>
-              <a:rPr lang="en-IE" dirty="0" smtClean="0"/>
-              <a:t>compare-and-swap</a:t>
-            </a:r>
-          </a:p>
-          <a:p>
-            <a:pPr lvl="1"/>
-            <a:r>
-              <a:rPr lang="en-IE" dirty="0" smtClean="0"/>
-              <a:t>Guarantees </a:t>
-            </a:r>
-            <a:r>
-              <a:rPr lang="en-IE" dirty="0" smtClean="0"/>
-              <a:t>system-wide throughput with the chance of starvation</a:t>
-            </a:r>
-          </a:p>
-          <a:p>
-            <a:r>
-              <a:rPr lang="en-IE" dirty="0" smtClean="0"/>
-              <a:t>Wait </a:t>
-            </a:r>
-            <a:r>
-              <a:rPr lang="en-IE" dirty="0" smtClean="0"/>
-              <a:t>Free</a:t>
-            </a:r>
-          </a:p>
-          <a:p>
-            <a:pPr lvl="1"/>
-            <a:r>
-              <a:rPr lang="en-IE" dirty="0" smtClean="0"/>
-              <a:t>Similar </a:t>
-            </a:r>
-            <a:r>
-              <a:rPr lang="en-IE" dirty="0" smtClean="0"/>
-              <a:t>to lock free but is also starvation free</a:t>
+              <a:t>Similar to lock free but is also starvation free</a:t>
             </a:r>
             <a:endParaRPr lang="en-IE" dirty="0"/>
           </a:p>
@@ -11852,11 +11706,7 @@
           <a:p>
             <a:r>
               <a:rPr lang="en-IE" dirty="0" smtClean="0"/>
-              <a:t>“Implementing Concurrent Data Objects” – Herlihy </a:t>
-            </a:r>
-            <a:r>
-              <a:rPr lang="en-IE" dirty="0" smtClean="0"/>
-              <a:t>– 1993</a:t>
+              <a:t>“Implementing Concurrent Data Objects” – Herlihy – 1993</a:t>
             </a:r>
           </a:p>
         </p:txBody>
@@ -11994,17 +11844,8 @@
             </a:r>
             <a:r>
               <a:rPr lang="en-IE" dirty="0" smtClean="0"/>
-              <a:t>ompared </a:t>
-            </a:r>
-            <a:r>
-              <a:rPr lang="en-IE" dirty="0" smtClean="0"/>
-              <a:t>them on 3 different </a:t>
-            </a:r>
-            <a:r>
-              <a:rPr lang="en-IE" dirty="0" smtClean="0"/>
-              <a:t>systems</a:t>
-            </a:r>
-            <a:endParaRPr lang="en-IE" dirty="0" smtClean="0"/>
+              <a:t>ompared them on 3 different systems</a:t>
+            </a:r>
           </a:p>
         </p:txBody>
       </p:sp>

</xml_diff>

<commit_message>
Added to the report, updated the work diary
</commit_message>
<xml_diff>
--- a/Report/FYP_Presentation.pptx
+++ b/Report/FYP_Presentation.pptx
@@ -5,7 +5,7 @@
     <p:sldMasterId id="2147483648" r:id="rId1"/>
   </p:sldMasterIdLst>
   <p:notesMasterIdLst>
-    <p:notesMasterId r:id="rId26"/>
+    <p:notesMasterId r:id="rId27"/>
   </p:notesMasterIdLst>
   <p:sldIdLst>
     <p:sldId id="256" r:id="rId2"/>
@@ -14,24 +14,25 @@
     <p:sldId id="272" r:id="rId5"/>
     <p:sldId id="274" r:id="rId6"/>
     <p:sldId id="266" r:id="rId7"/>
-    <p:sldId id="258" r:id="rId8"/>
-    <p:sldId id="259" r:id="rId9"/>
-    <p:sldId id="260" r:id="rId10"/>
-    <p:sldId id="267" r:id="rId11"/>
-    <p:sldId id="268" r:id="rId12"/>
-    <p:sldId id="269" r:id="rId13"/>
-    <p:sldId id="270" r:id="rId14"/>
-    <p:sldId id="275" r:id="rId15"/>
-    <p:sldId id="261" r:id="rId16"/>
-    <p:sldId id="279" r:id="rId17"/>
-    <p:sldId id="277" r:id="rId18"/>
-    <p:sldId id="278" r:id="rId19"/>
-    <p:sldId id="280" r:id="rId20"/>
-    <p:sldId id="282" r:id="rId21"/>
-    <p:sldId id="283" r:id="rId22"/>
-    <p:sldId id="281" r:id="rId23"/>
-    <p:sldId id="263" r:id="rId24"/>
-    <p:sldId id="284" r:id="rId25"/>
+    <p:sldId id="259" r:id="rId8"/>
+    <p:sldId id="260" r:id="rId9"/>
+    <p:sldId id="267" r:id="rId10"/>
+    <p:sldId id="268" r:id="rId11"/>
+    <p:sldId id="269" r:id="rId12"/>
+    <p:sldId id="270" r:id="rId13"/>
+    <p:sldId id="275" r:id="rId14"/>
+    <p:sldId id="261" r:id="rId15"/>
+    <p:sldId id="279" r:id="rId16"/>
+    <p:sldId id="277" r:id="rId17"/>
+    <p:sldId id="278" r:id="rId18"/>
+    <p:sldId id="280" r:id="rId19"/>
+    <p:sldId id="282" r:id="rId20"/>
+    <p:sldId id="283" r:id="rId21"/>
+    <p:sldId id="281" r:id="rId22"/>
+    <p:sldId id="263" r:id="rId23"/>
+    <p:sldId id="284" r:id="rId24"/>
+    <p:sldId id="285" r:id="rId25"/>
+    <p:sldId id="286" r:id="rId26"/>
   </p:sldIdLst>
   <p:sldSz cx="9144000" cy="6858000" type="screen4x3"/>
   <p:notesSz cx="6858000" cy="9144000"/>
@@ -439,11 +440,11 @@
         </c:dLbls>
         <c:marker val="1"/>
         <c:smooth val="0"/>
-        <c:axId val="74622848"/>
-        <c:axId val="74629120"/>
+        <c:axId val="92645248"/>
+        <c:axId val="92651520"/>
       </c:lineChart>
       <c:catAx>
-        <c:axId val="74622848"/>
+        <c:axId val="92645248"/>
         <c:scaling>
           <c:orientation val="minMax"/>
         </c:scaling>
@@ -472,7 +473,7 @@
         <c:majorTickMark val="out"/>
         <c:minorTickMark val="none"/>
         <c:tickLblPos val="nextTo"/>
-        <c:crossAx val="74629120"/>
+        <c:crossAx val="92651520"/>
         <c:crosses val="autoZero"/>
         <c:auto val="1"/>
         <c:lblAlgn val="ctr"/>
@@ -480,7 +481,7 @@
         <c:noMultiLvlLbl val="0"/>
       </c:catAx>
       <c:valAx>
-        <c:axId val="74629120"/>
+        <c:axId val="92651520"/>
         <c:scaling>
           <c:orientation val="minMax"/>
         </c:scaling>
@@ -510,7 +511,7 @@
         <c:majorTickMark val="out"/>
         <c:minorTickMark val="none"/>
         <c:tickLblPos val="nextTo"/>
-        <c:crossAx val="74622848"/>
+        <c:crossAx val="92645248"/>
         <c:crosses val="autoZero"/>
         <c:crossBetween val="between"/>
       </c:valAx>
@@ -830,11 +831,11 @@
         </c:dLbls>
         <c:marker val="1"/>
         <c:smooth val="0"/>
-        <c:axId val="74664960"/>
-        <c:axId val="74675328"/>
+        <c:axId val="93211648"/>
+        <c:axId val="93222016"/>
       </c:lineChart>
       <c:catAx>
-        <c:axId val="74664960"/>
+        <c:axId val="93211648"/>
         <c:scaling>
           <c:orientation val="minMax"/>
         </c:scaling>
@@ -863,7 +864,7 @@
         <c:majorTickMark val="out"/>
         <c:minorTickMark val="none"/>
         <c:tickLblPos val="nextTo"/>
-        <c:crossAx val="74675328"/>
+        <c:crossAx val="93222016"/>
         <c:crosses val="autoZero"/>
         <c:auto val="1"/>
         <c:lblAlgn val="ctr"/>
@@ -871,7 +872,7 @@
         <c:noMultiLvlLbl val="0"/>
       </c:catAx>
       <c:valAx>
-        <c:axId val="74675328"/>
+        <c:axId val="93222016"/>
         <c:scaling>
           <c:orientation val="minMax"/>
         </c:scaling>
@@ -901,7 +902,7 @@
         <c:majorTickMark val="out"/>
         <c:minorTickMark val="none"/>
         <c:tickLblPos val="nextTo"/>
-        <c:crossAx val="74664960"/>
+        <c:crossAx val="93211648"/>
         <c:crosses val="autoZero"/>
         <c:crossBetween val="between"/>
       </c:valAx>
@@ -1221,11 +1222,11 @@
         </c:dLbls>
         <c:marker val="1"/>
         <c:smooth val="0"/>
-        <c:axId val="75907456"/>
-        <c:axId val="75909376"/>
+        <c:axId val="93274496"/>
+        <c:axId val="93276416"/>
       </c:lineChart>
       <c:catAx>
-        <c:axId val="75907456"/>
+        <c:axId val="93274496"/>
         <c:scaling>
           <c:orientation val="minMax"/>
         </c:scaling>
@@ -1254,7 +1255,7 @@
         <c:majorTickMark val="out"/>
         <c:minorTickMark val="none"/>
         <c:tickLblPos val="nextTo"/>
-        <c:crossAx val="75909376"/>
+        <c:crossAx val="93276416"/>
         <c:crosses val="autoZero"/>
         <c:auto val="1"/>
         <c:lblAlgn val="ctr"/>
@@ -1262,7 +1263,7 @@
         <c:noMultiLvlLbl val="0"/>
       </c:catAx>
       <c:valAx>
-        <c:axId val="75909376"/>
+        <c:axId val="93276416"/>
         <c:scaling>
           <c:orientation val="minMax"/>
         </c:scaling>
@@ -1292,7 +1293,7 @@
         <c:majorTickMark val="out"/>
         <c:minorTickMark val="none"/>
         <c:tickLblPos val="nextTo"/>
-        <c:crossAx val="75907456"/>
+        <c:crossAx val="93274496"/>
         <c:crosses val="autoZero"/>
         <c:crossBetween val="between"/>
       </c:valAx>
@@ -1525,11 +1526,11 @@
         </c:dLbls>
         <c:marker val="1"/>
         <c:smooth val="0"/>
-        <c:axId val="76223232"/>
-        <c:axId val="76225152"/>
+        <c:axId val="93324032"/>
+        <c:axId val="93325952"/>
       </c:lineChart>
       <c:catAx>
-        <c:axId val="76223232"/>
+        <c:axId val="93324032"/>
         <c:scaling>
           <c:orientation val="minMax"/>
         </c:scaling>
@@ -1558,7 +1559,7 @@
         <c:majorTickMark val="out"/>
         <c:minorTickMark val="none"/>
         <c:tickLblPos val="nextTo"/>
-        <c:crossAx val="76225152"/>
+        <c:crossAx val="93325952"/>
         <c:crosses val="autoZero"/>
         <c:auto val="1"/>
         <c:lblAlgn val="ctr"/>
@@ -1566,7 +1567,7 @@
         <c:noMultiLvlLbl val="0"/>
       </c:catAx>
       <c:valAx>
-        <c:axId val="76225152"/>
+        <c:axId val="93325952"/>
         <c:scaling>
           <c:orientation val="minMax"/>
         </c:scaling>
@@ -1596,7 +1597,7 @@
         <c:majorTickMark val="out"/>
         <c:minorTickMark val="none"/>
         <c:tickLblPos val="nextTo"/>
-        <c:crossAx val="76223232"/>
+        <c:crossAx val="93324032"/>
         <c:crosses val="autoZero"/>
         <c:crossBetween val="between"/>
       </c:valAx>
@@ -1829,11 +1830,11 @@
         </c:dLbls>
         <c:marker val="1"/>
         <c:smooth val="0"/>
-        <c:axId val="76244096"/>
-        <c:axId val="76246016"/>
+        <c:axId val="93348992"/>
+        <c:axId val="93350912"/>
       </c:lineChart>
       <c:catAx>
-        <c:axId val="76244096"/>
+        <c:axId val="93348992"/>
         <c:scaling>
           <c:orientation val="minMax"/>
         </c:scaling>
@@ -1862,7 +1863,7 @@
         <c:majorTickMark val="out"/>
         <c:minorTickMark val="none"/>
         <c:tickLblPos val="nextTo"/>
-        <c:crossAx val="76246016"/>
+        <c:crossAx val="93350912"/>
         <c:crosses val="autoZero"/>
         <c:auto val="1"/>
         <c:lblAlgn val="ctr"/>
@@ -1870,7 +1871,7 @@
         <c:noMultiLvlLbl val="0"/>
       </c:catAx>
       <c:valAx>
-        <c:axId val="76246016"/>
+        <c:axId val="93350912"/>
         <c:scaling>
           <c:orientation val="minMax"/>
         </c:scaling>
@@ -1900,7 +1901,7 @@
         <c:majorTickMark val="out"/>
         <c:minorTickMark val="none"/>
         <c:tickLblPos val="nextTo"/>
-        <c:crossAx val="76244096"/>
+        <c:crossAx val="93348992"/>
         <c:crosses val="autoZero"/>
         <c:crossBetween val="between"/>
       </c:valAx>
@@ -2133,11 +2134,11 @@
         </c:dLbls>
         <c:marker val="1"/>
         <c:smooth val="0"/>
-        <c:axId val="73082368"/>
-        <c:axId val="73084288"/>
+        <c:axId val="92476928"/>
+        <c:axId val="92478848"/>
       </c:lineChart>
       <c:catAx>
-        <c:axId val="73082368"/>
+        <c:axId val="92476928"/>
         <c:scaling>
           <c:orientation val="minMax"/>
         </c:scaling>
@@ -2166,7 +2167,7 @@
         <c:majorTickMark val="out"/>
         <c:minorTickMark val="none"/>
         <c:tickLblPos val="nextTo"/>
-        <c:crossAx val="73084288"/>
+        <c:crossAx val="92478848"/>
         <c:crosses val="autoZero"/>
         <c:auto val="1"/>
         <c:lblAlgn val="ctr"/>
@@ -2174,7 +2175,7 @@
         <c:noMultiLvlLbl val="0"/>
       </c:catAx>
       <c:valAx>
-        <c:axId val="73084288"/>
+        <c:axId val="92478848"/>
         <c:scaling>
           <c:orientation val="minMax"/>
         </c:scaling>
@@ -2204,7 +2205,7 @@
         <c:majorTickMark val="out"/>
         <c:minorTickMark val="none"/>
         <c:tickLblPos val="nextTo"/>
-        <c:crossAx val="73082368"/>
+        <c:crossAx val="92476928"/>
         <c:crosses val="autoZero"/>
         <c:crossBetween val="between"/>
       </c:valAx>
@@ -5631,7 +5632,7 @@
           <a:p>
             <a:r>
               <a:rPr lang="en-IE" dirty="0" smtClean="0"/>
-              <a:t>Data Structure Implementation</a:t>
+              <a:t>Ring Buffer</a:t>
             </a:r>
             <a:endParaRPr lang="en-IE" dirty="0"/>
           </a:p>
@@ -5649,68 +5650,32 @@
         </p:nvSpPr>
         <p:spPr/>
         <p:txBody>
-          <a:bodyPr>
-            <a:normAutofit/>
-          </a:bodyPr>
+          <a:bodyPr/>
           <a:lstStyle/>
           <a:p>
             <a:r>
               <a:rPr lang="en-IE" dirty="0" smtClean="0"/>
-              <a:t>Locked Variations</a:t>
+              <a:t>Used to get to grips with the C++11 library</a:t>
+            </a:r>
+          </a:p>
+          <a:p>
+            <a:r>
+              <a:rPr lang="en-IE" dirty="0" smtClean="0"/>
+              <a:t>Variations</a:t>
             </a:r>
           </a:p>
           <a:p>
             <a:pPr lvl="1"/>
             <a:r>
               <a:rPr lang="en-IE" dirty="0" smtClean="0"/>
-              <a:t>Mutex</a:t>
+              <a:t>MPMC Locked</a:t>
             </a:r>
           </a:p>
           <a:p>
             <a:pPr lvl="1"/>
             <a:r>
-              <a:rPr lang="en-IE" dirty="0"/>
-              <a:t>T</a:t>
-            </a:r>
-            <a:r>
               <a:rPr lang="en-IE" dirty="0" smtClean="0"/>
-              <a:t>est-and-set</a:t>
-            </a:r>
-          </a:p>
-          <a:p>
-            <a:pPr lvl="1"/>
-            <a:r>
-              <a:rPr lang="en-IE" dirty="0"/>
-              <a:t>C</a:t>
-            </a:r>
-            <a:r>
-              <a:rPr lang="en-IE" dirty="0" smtClean="0"/>
-              <a:t>ompare-and-swap</a:t>
-            </a:r>
-          </a:p>
-          <a:p>
-            <a:r>
-              <a:rPr lang="en-IE" dirty="0" smtClean="0"/>
-              <a:t>Lockless Variations</a:t>
-            </a:r>
-          </a:p>
-          <a:p>
-            <a:pPr lvl="1"/>
-            <a:r>
-              <a:rPr lang="en-IE" dirty="0" smtClean="0"/>
-              <a:t>C++11 atomic library operations</a:t>
-            </a:r>
-          </a:p>
-          <a:p>
-            <a:r>
-              <a:rPr lang="en-IE" dirty="0" smtClean="0"/>
-              <a:t>Multi Producer Multi Consumer (MPMC) </a:t>
-            </a:r>
-          </a:p>
-          <a:p>
-            <a:r>
-              <a:rPr lang="en-IE" dirty="0" smtClean="0"/>
-              <a:t>Single Producer Single Consumer (SPSC)</a:t>
+              <a:t>SPSC Lockless</a:t>
             </a:r>
             <a:endParaRPr lang="en-IE" dirty="0"/>
           </a:p>
@@ -5735,126 +5700,6 @@
               <a:rPr lang="en-US" smtClean="0"/>
               <a:pPr/>
               <a:t>10</a:t>
-            </a:fld>
-            <a:endParaRPr lang="en-US"/>
-          </a:p>
-        </p:txBody>
-      </p:sp>
-    </p:spTree>
-    <p:extLst>
-      <p:ext uri="{BB962C8B-B14F-4D97-AF65-F5344CB8AC3E}">
-        <p14:creationId xmlns:p14="http://schemas.microsoft.com/office/powerpoint/2010/main" val="3503624377"/>
-      </p:ext>
-    </p:extLst>
-  </p:cSld>
-  <p:clrMapOvr>
-    <a:masterClrMapping/>
-  </p:clrMapOvr>
-</p:sld>
-</file>
-
-<file path=ppt/slides/slide11.xml><?xml version="1.0" encoding="utf-8"?>
-<p:sld xmlns:a="http://schemas.openxmlformats.org/drawingml/2006/main" xmlns:r="http://schemas.openxmlformats.org/officeDocument/2006/relationships" xmlns:p="http://schemas.openxmlformats.org/presentationml/2006/main">
-  <p:cSld>
-    <p:spTree>
-      <p:nvGrpSpPr>
-        <p:cNvPr id="1" name=""/>
-        <p:cNvGrpSpPr/>
-        <p:nvPr/>
-      </p:nvGrpSpPr>
-      <p:grpSpPr>
-        <a:xfrm>
-          <a:off x="0" y="0"/>
-          <a:ext cx="0" cy="0"/>
-          <a:chOff x="0" y="0"/>
-          <a:chExt cx="0" cy="0"/>
-        </a:xfrm>
-      </p:grpSpPr>
-      <p:sp>
-        <p:nvSpPr>
-          <p:cNvPr id="2" name="Title 1"/>
-          <p:cNvSpPr>
-            <a:spLocks noGrp="1"/>
-          </p:cNvSpPr>
-          <p:nvPr>
-            <p:ph type="title"/>
-          </p:nvPr>
-        </p:nvSpPr>
-        <p:spPr/>
-        <p:txBody>
-          <a:bodyPr/>
-          <a:lstStyle/>
-          <a:p>
-            <a:r>
-              <a:rPr lang="en-IE" dirty="0" smtClean="0"/>
-              <a:t>Ring Buffer</a:t>
-            </a:r>
-            <a:endParaRPr lang="en-IE" dirty="0"/>
-          </a:p>
-        </p:txBody>
-      </p:sp>
-      <p:sp>
-        <p:nvSpPr>
-          <p:cNvPr id="3" name="Content Placeholder 2"/>
-          <p:cNvSpPr>
-            <a:spLocks noGrp="1"/>
-          </p:cNvSpPr>
-          <p:nvPr>
-            <p:ph idx="1"/>
-          </p:nvPr>
-        </p:nvSpPr>
-        <p:spPr/>
-        <p:txBody>
-          <a:bodyPr/>
-          <a:lstStyle/>
-          <a:p>
-            <a:r>
-              <a:rPr lang="en-IE" dirty="0" smtClean="0"/>
-              <a:t>Used to get to grips with the C++11 library</a:t>
-            </a:r>
-          </a:p>
-          <a:p>
-            <a:r>
-              <a:rPr lang="en-IE" dirty="0" smtClean="0"/>
-              <a:t>Variations</a:t>
-            </a:r>
-          </a:p>
-          <a:p>
-            <a:pPr lvl="1"/>
-            <a:r>
-              <a:rPr lang="en-IE" dirty="0" smtClean="0"/>
-              <a:t>MPMC Locked</a:t>
-            </a:r>
-          </a:p>
-          <a:p>
-            <a:pPr lvl="1"/>
-            <a:r>
-              <a:rPr lang="en-IE" dirty="0" smtClean="0"/>
-              <a:t>SPSC Lockless</a:t>
-            </a:r>
-            <a:endParaRPr lang="en-IE" dirty="0"/>
-          </a:p>
-        </p:txBody>
-      </p:sp>
-      <p:sp>
-        <p:nvSpPr>
-          <p:cNvPr id="4" name="Slide Number Placeholder 3"/>
-          <p:cNvSpPr>
-            <a:spLocks noGrp="1"/>
-          </p:cNvSpPr>
-          <p:nvPr>
-            <p:ph type="sldNum" sz="quarter" idx="12"/>
-          </p:nvPr>
-        </p:nvSpPr>
-        <p:spPr/>
-        <p:txBody>
-          <a:bodyPr/>
-          <a:lstStyle/>
-          <a:p>
-            <a:fld id="{B6F15528-21DE-4FAA-801E-634DDDAF4B2B}" type="slidenum">
-              <a:rPr lang="en-US" smtClean="0"/>
-              <a:pPr/>
-              <a:t>11</a:t>
             </a:fld>
             <a:endParaRPr lang="en-US"/>
           </a:p>
@@ -5873,7 +5718,7 @@
 </p:sld>
 </file>
 
-<file path=ppt/slides/slide12.xml><?xml version="1.0" encoding="utf-8"?>
+<file path=ppt/slides/slide11.xml><?xml version="1.0" encoding="utf-8"?>
 <p:sld xmlns:a="http://schemas.openxmlformats.org/drawingml/2006/main" xmlns:r="http://schemas.openxmlformats.org/officeDocument/2006/relationships" xmlns:p="http://schemas.openxmlformats.org/presentationml/2006/main">
   <p:cSld>
     <p:spTree>
@@ -7627,7 +7472,7 @@
             <a:fld id="{B6F15528-21DE-4FAA-801E-634DDDAF4B2B}" type="slidenum">
               <a:rPr lang="en-US" smtClean="0"/>
               <a:pPr/>
-              <a:t>12</a:t>
+              <a:t>11</a:t>
             </a:fld>
             <a:endParaRPr lang="en-US"/>
           </a:p>
@@ -7637,6 +7482,177 @@
     <p:extLst>
       <p:ext uri="{BB962C8B-B14F-4D97-AF65-F5344CB8AC3E}">
         <p14:creationId xmlns:p14="http://schemas.microsoft.com/office/powerpoint/2010/main" val="2658147231"/>
+      </p:ext>
+    </p:extLst>
+  </p:cSld>
+  <p:clrMapOvr>
+    <a:masterClrMapping/>
+  </p:clrMapOvr>
+</p:sld>
+</file>
+
+<file path=ppt/slides/slide12.xml><?xml version="1.0" encoding="utf-8"?>
+<p:sld xmlns:a="http://schemas.openxmlformats.org/drawingml/2006/main" xmlns:r="http://schemas.openxmlformats.org/officeDocument/2006/relationships" xmlns:p="http://schemas.openxmlformats.org/presentationml/2006/main">
+  <p:cSld>
+    <p:spTree>
+      <p:nvGrpSpPr>
+        <p:cNvPr id="1" name=""/>
+        <p:cNvGrpSpPr/>
+        <p:nvPr/>
+      </p:nvGrpSpPr>
+      <p:grpSpPr>
+        <a:xfrm>
+          <a:off x="0" y="0"/>
+          <a:ext cx="0" cy="0"/>
+          <a:chOff x="0" y="0"/>
+          <a:chExt cx="0" cy="0"/>
+        </a:xfrm>
+      </p:grpSpPr>
+      <p:sp>
+        <p:nvSpPr>
+          <p:cNvPr id="2" name="Title 1"/>
+          <p:cNvSpPr>
+            <a:spLocks noGrp="1"/>
+          </p:cNvSpPr>
+          <p:nvPr>
+            <p:ph type="title"/>
+          </p:nvPr>
+        </p:nvSpPr>
+        <p:spPr/>
+        <p:txBody>
+          <a:bodyPr/>
+          <a:lstStyle/>
+          <a:p>
+            <a:r>
+              <a:rPr lang="en-IE" dirty="0" smtClean="0"/>
+              <a:t>Hash Table</a:t>
+            </a:r>
+            <a:endParaRPr lang="en-IE" dirty="0"/>
+          </a:p>
+        </p:txBody>
+      </p:sp>
+      <p:sp>
+        <p:nvSpPr>
+          <p:cNvPr id="3" name="Content Placeholder 2"/>
+          <p:cNvSpPr>
+            <a:spLocks noGrp="1"/>
+          </p:cNvSpPr>
+          <p:nvPr>
+            <p:ph idx="1"/>
+          </p:nvPr>
+        </p:nvSpPr>
+        <p:spPr/>
+        <p:txBody>
+          <a:bodyPr>
+            <a:normAutofit fontScale="85000" lnSpcReduction="20000"/>
+          </a:bodyPr>
+          <a:lstStyle/>
+          <a:p>
+            <a:r>
+              <a:rPr lang="en-IE" dirty="0" smtClean="0"/>
+              <a:t>Closed Addressing</a:t>
+            </a:r>
+          </a:p>
+          <a:p>
+            <a:pPr lvl="1"/>
+            <a:r>
+              <a:rPr lang="en-IE" dirty="0" smtClean="0"/>
+              <a:t>Collisions are added onto a linked list</a:t>
+            </a:r>
+          </a:p>
+          <a:p>
+            <a:r>
+              <a:rPr lang="en-IE" dirty="0" smtClean="0"/>
+              <a:t>Functionality</a:t>
+            </a:r>
+          </a:p>
+          <a:p>
+            <a:pPr lvl="1"/>
+            <a:r>
+              <a:rPr lang="en-IE" dirty="0" smtClean="0"/>
+              <a:t>Contains</a:t>
+            </a:r>
+          </a:p>
+          <a:p>
+            <a:pPr lvl="1"/>
+            <a:r>
+              <a:rPr lang="en-IE" dirty="0" smtClean="0"/>
+              <a:t>Add</a:t>
+            </a:r>
+          </a:p>
+          <a:p>
+            <a:pPr lvl="1"/>
+            <a:r>
+              <a:rPr lang="en-IE" dirty="0" smtClean="0"/>
+              <a:t>Remove</a:t>
+            </a:r>
+          </a:p>
+          <a:p>
+            <a:pPr lvl="1"/>
+            <a:r>
+              <a:rPr lang="en-IE" dirty="0" smtClean="0"/>
+              <a:t>Resize</a:t>
+            </a:r>
+            <a:endParaRPr lang="en-IE" dirty="0" smtClean="0"/>
+          </a:p>
+          <a:p>
+            <a:r>
+              <a:rPr lang="en-IE" dirty="0" smtClean="0"/>
+              <a:t>Variations</a:t>
+            </a:r>
+          </a:p>
+          <a:p>
+            <a:pPr lvl="1"/>
+            <a:r>
+              <a:rPr lang="en-IE" dirty="0" smtClean="0"/>
+              <a:t>MPMC Globally Locked Hash Table </a:t>
+            </a:r>
+          </a:p>
+          <a:p>
+            <a:pPr lvl="1"/>
+            <a:r>
+              <a:rPr lang="en-IE" dirty="0" smtClean="0"/>
+              <a:t>MPMC Lock Per List </a:t>
+            </a:r>
+          </a:p>
+          <a:p>
+            <a:pPr lvl="1"/>
+            <a:r>
+              <a:rPr lang="en-IE" dirty="0" smtClean="0"/>
+              <a:t>MPMC Lockless</a:t>
+            </a:r>
+            <a:endParaRPr lang="en-IE" dirty="0"/>
+          </a:p>
+        </p:txBody>
+      </p:sp>
+      <p:sp>
+        <p:nvSpPr>
+          <p:cNvPr id="4" name="Slide Number Placeholder 3"/>
+          <p:cNvSpPr>
+            <a:spLocks noGrp="1"/>
+          </p:cNvSpPr>
+          <p:nvPr>
+            <p:ph type="sldNum" sz="quarter" idx="12"/>
+          </p:nvPr>
+        </p:nvSpPr>
+        <p:spPr/>
+        <p:txBody>
+          <a:bodyPr/>
+          <a:lstStyle/>
+          <a:p>
+            <a:fld id="{B6F15528-21DE-4FAA-801E-634DDDAF4B2B}" type="slidenum">
+              <a:rPr lang="en-US" smtClean="0"/>
+              <a:pPr/>
+              <a:t>12</a:t>
+            </a:fld>
+            <a:endParaRPr lang="en-US"/>
+          </a:p>
+        </p:txBody>
+      </p:sp>
+    </p:spTree>
+    <p:extLst>
+      <p:ext uri="{BB962C8B-B14F-4D97-AF65-F5344CB8AC3E}">
+        <p14:creationId xmlns:p14="http://schemas.microsoft.com/office/powerpoint/2010/main" val="227156003"/>
       </p:ext>
     </p:extLst>
   </p:cSld>
@@ -7680,7 +7696,7 @@
           <a:p>
             <a:r>
               <a:rPr lang="en-IE" dirty="0" smtClean="0"/>
-              <a:t>Hash Table</a:t>
+              <a:t>System Details</a:t>
             </a:r>
             <a:endParaRPr lang="en-IE" dirty="0"/>
           </a:p>
@@ -7701,50 +7717,75 @@
           <a:bodyPr/>
           <a:lstStyle/>
           <a:p>
-            <a:r>
-              <a:rPr lang="en-IE" dirty="0" smtClean="0"/>
-              <a:t>Closed Addressing</a:t>
-            </a:r>
-          </a:p>
-          <a:p>
-            <a:pPr lvl="1"/>
-            <a:r>
-              <a:rPr lang="en-IE" dirty="0" smtClean="0"/>
-              <a:t>Collisions are added onto a linked list</a:t>
-            </a:r>
-          </a:p>
-          <a:p>
-            <a:r>
-              <a:rPr lang="en-IE" dirty="0" smtClean="0"/>
-              <a:t>Contains/Add/Remove/Resize</a:t>
-            </a:r>
-          </a:p>
-          <a:p>
-            <a:r>
-              <a:rPr lang="en-IE" dirty="0" smtClean="0"/>
-              <a:t>Variations</a:t>
-            </a:r>
-          </a:p>
-          <a:p>
-            <a:pPr lvl="1"/>
-            <a:r>
-              <a:rPr lang="en-IE" dirty="0" smtClean="0"/>
-              <a:t>MPMC Globally Locked Hash Table </a:t>
-            </a:r>
-          </a:p>
-          <a:p>
-            <a:pPr lvl="1"/>
-            <a:r>
-              <a:rPr lang="en-IE" dirty="0" smtClean="0"/>
-              <a:t>MPMC Lock Per List </a:t>
-            </a:r>
-          </a:p>
-          <a:p>
-            <a:pPr lvl="1"/>
-            <a:r>
-              <a:rPr lang="en-IE" dirty="0" smtClean="0"/>
-              <a:t>MPMC Lockless</a:t>
-            </a:r>
+            <a:pPr lvl="1">
+              <a:buFont typeface="Arial" panose="020B0604020202020204" pitchFamily="34" charset="0"/>
+              <a:buChar char="•"/>
+            </a:pPr>
+            <a:r>
+              <a:rPr lang="en-IE" sz="3200" dirty="0" smtClean="0"/>
+              <a:t>My </a:t>
+            </a:r>
+            <a:r>
+              <a:rPr lang="en-IE" sz="3200" dirty="0"/>
+              <a:t>Local Machine </a:t>
+            </a:r>
+            <a:r>
+              <a:rPr lang="en-IE" sz="3200" dirty="0" smtClean="0"/>
+              <a:t>(Sandy Bridge 32nm, </a:t>
+            </a:r>
+            <a:r>
+              <a:rPr lang="en-IE" sz="3200" dirty="0"/>
+              <a:t>4 Cores @ 3.30GHz)</a:t>
+            </a:r>
+          </a:p>
+          <a:p>
+            <a:pPr lvl="1">
+              <a:buFont typeface="Arial" panose="020B0604020202020204" pitchFamily="34" charset="0"/>
+              <a:buChar char="•"/>
+            </a:pPr>
+            <a:r>
+              <a:rPr lang="en-IE" sz="3200" dirty="0"/>
+              <a:t>Stoker </a:t>
+            </a:r>
+            <a:r>
+              <a:rPr lang="en-IE" sz="3200" dirty="0" smtClean="0"/>
+              <a:t>(Ivy Bridge EX 22nm, </a:t>
+            </a:r>
+            <a:r>
+              <a:rPr lang="en-IE" sz="3200" dirty="0"/>
+              <a:t>32 Cores @ 2.00GHz)</a:t>
+            </a:r>
+          </a:p>
+          <a:p>
+            <a:pPr lvl="1">
+              <a:buFont typeface="Arial" panose="020B0604020202020204" pitchFamily="34" charset="0"/>
+              <a:buChar char="•"/>
+            </a:pPr>
+            <a:r>
+              <a:rPr lang="en-IE" sz="3200" dirty="0"/>
+              <a:t>Cube </a:t>
+            </a:r>
+            <a:r>
+              <a:rPr lang="en-IE" sz="3200" dirty="0" smtClean="0"/>
+              <a:t>(</a:t>
+            </a:r>
+            <a:r>
+              <a:rPr lang="en-IE" sz="3200" dirty="0" err="1" smtClean="0"/>
+              <a:t>Gainestown</a:t>
+            </a:r>
+            <a:r>
+              <a:rPr lang="en-IE" sz="3200" dirty="0" smtClean="0"/>
+              <a:t> 45nm, </a:t>
+            </a:r>
+            <a:r>
+              <a:rPr lang="en-IE" sz="3200" dirty="0"/>
+              <a:t>16 Cores @ 2.27 GHz)</a:t>
+            </a:r>
+          </a:p>
+          <a:p>
+            <a:pPr marL="0" indent="0">
+              <a:buNone/>
+            </a:pPr>
             <a:endParaRPr lang="en-IE" dirty="0"/>
           </a:p>
         </p:txBody>
@@ -7776,7 +7817,7 @@
     </p:spTree>
     <p:extLst>
       <p:ext uri="{BB962C8B-B14F-4D97-AF65-F5344CB8AC3E}">
-        <p14:creationId xmlns:p14="http://schemas.microsoft.com/office/powerpoint/2010/main" val="227156003"/>
+        <p14:creationId xmlns:p14="http://schemas.microsoft.com/office/powerpoint/2010/main" val="3586616813"/>
       </p:ext>
     </p:extLst>
   </p:cSld>
@@ -7820,7 +7861,7 @@
           <a:p>
             <a:r>
               <a:rPr lang="en-IE" dirty="0" smtClean="0"/>
-              <a:t>System Details</a:t>
+              <a:t>Evaluation</a:t>
             </a:r>
             <a:endParaRPr lang="en-IE" dirty="0"/>
           </a:p>
@@ -7838,78 +7879,79 @@
         </p:nvSpPr>
         <p:spPr/>
         <p:txBody>
-          <a:bodyPr/>
-          <a:lstStyle/>
-          <a:p>
-            <a:pPr lvl="1">
-              <a:buFont typeface="Arial" panose="020B0604020202020204" pitchFamily="34" charset="0"/>
-              <a:buChar char="•"/>
-            </a:pPr>
-            <a:r>
-              <a:rPr lang="en-IE" sz="3200" dirty="0" smtClean="0"/>
-              <a:t>My </a:t>
-            </a:r>
-            <a:r>
-              <a:rPr lang="en-IE" sz="3200" dirty="0"/>
-              <a:t>Local Machine </a:t>
-            </a:r>
-            <a:r>
-              <a:rPr lang="en-IE" sz="3200" dirty="0" smtClean="0"/>
-              <a:t>(Sandy Bridge 32nm, </a:t>
-            </a:r>
-            <a:r>
-              <a:rPr lang="en-IE" sz="3200" dirty="0"/>
-              <a:t>4 Cores @ 3.30GHz)</a:t>
-            </a:r>
-          </a:p>
-          <a:p>
-            <a:pPr lvl="1">
-              <a:buFont typeface="Arial" panose="020B0604020202020204" pitchFamily="34" charset="0"/>
-              <a:buChar char="•"/>
-            </a:pPr>
-            <a:r>
-              <a:rPr lang="en-IE" sz="3200" dirty="0"/>
-              <a:t>Stoker </a:t>
-            </a:r>
-            <a:r>
-              <a:rPr lang="en-IE" sz="3200" dirty="0" smtClean="0"/>
-              <a:t>(Ivy Bridge EX 22nm, </a:t>
-            </a:r>
-            <a:r>
-              <a:rPr lang="en-IE" sz="3200" dirty="0"/>
-              <a:t>32 Cores @ 2.00GHz)</a:t>
-            </a:r>
-          </a:p>
-          <a:p>
-            <a:pPr lvl="1">
-              <a:buFont typeface="Arial" panose="020B0604020202020204" pitchFamily="34" charset="0"/>
-              <a:buChar char="•"/>
-            </a:pPr>
-            <a:r>
-              <a:rPr lang="en-IE" sz="3200" dirty="0"/>
-              <a:t>Cube </a:t>
-            </a:r>
-            <a:r>
-              <a:rPr lang="en-IE" sz="3200" dirty="0" smtClean="0"/>
-              <a:t>(</a:t>
-            </a:r>
-            <a:r>
-              <a:rPr lang="en-IE" sz="3200" dirty="0" err="1" smtClean="0"/>
-              <a:t>Gainestown</a:t>
-            </a:r>
-            <a:r>
-              <a:rPr lang="en-IE" sz="3200" dirty="0" smtClean="0"/>
-              <a:t> 45nm, </a:t>
-            </a:r>
-            <a:r>
-              <a:rPr lang="en-IE" sz="3200" dirty="0"/>
-              <a:t>16 Cores @ 2.27 GHz)</a:t>
-            </a:r>
-          </a:p>
-          <a:p>
-            <a:pPr marL="0" indent="0">
-              <a:buNone/>
-            </a:pPr>
+          <a:bodyPr>
+            <a:normAutofit/>
+          </a:bodyPr>
+          <a:lstStyle/>
+          <a:p>
+            <a:r>
+              <a:rPr lang="en-IE" dirty="0" smtClean="0"/>
+              <a:t>Compared Data Structure Variations</a:t>
+            </a:r>
+          </a:p>
+          <a:p>
+            <a:pPr lvl="1"/>
+            <a:r>
+              <a:rPr lang="en-IE" dirty="0" smtClean="0"/>
+              <a:t>Thread Count 1-128</a:t>
+            </a:r>
+          </a:p>
+          <a:p>
+            <a:pPr lvl="1"/>
+            <a:r>
+              <a:rPr lang="en-IE" dirty="0" smtClean="0"/>
+              <a:t>Varied list, buffer and table sizes</a:t>
+            </a:r>
+          </a:p>
+          <a:p>
+            <a:pPr lvl="1"/>
+            <a:r>
+              <a:rPr lang="en-IE" dirty="0" smtClean="0"/>
+              <a:t>Locked vs Lockless</a:t>
+            </a:r>
+          </a:p>
+          <a:p>
+            <a:r>
+              <a:rPr lang="en-IE" dirty="0" smtClean="0"/>
+              <a:t>Used Hardware Performance Counters</a:t>
+            </a:r>
+          </a:p>
+          <a:p>
+            <a:pPr lvl="1"/>
+            <a:r>
+              <a:rPr lang="en-IE" dirty="0"/>
+              <a:t>S</a:t>
+            </a:r>
+            <a:r>
+              <a:rPr lang="en-IE" dirty="0" smtClean="0"/>
+              <a:t>pecial registers</a:t>
+            </a:r>
+          </a:p>
+          <a:p>
+            <a:pPr lvl="1"/>
+            <a:r>
+              <a:rPr lang="en-IE" dirty="0"/>
+              <a:t>P</a:t>
+            </a:r>
+            <a:r>
+              <a:rPr lang="en-IE" dirty="0" smtClean="0"/>
+              <a:t>erformance analysis</a:t>
+            </a:r>
+          </a:p>
+          <a:p>
+            <a:pPr lvl="1"/>
+            <a:r>
+              <a:rPr lang="en-IE" dirty="0" smtClean="0"/>
+              <a:t>Record cache misses, </a:t>
+            </a:r>
+            <a:r>
+              <a:rPr lang="en-IE" dirty="0" err="1" smtClean="0"/>
+              <a:t>cpu</a:t>
+            </a:r>
+            <a:r>
+              <a:rPr lang="en-IE" dirty="0" smtClean="0"/>
+              <a:t> cycles etc…</a:t>
+            </a:r>
             <a:endParaRPr lang="en-IE" dirty="0"/>
           </a:p>
         </p:txBody>
@@ -7941,13 +7983,20 @@
     </p:spTree>
     <p:extLst>
       <p:ext uri="{BB962C8B-B14F-4D97-AF65-F5344CB8AC3E}">
-        <p14:creationId xmlns:p14="http://schemas.microsoft.com/office/powerpoint/2010/main" val="3586616813"/>
+        <p14:creationId xmlns:p14="http://schemas.microsoft.com/office/powerpoint/2010/main" val="792295864"/>
       </p:ext>
     </p:extLst>
   </p:cSld>
   <p:clrMapOvr>
     <a:masterClrMapping/>
   </p:clrMapOvr>
+  <p:timing>
+    <p:tnLst>
+      <p:par>
+        <p:cTn id="1" dur="indefinite" restart="never" nodeType="tmRoot"/>
+      </p:par>
+    </p:tnLst>
+  </p:timing>
 </p:sld>
 </file>
 
@@ -7984,105 +8033,40 @@
           <a:lstStyle/>
           <a:p>
             <a:r>
-              <a:rPr lang="en-IE" dirty="0" smtClean="0"/>
-              <a:t>Evaluation</a:t>
-            </a:r>
-            <a:endParaRPr lang="en-IE" dirty="0"/>
-          </a:p>
-        </p:txBody>
-      </p:sp>
-      <p:sp>
-        <p:nvSpPr>
-          <p:cNvPr id="3" name="Content Placeholder 2"/>
-          <p:cNvSpPr>
-            <a:spLocks noGrp="1"/>
-          </p:cNvSpPr>
+              <a:rPr lang="en-IE" dirty="0"/>
+              <a:t>Results &amp; Analysis</a:t>
+            </a:r>
+          </a:p>
+        </p:txBody>
+      </p:sp>
+      <p:graphicFrame>
+        <p:nvGraphicFramePr>
+          <p:cNvPr id="5" name="Content Placeholder 4"/>
+          <p:cNvGraphicFramePr>
+            <a:graphicFrameLocks noGrp="1"/>
+          </p:cNvGraphicFramePr>
           <p:nvPr>
             <p:ph idx="1"/>
-          </p:nvPr>
-        </p:nvSpPr>
-        <p:spPr/>
-        <p:txBody>
-          <a:bodyPr>
-            <a:normAutofit/>
-          </a:bodyPr>
-          <a:lstStyle/>
-          <a:p>
-            <a:r>
-              <a:rPr lang="en-IE" dirty="0" smtClean="0"/>
-              <a:t>Compared Data Structure Variations</a:t>
-            </a:r>
-          </a:p>
-          <a:p>
-            <a:pPr lvl="1"/>
-            <a:r>
-              <a:rPr lang="en-IE" dirty="0" smtClean="0"/>
-              <a:t>Thread Count 1-128</a:t>
-            </a:r>
-          </a:p>
-          <a:p>
-            <a:pPr lvl="1"/>
-            <a:r>
-              <a:rPr lang="en-IE" dirty="0" smtClean="0"/>
-              <a:t>Varied list, buffer and table sizes</a:t>
-            </a:r>
-          </a:p>
-          <a:p>
-            <a:pPr lvl="1"/>
-            <a:r>
-              <a:rPr lang="en-IE" dirty="0" smtClean="0"/>
-              <a:t>Locked vs Lockless</a:t>
-            </a:r>
-          </a:p>
-          <a:p>
-            <a:r>
-              <a:rPr lang="en-IE" dirty="0" smtClean="0"/>
-              <a:t>Used Hardware Performance Counters</a:t>
-            </a:r>
-          </a:p>
-          <a:p>
-            <a:pPr lvl="1"/>
-            <a:r>
-              <a:rPr lang="en-IE" dirty="0"/>
-              <a:t>S</a:t>
-            </a:r>
-            <a:r>
-              <a:rPr lang="en-IE" dirty="0" smtClean="0"/>
-              <a:t>pecial registers</a:t>
-            </a:r>
-          </a:p>
-          <a:p>
-            <a:pPr lvl="1"/>
-            <a:r>
-              <a:rPr lang="en-IE" dirty="0"/>
-              <a:t>P</a:t>
-            </a:r>
-            <a:r>
-              <a:rPr lang="en-IE" dirty="0" smtClean="0"/>
-              <a:t>erformance analysis</a:t>
-            </a:r>
-          </a:p>
-          <a:p>
-            <a:pPr lvl="1"/>
-            <a:r>
-              <a:rPr lang="en-IE" dirty="0" smtClean="0"/>
-              <a:t>Record cache misses, </a:t>
-            </a:r>
-            <a:r>
-              <a:rPr lang="en-IE" dirty="0" err="1" smtClean="0"/>
-              <a:t>cpu</a:t>
-            </a:r>
-            <a:r>
-              <a:rPr lang="en-IE" dirty="0" smtClean="0"/>
-              <a:t> cycles etc…</a:t>
-            </a:r>
-            <a:endParaRPr lang="en-IE" dirty="0"/>
-          </a:p>
-        </p:txBody>
-      </p:sp>
-      <p:sp>
-        <p:nvSpPr>
-          <p:cNvPr id="4" name="Slide Number Placeholder 3"/>
+            <p:extLst>
+              <p:ext uri="{D42A27DB-BD31-4B8C-83A1-F6EECF244321}">
+                <p14:modId xmlns:p14="http://schemas.microsoft.com/office/powerpoint/2010/main" val="4163705258"/>
+              </p:ext>
+            </p:extLst>
+          </p:nvPr>
+        </p:nvGraphicFramePr>
+        <p:xfrm>
+          <a:off x="457200" y="1600200"/>
+          <a:ext cx="8229600" cy="4525963"/>
+        </p:xfrm>
+        <a:graphic>
+          <a:graphicData uri="http://schemas.openxmlformats.org/drawingml/2006/chart">
+            <c:chart xmlns:c="http://schemas.openxmlformats.org/drawingml/2006/chart" xmlns:r="http://schemas.openxmlformats.org/officeDocument/2006/relationships" r:id="rId2"/>
+          </a:graphicData>
+        </a:graphic>
+      </p:graphicFrame>
+      <p:sp>
+        <p:nvSpPr>
+          <p:cNvPr id="6" name="Slide Number Placeholder 5"/>
           <p:cNvSpPr>
             <a:spLocks noGrp="1"/>
           </p:cNvSpPr>
@@ -8107,20 +8091,13 @@
     </p:spTree>
     <p:extLst>
       <p:ext uri="{BB962C8B-B14F-4D97-AF65-F5344CB8AC3E}">
-        <p14:creationId xmlns:p14="http://schemas.microsoft.com/office/powerpoint/2010/main" val="792295864"/>
+        <p14:creationId xmlns:p14="http://schemas.microsoft.com/office/powerpoint/2010/main" val="1082891656"/>
       </p:ext>
     </p:extLst>
   </p:cSld>
   <p:clrMapOvr>
     <a:masterClrMapping/>
   </p:clrMapOvr>
-  <p:timing>
-    <p:tnLst>
-      <p:par>
-        <p:cTn id="1" dur="indefinite" restart="never" nodeType="tmRoot"/>
-      </p:par>
-    </p:tnLst>
-  </p:timing>
 </p:sld>
 </file>
 
@@ -8171,11 +8148,6 @@
           </p:cNvGraphicFramePr>
           <p:nvPr>
             <p:ph idx="1"/>
-            <p:extLst>
-              <p:ext uri="{D42A27DB-BD31-4B8C-83A1-F6EECF244321}">
-                <p14:modId xmlns:p14="http://schemas.microsoft.com/office/powerpoint/2010/main" val="4163705258"/>
-              </p:ext>
-            </p:extLst>
           </p:nvPr>
         </p:nvGraphicFramePr>
         <p:xfrm>
@@ -8215,7 +8187,7 @@
     </p:spTree>
     <p:extLst>
       <p:ext uri="{BB962C8B-B14F-4D97-AF65-F5344CB8AC3E}">
-        <p14:creationId xmlns:p14="http://schemas.microsoft.com/office/powerpoint/2010/main" val="1082891656"/>
+        <p14:creationId xmlns:p14="http://schemas.microsoft.com/office/powerpoint/2010/main" val="3893594049"/>
       </p:ext>
     </p:extLst>
   </p:cSld>
@@ -8311,7 +8283,7 @@
     </p:spTree>
     <p:extLst>
       <p:ext uri="{BB962C8B-B14F-4D97-AF65-F5344CB8AC3E}">
-        <p14:creationId xmlns:p14="http://schemas.microsoft.com/office/powerpoint/2010/main" val="3893594049"/>
+        <p14:creationId xmlns:p14="http://schemas.microsoft.com/office/powerpoint/2010/main" val="3751500213"/>
       </p:ext>
     </p:extLst>
   </p:cSld>
@@ -8350,19 +8322,46 @@
         </p:nvSpPr>
         <p:spPr/>
         <p:txBody>
+          <a:bodyPr>
+            <a:normAutofit/>
+          </a:bodyPr>
+          <a:lstStyle/>
+          <a:p>
+            <a:r>
+              <a:rPr lang="en-IE" dirty="0" smtClean="0"/>
+              <a:t>Results &amp; Analysis</a:t>
+            </a:r>
+            <a:endParaRPr lang="en-IE" dirty="0"/>
+          </a:p>
+        </p:txBody>
+      </p:sp>
+      <p:sp>
+        <p:nvSpPr>
+          <p:cNvPr id="3" name="Slide Number Placeholder 2"/>
+          <p:cNvSpPr>
+            <a:spLocks noGrp="1"/>
+          </p:cNvSpPr>
+          <p:nvPr>
+            <p:ph type="sldNum" sz="quarter" idx="12"/>
+          </p:nvPr>
+        </p:nvSpPr>
+        <p:spPr/>
+        <p:txBody>
           <a:bodyPr/>
           <a:lstStyle/>
           <a:p>
-            <a:r>
-              <a:rPr lang="en-IE" dirty="0"/>
-              <a:t>Results &amp; Analysis</a:t>
-            </a:r>
+            <a:fld id="{B6F15528-21DE-4FAA-801E-634DDDAF4B2B}" type="slidenum">
+              <a:rPr lang="en-US" smtClean="0"/>
+              <a:pPr/>
+              <a:t>18</a:t>
+            </a:fld>
+            <a:endParaRPr lang="en-US"/>
           </a:p>
         </p:txBody>
       </p:sp>
       <p:graphicFrame>
         <p:nvGraphicFramePr>
-          <p:cNvPr id="5" name="Content Placeholder 4"/>
+          <p:cNvPr id="6" name="Content Placeholder 5"/>
           <p:cNvGraphicFramePr>
             <a:graphicFrameLocks noGrp="1"/>
           </p:cNvGraphicFramePr>
@@ -8380,34 +8379,10 @@
           </a:graphicData>
         </a:graphic>
       </p:graphicFrame>
-      <p:sp>
-        <p:nvSpPr>
-          <p:cNvPr id="6" name="Slide Number Placeholder 5"/>
-          <p:cNvSpPr>
-            <a:spLocks noGrp="1"/>
-          </p:cNvSpPr>
-          <p:nvPr>
-            <p:ph type="sldNum" sz="quarter" idx="12"/>
-          </p:nvPr>
-        </p:nvSpPr>
-        <p:spPr/>
-        <p:txBody>
-          <a:bodyPr/>
-          <a:lstStyle/>
-          <a:p>
-            <a:fld id="{B6F15528-21DE-4FAA-801E-634DDDAF4B2B}" type="slidenum">
-              <a:rPr lang="en-US" smtClean="0"/>
-              <a:pPr/>
-              <a:t>18</a:t>
-            </a:fld>
-            <a:endParaRPr lang="en-US"/>
-          </a:p>
-        </p:txBody>
-      </p:sp>
     </p:spTree>
     <p:extLst>
       <p:ext uri="{BB962C8B-B14F-4D97-AF65-F5344CB8AC3E}">
-        <p14:creationId xmlns:p14="http://schemas.microsoft.com/office/powerpoint/2010/main" val="3751500213"/>
+        <p14:creationId xmlns:p14="http://schemas.microsoft.com/office/powerpoint/2010/main" val="2890730007"/>
       </p:ext>
     </p:extLst>
   </p:cSld>
@@ -8446,22 +8421,19 @@
         </p:nvSpPr>
         <p:spPr/>
         <p:txBody>
-          <a:bodyPr>
-            <a:normAutofit/>
-          </a:bodyPr>
-          <a:lstStyle/>
-          <a:p>
-            <a:r>
-              <a:rPr lang="en-IE" dirty="0" smtClean="0"/>
+          <a:bodyPr/>
+          <a:lstStyle/>
+          <a:p>
+            <a:r>
+              <a:rPr lang="en-IE" dirty="0"/>
               <a:t>Results &amp; Analysis</a:t>
             </a:r>
-            <a:endParaRPr lang="en-IE" dirty="0"/>
-          </a:p>
-        </p:txBody>
-      </p:sp>
-      <p:sp>
-        <p:nvSpPr>
-          <p:cNvPr id="3" name="Slide Number Placeholder 2"/>
+          </a:p>
+        </p:txBody>
+      </p:sp>
+      <p:sp>
+        <p:nvSpPr>
+          <p:cNvPr id="4" name="Slide Number Placeholder 3"/>
           <p:cNvSpPr>
             <a:spLocks noGrp="1"/>
           </p:cNvSpPr>
@@ -8485,7 +8457,7 @@
       </p:sp>
       <p:graphicFrame>
         <p:nvGraphicFramePr>
-          <p:cNvPr id="6" name="Content Placeholder 5"/>
+          <p:cNvPr id="5" name="Content Placeholder 4"/>
           <p:cNvGraphicFramePr>
             <a:graphicFrameLocks noGrp="1"/>
           </p:cNvGraphicFramePr>
@@ -8506,7 +8478,7 @@
     </p:spTree>
     <p:extLst>
       <p:ext uri="{BB962C8B-B14F-4D97-AF65-F5344CB8AC3E}">
-        <p14:creationId xmlns:p14="http://schemas.microsoft.com/office/powerpoint/2010/main" val="2890730007"/>
+        <p14:creationId xmlns:p14="http://schemas.microsoft.com/office/powerpoint/2010/main" val="2686976860"/>
       </p:ext>
     </p:extLst>
   </p:cSld>
@@ -8580,8 +8552,20 @@
             <a:pPr lvl="1"/>
             <a:r>
               <a:rPr lang="en-IE" dirty="0" smtClean="0"/>
-              <a:t>Designed for access by multiple threads</a:t>
-            </a:r>
+              <a:t>Designed for access by multiple </a:t>
+            </a:r>
+            <a:r>
+              <a:rPr lang="en-IE" dirty="0" smtClean="0"/>
+              <a:t>threads</a:t>
+            </a:r>
+          </a:p>
+          <a:p>
+            <a:pPr lvl="1"/>
+            <a:r>
+              <a:rPr lang="en-IE" dirty="0" smtClean="0"/>
+              <a:t>Potential to be highly scalable</a:t>
+            </a:r>
+            <a:endParaRPr lang="en-IE" dirty="0" smtClean="0"/>
           </a:p>
           <a:p>
             <a:r>
@@ -8720,7 +8704,7 @@
     </p:spTree>
     <p:extLst>
       <p:ext uri="{BB962C8B-B14F-4D97-AF65-F5344CB8AC3E}">
-        <p14:creationId xmlns:p14="http://schemas.microsoft.com/office/powerpoint/2010/main" val="2686976860"/>
+        <p14:creationId xmlns:p14="http://schemas.microsoft.com/office/powerpoint/2010/main" val="2388643619"/>
       </p:ext>
     </p:extLst>
   </p:cSld>
@@ -8731,102 +8715,6 @@
 </file>
 
 <file path=ppt/slides/slide21.xml><?xml version="1.0" encoding="utf-8"?>
-<p:sld xmlns:a="http://schemas.openxmlformats.org/drawingml/2006/main" xmlns:r="http://schemas.openxmlformats.org/officeDocument/2006/relationships" xmlns:p="http://schemas.openxmlformats.org/presentationml/2006/main">
-  <p:cSld>
-    <p:spTree>
-      <p:nvGrpSpPr>
-        <p:cNvPr id="1" name=""/>
-        <p:cNvGrpSpPr/>
-        <p:nvPr/>
-      </p:nvGrpSpPr>
-      <p:grpSpPr>
-        <a:xfrm>
-          <a:off x="0" y="0"/>
-          <a:ext cx="0" cy="0"/>
-          <a:chOff x="0" y="0"/>
-          <a:chExt cx="0" cy="0"/>
-        </a:xfrm>
-      </p:grpSpPr>
-      <p:sp>
-        <p:nvSpPr>
-          <p:cNvPr id="2" name="Title 1"/>
-          <p:cNvSpPr>
-            <a:spLocks noGrp="1"/>
-          </p:cNvSpPr>
-          <p:nvPr>
-            <p:ph type="title"/>
-          </p:nvPr>
-        </p:nvSpPr>
-        <p:spPr/>
-        <p:txBody>
-          <a:bodyPr/>
-          <a:lstStyle/>
-          <a:p>
-            <a:r>
-              <a:rPr lang="en-IE" dirty="0"/>
-              <a:t>Results &amp; Analysis</a:t>
-            </a:r>
-          </a:p>
-        </p:txBody>
-      </p:sp>
-      <p:sp>
-        <p:nvSpPr>
-          <p:cNvPr id="4" name="Slide Number Placeholder 3"/>
-          <p:cNvSpPr>
-            <a:spLocks noGrp="1"/>
-          </p:cNvSpPr>
-          <p:nvPr>
-            <p:ph type="sldNum" sz="quarter" idx="12"/>
-          </p:nvPr>
-        </p:nvSpPr>
-        <p:spPr/>
-        <p:txBody>
-          <a:bodyPr/>
-          <a:lstStyle/>
-          <a:p>
-            <a:fld id="{B6F15528-21DE-4FAA-801E-634DDDAF4B2B}" type="slidenum">
-              <a:rPr lang="en-US" smtClean="0"/>
-              <a:pPr/>
-              <a:t>21</a:t>
-            </a:fld>
-            <a:endParaRPr lang="en-US"/>
-          </a:p>
-        </p:txBody>
-      </p:sp>
-      <p:graphicFrame>
-        <p:nvGraphicFramePr>
-          <p:cNvPr id="5" name="Content Placeholder 4"/>
-          <p:cNvGraphicFramePr>
-            <a:graphicFrameLocks noGrp="1"/>
-          </p:cNvGraphicFramePr>
-          <p:nvPr>
-            <p:ph idx="1"/>
-          </p:nvPr>
-        </p:nvGraphicFramePr>
-        <p:xfrm>
-          <a:off x="457200" y="1600200"/>
-          <a:ext cx="8229600" cy="4525963"/>
-        </p:xfrm>
-        <a:graphic>
-          <a:graphicData uri="http://schemas.openxmlformats.org/drawingml/2006/chart">
-            <c:chart xmlns:c="http://schemas.openxmlformats.org/drawingml/2006/chart" xmlns:r="http://schemas.openxmlformats.org/officeDocument/2006/relationships" r:id="rId2"/>
-          </a:graphicData>
-        </a:graphic>
-      </p:graphicFrame>
-    </p:spTree>
-    <p:extLst>
-      <p:ext uri="{BB962C8B-B14F-4D97-AF65-F5344CB8AC3E}">
-        <p14:creationId xmlns:p14="http://schemas.microsoft.com/office/powerpoint/2010/main" val="2388643619"/>
-      </p:ext>
-    </p:extLst>
-  </p:cSld>
-  <p:clrMapOvr>
-    <a:masterClrMapping/>
-  </p:clrMapOvr>
-</p:sld>
-</file>
-
-<file path=ppt/slides/slide22.xml><?xml version="1.0" encoding="utf-8"?>
 <p:sld xmlns:a="http://schemas.openxmlformats.org/drawingml/2006/main" xmlns:r="http://schemas.openxmlformats.org/officeDocument/2006/relationships" xmlns:p="http://schemas.openxmlformats.org/presentationml/2006/main">
   <p:cSld>
     <p:spTree>
@@ -9125,7 +9013,7 @@
             <a:fld id="{B6F15528-21DE-4FAA-801E-634DDDAF4B2B}" type="slidenum">
               <a:rPr lang="en-US" smtClean="0"/>
               <a:pPr/>
-              <a:t>22</a:t>
+              <a:t>21</a:t>
             </a:fld>
             <a:endParaRPr lang="en-US"/>
           </a:p>
@@ -9141,6 +9029,153 @@
   <p:clrMapOvr>
     <a:masterClrMapping/>
   </p:clrMapOvr>
+</p:sld>
+</file>
+
+<file path=ppt/slides/slide22.xml><?xml version="1.0" encoding="utf-8"?>
+<p:sld xmlns:a="http://schemas.openxmlformats.org/drawingml/2006/main" xmlns:r="http://schemas.openxmlformats.org/officeDocument/2006/relationships" xmlns:p="http://schemas.openxmlformats.org/presentationml/2006/main">
+  <p:cSld>
+    <p:spTree>
+      <p:nvGrpSpPr>
+        <p:cNvPr id="1" name=""/>
+        <p:cNvGrpSpPr/>
+        <p:nvPr/>
+      </p:nvGrpSpPr>
+      <p:grpSpPr>
+        <a:xfrm>
+          <a:off x="0" y="0"/>
+          <a:ext cx="0" cy="0"/>
+          <a:chOff x="0" y="0"/>
+          <a:chExt cx="0" cy="0"/>
+        </a:xfrm>
+      </p:grpSpPr>
+      <p:sp>
+        <p:nvSpPr>
+          <p:cNvPr id="2" name="Title 1"/>
+          <p:cNvSpPr>
+            <a:spLocks noGrp="1"/>
+          </p:cNvSpPr>
+          <p:nvPr>
+            <p:ph type="title"/>
+          </p:nvPr>
+        </p:nvSpPr>
+        <p:spPr/>
+        <p:txBody>
+          <a:bodyPr/>
+          <a:lstStyle/>
+          <a:p>
+            <a:r>
+              <a:rPr lang="en-IE" dirty="0" smtClean="0"/>
+              <a:t>What have </a:t>
+            </a:r>
+            <a:r>
+              <a:rPr lang="en-IE" smtClean="0"/>
+              <a:t>I learned?</a:t>
+            </a:r>
+            <a:endParaRPr lang="en-IE"/>
+          </a:p>
+        </p:txBody>
+      </p:sp>
+      <p:sp>
+        <p:nvSpPr>
+          <p:cNvPr id="3" name="Content Placeholder 2"/>
+          <p:cNvSpPr>
+            <a:spLocks noGrp="1"/>
+          </p:cNvSpPr>
+          <p:nvPr>
+            <p:ph idx="1"/>
+          </p:nvPr>
+        </p:nvSpPr>
+        <p:spPr/>
+        <p:txBody>
+          <a:bodyPr/>
+          <a:lstStyle/>
+          <a:p>
+            <a:r>
+              <a:rPr lang="en-IE" dirty="0" smtClean="0"/>
+              <a:t>Lockless algorithms</a:t>
+            </a:r>
+          </a:p>
+          <a:p>
+            <a:pPr lvl="1"/>
+            <a:r>
+              <a:rPr lang="en-IE" dirty="0" smtClean="0"/>
+              <a:t>More Difficult to Design &amp; Implement</a:t>
+            </a:r>
+          </a:p>
+          <a:p>
+            <a:pPr lvl="1"/>
+            <a:r>
+              <a:rPr lang="en-IE" smtClean="0"/>
+              <a:t>Generally provide </a:t>
+            </a:r>
+            <a:r>
+              <a:rPr lang="en-IE" dirty="0" smtClean="0"/>
+              <a:t>a performance boost when compared to locked algorithms</a:t>
+            </a:r>
+          </a:p>
+          <a:p>
+            <a:pPr lvl="1"/>
+            <a:r>
+              <a:rPr lang="en-IE" dirty="0" smtClean="0"/>
+              <a:t>There are always exceptions</a:t>
+            </a:r>
+          </a:p>
+          <a:p>
+            <a:pPr marL="0" indent="0">
+              <a:buNone/>
+            </a:pPr>
+            <a:endParaRPr lang="en-IE" dirty="0" smtClean="0"/>
+          </a:p>
+          <a:p>
+            <a:endParaRPr lang="en-IE" dirty="0" smtClean="0"/>
+          </a:p>
+          <a:p>
+            <a:endParaRPr lang="en-IE" dirty="0"/>
+          </a:p>
+        </p:txBody>
+      </p:sp>
+      <p:sp>
+        <p:nvSpPr>
+          <p:cNvPr id="4" name="Slide Number Placeholder 3"/>
+          <p:cNvSpPr>
+            <a:spLocks noGrp="1"/>
+          </p:cNvSpPr>
+          <p:nvPr>
+            <p:ph type="sldNum" sz="quarter" idx="12"/>
+          </p:nvPr>
+        </p:nvSpPr>
+        <p:spPr/>
+        <p:txBody>
+          <a:bodyPr/>
+          <a:lstStyle/>
+          <a:p>
+            <a:fld id="{B6F15528-21DE-4FAA-801E-634DDDAF4B2B}" type="slidenum">
+              <a:rPr lang="en-US" smtClean="0"/>
+              <a:pPr/>
+              <a:t>22</a:t>
+            </a:fld>
+            <a:endParaRPr lang="en-US"/>
+          </a:p>
+        </p:txBody>
+      </p:sp>
+    </p:spTree>
+    <p:extLst>
+      <p:ext uri="{BB962C8B-B14F-4D97-AF65-F5344CB8AC3E}">
+        <p14:creationId xmlns:p14="http://schemas.microsoft.com/office/powerpoint/2010/main" val="1539224103"/>
+      </p:ext>
+    </p:extLst>
+  </p:cSld>
+  <p:clrMapOvr>
+    <a:masterClrMapping/>
+  </p:clrMapOvr>
+  <p:timing>
+    <p:tnLst>
+      <p:par>
+        <p:cTn id="1" dur="indefinite" restart="never" nodeType="tmRoot"/>
+      </p:par>
+    </p:tnLst>
+  </p:timing>
 </p:sld>
 </file>
 
@@ -9178,13 +9213,9 @@
           <a:p>
             <a:r>
               <a:rPr lang="en-IE" dirty="0" smtClean="0"/>
-              <a:t>What have </a:t>
-            </a:r>
-            <a:r>
-              <a:rPr lang="en-IE" smtClean="0"/>
-              <a:t>I learned?</a:t>
-            </a:r>
-            <a:endParaRPr lang="en-IE"/>
+              <a:t>What have I learned?</a:t>
+            </a:r>
+            <a:endParaRPr lang="en-IE" dirty="0"/>
           </a:p>
         </p:txBody>
       </p:sp>
@@ -9200,43 +9231,46 @@
         </p:nvSpPr>
         <p:spPr/>
         <p:txBody>
-          <a:bodyPr/>
+          <a:bodyPr>
+            <a:normAutofit/>
+          </a:bodyPr>
           <a:lstStyle/>
           <a:p>
             <a:r>
               <a:rPr lang="en-IE" dirty="0" smtClean="0"/>
-              <a:t>Lockless algorithms</a:t>
+              <a:t>Ring Buffer</a:t>
             </a:r>
           </a:p>
           <a:p>
             <a:pPr lvl="1"/>
             <a:r>
               <a:rPr lang="en-IE" dirty="0" smtClean="0"/>
-              <a:t>More Difficult to Design &amp; Implement</a:t>
+              <a:t>Locked variations proved to be mostly slower than lockless varieties</a:t>
             </a:r>
           </a:p>
           <a:p>
             <a:pPr lvl="1"/>
             <a:r>
-              <a:rPr lang="en-IE" smtClean="0"/>
-              <a:t>Generally provide </a:t>
-            </a:r>
-            <a:r>
               <a:rPr lang="en-IE" dirty="0" smtClean="0"/>
-              <a:t>a performance boost when compared to locked algorithms</a:t>
+              <a:t>Exceptions came in the form of the TAS and TTAS locks running on the Local Machine</a:t>
             </a:r>
           </a:p>
           <a:p>
             <a:pPr lvl="1"/>
             <a:r>
               <a:rPr lang="en-IE" dirty="0" smtClean="0"/>
-              <a:t>There are always exceptions</a:t>
-            </a:r>
+              <a:t>Stoker proved to be the fastest of the three machines with the lockless algorithm</a:t>
+            </a:r>
+            <a:endParaRPr lang="en-IE" dirty="0" smtClean="0"/>
           </a:p>
           <a:p>
             <a:pPr marL="0" indent="0">
               <a:buNone/>
             </a:pPr>
+            <a:r>
+              <a:rPr lang="en-IE" dirty="0"/>
+              <a:t>	</a:t>
+            </a:r>
             <a:endParaRPr lang="en-IE" dirty="0" smtClean="0"/>
           </a:p>
           <a:p>
@@ -9274,7 +9308,7 @@
     </p:spTree>
     <p:extLst>
       <p:ext uri="{BB962C8B-B14F-4D97-AF65-F5344CB8AC3E}">
-        <p14:creationId xmlns:p14="http://schemas.microsoft.com/office/powerpoint/2010/main" val="1539224103"/>
+        <p14:creationId xmlns:p14="http://schemas.microsoft.com/office/powerpoint/2010/main" val="4120852742"/>
       </p:ext>
     </p:extLst>
   </p:cSld>
@@ -9354,58 +9388,64 @@
           <a:p>
             <a:r>
               <a:rPr lang="en-IE" dirty="0" smtClean="0"/>
-              <a:t>Ring Buffer</a:t>
+              <a:t>Linked </a:t>
+            </a:r>
+            <a:r>
+              <a:rPr lang="en-IE" dirty="0" smtClean="0"/>
+              <a:t>List</a:t>
             </a:r>
           </a:p>
           <a:p>
             <a:pPr lvl="1"/>
             <a:r>
               <a:rPr lang="en-IE" dirty="0" smtClean="0"/>
-              <a:t>Stoker performed well with the lockless algorithm</a:t>
-            </a:r>
-          </a:p>
-          <a:p>
-            <a:pPr lvl="1"/>
+              <a:t>Local </a:t>
+            </a:r>
             <a:r>
               <a:rPr lang="en-IE" dirty="0" smtClean="0"/>
-              <a:t>Locked variations proved to be more effective for both Cube and my Local Machine</a:t>
-            </a:r>
-          </a:p>
-          <a:p>
-            <a:r>
-              <a:rPr lang="en-IE" dirty="0" smtClean="0"/>
-              <a:t>Linked List</a:t>
-            </a:r>
-          </a:p>
-          <a:p>
-            <a:pPr lvl="1"/>
-            <a:r>
-              <a:rPr lang="en-IE" dirty="0" smtClean="0"/>
-              <a:t>My Local Machine performed well </a:t>
+              <a:t>Machine performed well </a:t>
             </a:r>
             <a:r>
               <a:rPr lang="en-IE" dirty="0" err="1" smtClean="0"/>
               <a:t>locklessly</a:t>
             </a:r>
+            <a:r>
+              <a:rPr lang="en-IE" dirty="0" smtClean="0"/>
+              <a:t>, outperforming the other two machines</a:t>
+            </a:r>
             <a:endParaRPr lang="en-IE" dirty="0"/>
           </a:p>
           <a:p>
             <a:pPr lvl="1"/>
             <a:r>
               <a:rPr lang="en-IE" dirty="0" smtClean="0"/>
-              <a:t>Outperformed every lock</a:t>
-            </a:r>
-          </a:p>
-          <a:p>
+              <a:t>Local Machine outperformed </a:t>
+            </a:r>
             <a:r>
               <a:rPr lang="en-IE" dirty="0" smtClean="0"/>
-              <a:t>Hash Table</a:t>
-            </a:r>
+              <a:t>every </a:t>
+            </a:r>
+            <a:r>
+              <a:rPr lang="en-IE" dirty="0" smtClean="0"/>
+              <a:t>lock on all 3 variations with the lockless variation</a:t>
+            </a:r>
+          </a:p>
+          <a:p>
+            <a:pPr lvl="1"/>
+            <a:r>
+              <a:rPr lang="en-IE" dirty="0" smtClean="0"/>
+              <a:t>Gained the largest performance boost by using a lockless algorithm out of the three data structures</a:t>
+            </a:r>
+            <a:endParaRPr lang="en-IE" dirty="0" smtClean="0"/>
           </a:p>
           <a:p>
             <a:pPr marL="0" indent="0">
               <a:buNone/>
             </a:pPr>
+            <a:r>
+              <a:rPr lang="en-IE" dirty="0"/>
+              <a:t>	</a:t>
+            </a:r>
             <a:endParaRPr lang="en-IE" dirty="0" smtClean="0"/>
           </a:p>
           <a:p>
@@ -9443,7 +9483,169 @@
     </p:spTree>
     <p:extLst>
       <p:ext uri="{BB962C8B-B14F-4D97-AF65-F5344CB8AC3E}">
-        <p14:creationId xmlns:p14="http://schemas.microsoft.com/office/powerpoint/2010/main" val="4120852742"/>
+        <p14:creationId xmlns:p14="http://schemas.microsoft.com/office/powerpoint/2010/main" val="3471223033"/>
+      </p:ext>
+    </p:extLst>
+  </p:cSld>
+  <p:clrMapOvr>
+    <a:masterClrMapping/>
+  </p:clrMapOvr>
+  <p:timing>
+    <p:tnLst>
+      <p:par>
+        <p:cTn id="1" dur="indefinite" restart="never" nodeType="tmRoot"/>
+      </p:par>
+    </p:tnLst>
+  </p:timing>
+</p:sld>
+</file>
+
+<file path=ppt/slides/slide25.xml><?xml version="1.0" encoding="utf-8"?>
+<p:sld xmlns:a="http://schemas.openxmlformats.org/drawingml/2006/main" xmlns:r="http://schemas.openxmlformats.org/officeDocument/2006/relationships" xmlns:p="http://schemas.openxmlformats.org/presentationml/2006/main">
+  <p:cSld>
+    <p:spTree>
+      <p:nvGrpSpPr>
+        <p:cNvPr id="1" name=""/>
+        <p:cNvGrpSpPr/>
+        <p:nvPr/>
+      </p:nvGrpSpPr>
+      <p:grpSpPr>
+        <a:xfrm>
+          <a:off x="0" y="0"/>
+          <a:ext cx="0" cy="0"/>
+          <a:chOff x="0" y="0"/>
+          <a:chExt cx="0" cy="0"/>
+        </a:xfrm>
+      </p:grpSpPr>
+      <p:sp>
+        <p:nvSpPr>
+          <p:cNvPr id="2" name="Title 1"/>
+          <p:cNvSpPr>
+            <a:spLocks noGrp="1"/>
+          </p:cNvSpPr>
+          <p:nvPr>
+            <p:ph type="title"/>
+          </p:nvPr>
+        </p:nvSpPr>
+        <p:spPr/>
+        <p:txBody>
+          <a:bodyPr/>
+          <a:lstStyle/>
+          <a:p>
+            <a:r>
+              <a:rPr lang="en-IE" dirty="0" smtClean="0"/>
+              <a:t>What have </a:t>
+            </a:r>
+            <a:r>
+              <a:rPr lang="en-IE" smtClean="0"/>
+              <a:t>I learned?</a:t>
+            </a:r>
+            <a:endParaRPr lang="en-IE"/>
+          </a:p>
+        </p:txBody>
+      </p:sp>
+      <p:sp>
+        <p:nvSpPr>
+          <p:cNvPr id="3" name="Content Placeholder 2"/>
+          <p:cNvSpPr>
+            <a:spLocks noGrp="1"/>
+          </p:cNvSpPr>
+          <p:nvPr>
+            <p:ph idx="1"/>
+          </p:nvPr>
+        </p:nvSpPr>
+        <p:spPr/>
+        <p:txBody>
+          <a:bodyPr>
+            <a:normAutofit/>
+          </a:bodyPr>
+          <a:lstStyle/>
+          <a:p>
+            <a:r>
+              <a:rPr lang="en-IE" dirty="0" smtClean="0"/>
+              <a:t>Hash Table</a:t>
+            </a:r>
+          </a:p>
+          <a:p>
+            <a:pPr lvl="1"/>
+            <a:r>
+              <a:rPr lang="en-IE" dirty="0" smtClean="0"/>
+              <a:t>Globally Locked and Lock per Bucket performed relatively equally</a:t>
+            </a:r>
+          </a:p>
+          <a:p>
+            <a:pPr lvl="1"/>
+            <a:r>
+              <a:rPr lang="en-IE" dirty="0" err="1" smtClean="0"/>
+              <a:t>TestAndSet</a:t>
+            </a:r>
+            <a:r>
+              <a:rPr lang="en-IE" dirty="0" smtClean="0"/>
+              <a:t> lock seems to be well suited to my implementation with consistently good performance across variations</a:t>
+            </a:r>
+          </a:p>
+          <a:p>
+            <a:pPr lvl="1"/>
+            <a:r>
+              <a:rPr lang="en-IE" dirty="0" smtClean="0"/>
+              <a:t>Surprisingly, b</a:t>
+            </a:r>
+            <a:r>
+              <a:rPr lang="en-IE" dirty="0" smtClean="0"/>
+              <a:t>oth locked variations outperformed the lockless variant by </a:t>
+            </a:r>
+            <a:r>
+              <a:rPr lang="en-IE" smtClean="0"/>
+              <a:t>a sizeable margin</a:t>
+            </a:r>
+            <a:endParaRPr lang="en-IE" dirty="0" smtClean="0"/>
+          </a:p>
+          <a:p>
+            <a:pPr marL="0" indent="0">
+              <a:buNone/>
+            </a:pPr>
+            <a:r>
+              <a:rPr lang="en-IE" dirty="0"/>
+              <a:t>	</a:t>
+            </a:r>
+            <a:endParaRPr lang="en-IE" dirty="0" smtClean="0"/>
+          </a:p>
+          <a:p>
+            <a:endParaRPr lang="en-IE" dirty="0" smtClean="0"/>
+          </a:p>
+          <a:p>
+            <a:endParaRPr lang="en-IE" dirty="0"/>
+          </a:p>
+        </p:txBody>
+      </p:sp>
+      <p:sp>
+        <p:nvSpPr>
+          <p:cNvPr id="4" name="Slide Number Placeholder 3"/>
+          <p:cNvSpPr>
+            <a:spLocks noGrp="1"/>
+          </p:cNvSpPr>
+          <p:nvPr>
+            <p:ph type="sldNum" sz="quarter" idx="12"/>
+          </p:nvPr>
+        </p:nvSpPr>
+        <p:spPr/>
+        <p:txBody>
+          <a:bodyPr/>
+          <a:lstStyle/>
+          <a:p>
+            <a:fld id="{B6F15528-21DE-4FAA-801E-634DDDAF4B2B}" type="slidenum">
+              <a:rPr lang="en-US" smtClean="0"/>
+              <a:pPr/>
+              <a:t>25</a:t>
+            </a:fld>
+            <a:endParaRPr lang="en-US"/>
+          </a:p>
+        </p:txBody>
+      </p:sp>
+    </p:spTree>
+    <p:extLst>
+      <p:ext uri="{BB962C8B-B14F-4D97-AF65-F5344CB8AC3E}">
+        <p14:creationId xmlns:p14="http://schemas.microsoft.com/office/powerpoint/2010/main" val="998323645"/>
       </p:ext>
     </p:extLst>
   </p:cSld>
@@ -11099,11 +11301,15 @@
             </a:r>
             <a:r>
               <a:rPr lang="en-IE" sz="1900" dirty="0" err="1" smtClean="0"/>
-              <a:t>atomic_compare_exchange_strongAtomic</a:t>
+              <a:t>atomic_compare_exchange_strong</a:t>
             </a:r>
             <a:r>
               <a:rPr lang="en-IE" sz="1900" dirty="0" smtClean="0"/>
-              <a:t> *</a:t>
+              <a:t>(Atomic </a:t>
+            </a:r>
+            <a:r>
+              <a:rPr lang="en-IE" sz="1900" dirty="0" smtClean="0"/>
+              <a:t>*</a:t>
             </a:r>
             <a:r>
               <a:rPr lang="en-IE" sz="1900" dirty="0" err="1" smtClean="0"/>
@@ -11192,11 +11398,31 @@
             </a:r>
             <a:r>
               <a:rPr lang="en-IE" sz="1700" dirty="0" err="1" smtClean="0"/>
-              <a:t>lock.compare_exchange_weak</a:t>
+              <a:t>std</a:t>
             </a:r>
             <a:r>
               <a:rPr lang="en-IE" sz="1700" dirty="0" smtClean="0"/>
-              <a:t>(0, 1))</a:t>
+              <a:t>::</a:t>
+            </a:r>
+            <a:r>
+              <a:rPr lang="en-IE" sz="1700" dirty="0" err="1" smtClean="0"/>
+              <a:t>atomic_compare_exchange_weak</a:t>
+            </a:r>
+            <a:r>
+              <a:rPr lang="en-IE" sz="1700" dirty="0" smtClean="0"/>
+              <a:t>(Atomic * </a:t>
+            </a:r>
+            <a:r>
+              <a:rPr lang="en-IE" sz="1700" dirty="0" err="1" smtClean="0"/>
+              <a:t>Obj</a:t>
+            </a:r>
+            <a:r>
+              <a:rPr lang="en-IE" sz="1700" dirty="0" smtClean="0"/>
+              <a:t>, 0</a:t>
+            </a:r>
+            <a:r>
+              <a:rPr lang="en-IE" sz="1700" dirty="0" smtClean="0"/>
+              <a:t>, 1))</a:t>
             </a:r>
             <a:r>
               <a:rPr lang="en-IE" sz="1700" dirty="0"/>
@@ -11516,57 +11742,117 @@
         </p:nvSpPr>
         <p:spPr/>
         <p:txBody>
-          <a:bodyPr>
-            <a:normAutofit fontScale="90000"/>
-          </a:bodyPr>
+          <a:bodyPr/>
           <a:lstStyle/>
           <a:p>
             <a:r>
               <a:rPr lang="en-IE" dirty="0" smtClean="0"/>
-              <a:t>Why are Concurrent Data </a:t>
-            </a:r>
-            <a:br>
+              <a:t>Background Work</a:t>
+            </a:r>
+            <a:endParaRPr lang="en-IE" dirty="0"/>
+          </a:p>
+        </p:txBody>
+      </p:sp>
+      <p:sp>
+        <p:nvSpPr>
+          <p:cNvPr id="3" name="Content Placeholder 2"/>
+          <p:cNvSpPr>
+            <a:spLocks noGrp="1"/>
+          </p:cNvSpPr>
+          <p:nvPr>
+            <p:ph idx="1"/>
+          </p:nvPr>
+        </p:nvSpPr>
+        <p:spPr/>
+        <p:txBody>
+          <a:bodyPr/>
+          <a:lstStyle/>
+          <a:p>
+            <a:r>
               <a:rPr lang="en-IE" dirty="0" smtClean="0"/>
-            </a:br>
+              <a:t>Some of my references</a:t>
+            </a:r>
             <a:r>
               <a:rPr lang="en-IE" dirty="0" smtClean="0"/>
-              <a:t>Structures Important?</a:t>
-            </a:r>
-            <a:endParaRPr lang="en-IE" dirty="0"/>
-          </a:p>
-        </p:txBody>
-      </p:sp>
-      <p:sp>
-        <p:nvSpPr>
-          <p:cNvPr id="3" name="Content Placeholder 2"/>
-          <p:cNvSpPr>
-            <a:spLocks noGrp="1"/>
-          </p:cNvSpPr>
-          <p:nvPr>
-            <p:ph idx="1"/>
-          </p:nvPr>
-        </p:nvSpPr>
-        <p:spPr/>
-        <p:txBody>
-          <a:bodyPr/>
-          <a:lstStyle/>
-          <a:p>
+              <a:t>:</a:t>
+            </a:r>
+          </a:p>
+          <a:p>
+            <a:pPr lvl="1"/>
             <a:r>
               <a:rPr lang="en-IE" dirty="0" smtClean="0"/>
-              <a:t>Potential for high scalability</a:t>
-            </a:r>
-          </a:p>
-          <a:p>
+              <a:t>“</a:t>
+            </a:r>
             <a:r>
               <a:rPr lang="en-IE" dirty="0" smtClean="0"/>
-              <a:t>Better performance than serial implementations of the same data structure</a:t>
-            </a:r>
-          </a:p>
-          <a:p>
-            <a:pPr marL="0" indent="0">
-              <a:buNone/>
-            </a:pPr>
-            <a:endParaRPr lang="en-IE" dirty="0"/>
+              <a:t>The Art of Multiprocessor Programming”- Herlihy &amp; </a:t>
+            </a:r>
+            <a:r>
+              <a:rPr lang="en-IE" dirty="0" err="1" smtClean="0"/>
+              <a:t>Shavit</a:t>
+            </a:r>
+            <a:r>
+              <a:rPr lang="en-IE" dirty="0" smtClean="0"/>
+              <a:t> </a:t>
+            </a:r>
+            <a:r>
+              <a:rPr lang="en-IE" dirty="0" smtClean="0"/>
+              <a:t>– 2008</a:t>
+            </a:r>
+          </a:p>
+          <a:p>
+            <a:pPr lvl="1"/>
+            <a:r>
+              <a:rPr lang="en-IE" dirty="0" smtClean="0"/>
+              <a:t>“Designing </a:t>
+            </a:r>
+            <a:r>
+              <a:rPr lang="en-IE" dirty="0" smtClean="0"/>
+              <a:t>Concurrent Data Structures” – </a:t>
+            </a:r>
+            <a:r>
+              <a:rPr lang="en-IE" dirty="0" err="1" smtClean="0"/>
+              <a:t>Moir</a:t>
+            </a:r>
+            <a:r>
+              <a:rPr lang="en-IE" dirty="0" smtClean="0"/>
+              <a:t> &amp; </a:t>
+            </a:r>
+            <a:r>
+              <a:rPr lang="en-IE" dirty="0" err="1" smtClean="0"/>
+              <a:t>Shavit</a:t>
+            </a:r>
+            <a:r>
+              <a:rPr lang="en-IE" dirty="0" smtClean="0"/>
+              <a:t> </a:t>
+            </a:r>
+            <a:r>
+              <a:rPr lang="en-IE" dirty="0" smtClean="0"/>
+              <a:t>– 2001</a:t>
+            </a:r>
+          </a:p>
+          <a:p>
+            <a:pPr lvl="1"/>
+            <a:r>
+              <a:rPr lang="en-IE" dirty="0" smtClean="0"/>
+              <a:t>“Implementing </a:t>
+            </a:r>
+            <a:r>
+              <a:rPr lang="en-IE" dirty="0" smtClean="0"/>
+              <a:t>Concurrent Data Objects” – Herlihy – </a:t>
+            </a:r>
+            <a:r>
+              <a:rPr lang="en-IE" dirty="0" smtClean="0"/>
+              <a:t>1993</a:t>
+            </a:r>
+          </a:p>
+          <a:p>
+            <a:pPr lvl="1"/>
+            <a:r>
+              <a:rPr lang="en-IE" dirty="0" smtClean="0"/>
+              <a:t>Locklessinc.com</a:t>
+            </a:r>
+            <a:endParaRPr lang="en-IE" dirty="0" smtClean="0"/>
           </a:p>
         </p:txBody>
       </p:sp>
@@ -11597,7 +11883,7 @@
     </p:spTree>
     <p:extLst>
       <p:ext uri="{BB962C8B-B14F-4D97-AF65-F5344CB8AC3E}">
-        <p14:creationId xmlns:p14="http://schemas.microsoft.com/office/powerpoint/2010/main" val="3358584582"/>
+        <p14:creationId xmlns:p14="http://schemas.microsoft.com/office/powerpoint/2010/main" val="330873260"/>
       </p:ext>
     </p:extLst>
   </p:cSld>
@@ -11641,7 +11927,7 @@
           <a:p>
             <a:r>
               <a:rPr lang="en-IE" dirty="0" smtClean="0"/>
-              <a:t>Background Work</a:t>
+              <a:t>What I have Done</a:t>
             </a:r>
             <a:endParaRPr lang="en-IE" dirty="0"/>
           </a:p>
@@ -11659,54 +11945,51 @@
         </p:nvSpPr>
         <p:spPr/>
         <p:txBody>
-          <a:bodyPr/>
+          <a:bodyPr>
+            <a:normAutofit/>
+          </a:bodyPr>
           <a:lstStyle/>
           <a:p>
             <a:r>
               <a:rPr lang="en-IE" dirty="0" smtClean="0"/>
-              <a:t>Some of my references:</a:t>
-            </a:r>
-          </a:p>
-          <a:p>
+              <a:t>Implemented 3 concurrent data structures</a:t>
+            </a:r>
+          </a:p>
+          <a:p>
+            <a:pPr lvl="1"/>
             <a:r>
               <a:rPr lang="en-IE" dirty="0" smtClean="0"/>
-              <a:t>“The Art of Multiprocessor Programming”- Herlihy &amp; </a:t>
-            </a:r>
-            <a:r>
-              <a:rPr lang="en-IE" dirty="0" err="1" smtClean="0"/>
-              <a:t>Shavit</a:t>
-            </a:r>
+              <a:t>Ring Buffer</a:t>
+            </a:r>
+          </a:p>
+          <a:p>
+            <a:pPr lvl="1"/>
             <a:r>
               <a:rPr lang="en-IE" dirty="0" smtClean="0"/>
-              <a:t> - 2008</a:t>
-            </a:r>
-          </a:p>
-          <a:p>
+              <a:t>Linked List</a:t>
+            </a:r>
+          </a:p>
+          <a:p>
+            <a:pPr lvl="1"/>
             <a:r>
               <a:rPr lang="en-IE" dirty="0" smtClean="0"/>
-              <a:t>“Designing Concurrent Data Structures” – </a:t>
-            </a:r>
-            <a:r>
-              <a:rPr lang="en-IE" dirty="0" err="1" smtClean="0"/>
-              <a:t>Moir</a:t>
-            </a:r>
+              <a:t>Hash Table</a:t>
+            </a:r>
+          </a:p>
+          <a:p>
             <a:r>
               <a:rPr lang="en-IE" dirty="0" smtClean="0"/>
-              <a:t> &amp; </a:t>
-            </a:r>
-            <a:r>
-              <a:rPr lang="en-IE" dirty="0" err="1" smtClean="0"/>
-              <a:t>Shavit</a:t>
+              <a:t>Implemented both locked and lockless variations</a:t>
+            </a:r>
+          </a:p>
+          <a:p>
+            <a:r>
+              <a:rPr lang="en-IE" dirty="0"/>
+              <a:t>C</a:t>
             </a:r>
             <a:r>
               <a:rPr lang="en-IE" dirty="0" smtClean="0"/>
-              <a:t> - 2001</a:t>
-            </a:r>
-          </a:p>
-          <a:p>
-            <a:r>
-              <a:rPr lang="en-IE" dirty="0" smtClean="0"/>
-              <a:t>“Implementing Concurrent Data Objects” – Herlihy – 1993</a:t>
+              <a:t>ompared them on 3 different systems</a:t>
             </a:r>
           </a:p>
         </p:txBody>
@@ -11738,7 +12021,7 @@
     </p:spTree>
     <p:extLst>
       <p:ext uri="{BB962C8B-B14F-4D97-AF65-F5344CB8AC3E}">
-        <p14:creationId xmlns:p14="http://schemas.microsoft.com/office/powerpoint/2010/main" val="330873260"/>
+        <p14:creationId xmlns:p14="http://schemas.microsoft.com/office/powerpoint/2010/main" val="351189580"/>
       </p:ext>
     </p:extLst>
   </p:cSld>
@@ -11782,7 +12065,7 @@
           <a:p>
             <a:r>
               <a:rPr lang="en-IE" dirty="0" smtClean="0"/>
-              <a:t>What I have Done</a:t>
+              <a:t>Data Structure Implementation</a:t>
             </a:r>
             <a:endParaRPr lang="en-IE" dirty="0"/>
           </a:p>
@@ -11801,51 +12084,85 @@
         <p:spPr/>
         <p:txBody>
           <a:bodyPr>
-            <a:normAutofit/>
+            <a:normAutofit fontScale="92500" lnSpcReduction="10000"/>
           </a:bodyPr>
           <a:lstStyle/>
           <a:p>
             <a:r>
               <a:rPr lang="en-IE" dirty="0" smtClean="0"/>
-              <a:t>Implemented 3 concurrent data structures</a:t>
+              <a:t>Locked Variations</a:t>
             </a:r>
           </a:p>
           <a:p>
             <a:pPr lvl="1"/>
             <a:r>
               <a:rPr lang="en-IE" dirty="0" smtClean="0"/>
-              <a:t>Ring Buffer</a:t>
+              <a:t>Mutex</a:t>
             </a:r>
           </a:p>
           <a:p>
             <a:pPr lvl="1"/>
             <a:r>
+              <a:rPr lang="en-IE" dirty="0"/>
+              <a:t>T</a:t>
+            </a:r>
+            <a:r>
               <a:rPr lang="en-IE" dirty="0" smtClean="0"/>
-              <a:t>Linked List</a:t>
+              <a:t>est-and-set</a:t>
             </a:r>
           </a:p>
           <a:p>
             <a:pPr lvl="1"/>
             <a:r>
               <a:rPr lang="en-IE" dirty="0" smtClean="0"/>
-              <a:t>Hash Table</a:t>
-            </a:r>
+              <a:t>Ticket Lock</a:t>
+            </a:r>
+            <a:endParaRPr lang="en-IE" dirty="0" smtClean="0"/>
           </a:p>
           <a:p>
             <a:r>
               <a:rPr lang="en-IE" dirty="0" smtClean="0"/>
-              <a:t>Implemented both locked and lockless variations</a:t>
-            </a:r>
-          </a:p>
-          <a:p>
-            <a:r>
-              <a:rPr lang="en-IE" dirty="0"/>
-              <a:t>C</a:t>
-            </a:r>
+              <a:t>Lockless Variations</a:t>
+            </a:r>
+          </a:p>
+          <a:p>
+            <a:pPr lvl="1"/>
             <a:r>
               <a:rPr lang="en-IE" dirty="0" smtClean="0"/>
-              <a:t>ompared them on 3 different systems</a:t>
-            </a:r>
+              <a:t>C++11 atomic library </a:t>
+            </a:r>
+            <a:r>
+              <a:rPr lang="en-IE" dirty="0" smtClean="0"/>
+              <a:t>operations</a:t>
+            </a:r>
+          </a:p>
+          <a:p>
+            <a:pPr lvl="2"/>
+            <a:r>
+              <a:rPr lang="en-IE" dirty="0" smtClean="0"/>
+              <a:t>Atomic Compare-and-swap</a:t>
+            </a:r>
+          </a:p>
+          <a:p>
+            <a:pPr lvl="2"/>
+            <a:r>
+              <a:rPr lang="en-IE" dirty="0" smtClean="0"/>
+              <a:t>Atomic Fetch-and-add</a:t>
+            </a:r>
+            <a:endParaRPr lang="en-IE" dirty="0" smtClean="0"/>
+          </a:p>
+          <a:p>
+            <a:r>
+              <a:rPr lang="en-IE" dirty="0" smtClean="0"/>
+              <a:t>Multi Producer Multi Consumer (MPMC) </a:t>
+            </a:r>
+          </a:p>
+          <a:p>
+            <a:r>
+              <a:rPr lang="en-IE" dirty="0" smtClean="0"/>
+              <a:t>Single Producer Single Consumer (SPSC)</a:t>
+            </a:r>
+            <a:endParaRPr lang="en-IE" dirty="0"/>
           </a:p>
         </p:txBody>
       </p:sp>
@@ -11876,7 +12193,7 @@
     </p:spTree>
     <p:extLst>
       <p:ext uri="{BB962C8B-B14F-4D97-AF65-F5344CB8AC3E}">
-        <p14:creationId xmlns:p14="http://schemas.microsoft.com/office/powerpoint/2010/main" val="351189580"/>
+        <p14:creationId xmlns:p14="http://schemas.microsoft.com/office/powerpoint/2010/main" val="3503624377"/>
       </p:ext>
     </p:extLst>
   </p:cSld>

</xml_diff>